<commit_message>
Added slides on merging and rebasing to quick-git
</commit_message>
<xml_diff>
--- a/slides/workshopslides_quick-git.pptx
+++ b/slides/workshopslides_quick-git.pptx
@@ -18,12 +18,14 @@
     <p:sldId id="272" r:id="rId12"/>
     <p:sldId id="273" r:id="rId13"/>
     <p:sldId id="274" r:id="rId14"/>
-    <p:sldId id="270" r:id="rId15"/>
-    <p:sldId id="266" r:id="rId16"/>
-    <p:sldId id="267" r:id="rId17"/>
-    <p:sldId id="262" r:id="rId18"/>
-    <p:sldId id="263" r:id="rId19"/>
-    <p:sldId id="265" r:id="rId20"/>
+    <p:sldId id="275" r:id="rId15"/>
+    <p:sldId id="276" r:id="rId16"/>
+    <p:sldId id="270" r:id="rId17"/>
+    <p:sldId id="266" r:id="rId18"/>
+    <p:sldId id="267" r:id="rId19"/>
+    <p:sldId id="262" r:id="rId20"/>
+    <p:sldId id="263" r:id="rId21"/>
+    <p:sldId id="265" r:id="rId22"/>
   </p:sldIdLst>
   <p:sldSz cx="12192000" cy="6858000"/>
   <p:notesSz cx="6858000" cy="9144000"/>
@@ -148,6 +150,8 @@
             <p14:sldId id="272"/>
             <p14:sldId id="273"/>
             <p14:sldId id="274"/>
+            <p14:sldId id="275"/>
+            <p14:sldId id="276"/>
             <p14:sldId id="270"/>
           </p14:sldIdLst>
         </p14:section>
@@ -3524,6 +3528,9 @@
               <a:t>Workshop</a:t>
             </a:r>
             <a:br>
+              <a:rPr lang="en-GB" sz="5200" dirty="0"/>
+            </a:br>
+            <a:br>
               <a:rPr lang="en-GB" dirty="0"/>
             </a:br>
             <a:r>
@@ -3551,10 +3558,85 @@
         </p:nvSpPr>
         <p:spPr/>
         <p:txBody>
-          <a:bodyPr/>
+          <a:bodyPr>
+            <a:normAutofit lnSpcReduction="10000"/>
+          </a:bodyPr>
           <a:lstStyle/>
           <a:p>
-            <a:endParaRPr lang="en-GB" dirty="0"/>
+            <a:r>
+              <a:rPr lang="en-GB" dirty="0">
+                <a:solidFill>
+                  <a:srgbClr val="FFFF00"/>
+                </a:solidFill>
+              </a:rPr>
+              <a:t>Whilst everyone’s arriving, please could you go to the links below and download and install both git </a:t>
+            </a:r>
+            <a:r>
+              <a:rPr lang="en-GB" i="1" dirty="0">
+                <a:solidFill>
+                  <a:srgbClr val="FFFF00"/>
+                </a:solidFill>
+              </a:rPr>
+              <a:t>and</a:t>
+            </a:r>
+            <a:r>
+              <a:rPr lang="en-GB" dirty="0">
+                <a:solidFill>
+                  <a:srgbClr val="FFFF00"/>
+                </a:solidFill>
+              </a:rPr>
+              <a:t> GitHub desktop:</a:t>
+            </a:r>
+          </a:p>
+          <a:p>
+            <a:r>
+              <a:rPr lang="en-GB" dirty="0">
+                <a:solidFill>
+                  <a:srgbClr val="00B0F0"/>
+                </a:solidFill>
+                <a:hlinkClick r:id="rId2">
+                  <a:extLst>
+                    <a:ext uri="{A12FA001-AC4F-418D-AE19-62706E023703}">
+                      <ahyp:hlinkClr xmlns:ahyp="http://schemas.microsoft.com/office/drawing/2018/hyperlinkcolor" val="tx"/>
+                    </a:ext>
+                  </a:extLst>
+                </a:hlinkClick>
+              </a:rPr>
+              <a:t>https://git-scm.com/downloads</a:t>
+            </a:r>
+            <a:r>
+              <a:rPr lang="en-GB" dirty="0">
+                <a:solidFill>
+                  <a:srgbClr val="00B0F0"/>
+                </a:solidFill>
+              </a:rPr>
+              <a:t> </a:t>
+            </a:r>
+          </a:p>
+          <a:p>
+            <a:r>
+              <a:rPr lang="en-GB" dirty="0">
+                <a:solidFill>
+                  <a:srgbClr val="00B0F0"/>
+                </a:solidFill>
+                <a:hlinkClick r:id="rId3">
+                  <a:extLst>
+                    <a:ext uri="{A12FA001-AC4F-418D-AE19-62706E023703}">
+                      <ahyp:hlinkClr xmlns:ahyp="http://schemas.microsoft.com/office/drawing/2018/hyperlinkcolor" val="tx"/>
+                    </a:ext>
+                  </a:extLst>
+                </a:hlinkClick>
+              </a:rPr>
+              <a:t>https://desktop.github.com/</a:t>
+            </a:r>
+            <a:r>
+              <a:rPr lang="en-GB" dirty="0">
+                <a:solidFill>
+                  <a:srgbClr val="00B0F0"/>
+                </a:solidFill>
+              </a:rPr>
+              <a:t> </a:t>
+            </a:r>
           </a:p>
         </p:txBody>
       </p:sp>
@@ -4950,6 +5032,14 @@
 <file path=ppt/slides/slide14.xml><?xml version="1.0" encoding="utf-8"?>
 <p:sld xmlns:a="http://schemas.openxmlformats.org/drawingml/2006/main" xmlns:r="http://schemas.openxmlformats.org/officeDocument/2006/relationships" xmlns:p="http://schemas.openxmlformats.org/presentationml/2006/main">
   <p:cSld>
+    <p:bg>
+      <p:bgPr>
+        <a:solidFill>
+          <a:schemeClr val="bg1"/>
+        </a:solidFill>
+        <a:effectLst/>
+      </p:bgPr>
+    </p:bg>
     <p:spTree>
       <p:nvGrpSpPr>
         <p:cNvPr id="1" name=""/>
@@ -4969,7 +5059,7 @@
           <p:cNvPr id="2" name="Title 1">
             <a:extLst>
               <a:ext uri="{FF2B5EF4-FFF2-40B4-BE49-F238E27FC236}">
-                <a16:creationId xmlns:a16="http://schemas.microsoft.com/office/drawing/2014/main" id="{A15822F5-14F8-04A7-9687-2A92683631CA}"/>
+                <a16:creationId xmlns:a16="http://schemas.microsoft.com/office/drawing/2014/main" id="{D047F8EF-BECC-CB05-2042-8E1A2F6D1C1A}"/>
               </a:ext>
             </a:extLst>
           </p:cNvPr>
@@ -4980,12 +5070,22 @@
             <p:ph type="title"/>
           </p:nvPr>
         </p:nvSpPr>
-        <p:spPr/>
-        <p:txBody>
-          <a:bodyPr/>
+        <p:spPr>
+          <a:xfrm>
+            <a:off x="643831" y="640080"/>
+            <a:ext cx="3690425" cy="1325562"/>
+          </a:xfrm>
+        </p:spPr>
+        <p:txBody>
+          <a:bodyPr>
+            <a:normAutofit/>
+          </a:bodyPr>
           <a:lstStyle/>
           <a:p>
-            <a:endParaRPr lang="en-GB"/>
+            <a:r>
+              <a:rPr lang="en-GB" sz="3200" dirty="0"/>
+              <a:t>Rebasing branches</a:t>
+            </a:r>
           </a:p>
         </p:txBody>
       </p:sp>
@@ -4994,7 +5094,7 @@
           <p:cNvPr id="3" name="Content Placeholder 2">
             <a:extLst>
               <a:ext uri="{FF2B5EF4-FFF2-40B4-BE49-F238E27FC236}">
-                <a16:creationId xmlns:a16="http://schemas.microsoft.com/office/drawing/2014/main" id="{3021795C-3041-287E-53A7-9DFEBB69C084}"/>
+                <a16:creationId xmlns:a16="http://schemas.microsoft.com/office/drawing/2014/main" id="{476F0551-B6E7-9358-79EA-9B20DDC8DAF3}"/>
               </a:ext>
             </a:extLst>
           </p:cNvPr>
@@ -5005,25 +5105,432 @@
             <p:ph idx="1"/>
           </p:nvPr>
         </p:nvSpPr>
-        <p:spPr/>
-        <p:txBody>
-          <a:bodyPr/>
+        <p:spPr>
+          <a:xfrm>
+            <a:off x="643831" y="1936955"/>
+            <a:ext cx="3690425" cy="4243182"/>
+          </a:xfrm>
+        </p:spPr>
+        <p:txBody>
+          <a:bodyPr>
+            <a:normAutofit/>
+          </a:bodyPr>
           <a:lstStyle/>
           <a:p>
-            <a:endParaRPr lang="en-GB"/>
-          </a:p>
-        </p:txBody>
-      </p:sp>
+            <a:r>
+              <a:rPr lang="en-GB" sz="1600" dirty="0"/>
+              <a:t>Now try task 4 on rebasing branches</a:t>
+            </a:r>
+            <a:endParaRPr lang="en-GB" dirty="0"/>
+          </a:p>
+        </p:txBody>
+      </p:sp>
+      <p:pic>
+        <p:nvPicPr>
+          <p:cNvPr id="5" name="Picture 4">
+            <a:extLst>
+              <a:ext uri="{FF2B5EF4-FFF2-40B4-BE49-F238E27FC236}">
+                <a16:creationId xmlns:a16="http://schemas.microsoft.com/office/drawing/2014/main" id="{685F5EBE-F77B-5283-ADF8-524FA77773C4}"/>
+              </a:ext>
+            </a:extLst>
+          </p:cNvPr>
+          <p:cNvPicPr>
+            <a:picLocks noChangeAspect="1"/>
+          </p:cNvPicPr>
+          <p:nvPr/>
+        </p:nvPicPr>
+        <p:blipFill>
+          <a:blip r:embed="rId2">
+            <a:extLst>
+              <a:ext uri="{28A0092B-C50C-407E-A947-70E740481C1C}">
+                <a14:useLocalDpi xmlns:a14="http://schemas.microsoft.com/office/drawing/2010/main" val="0"/>
+              </a:ext>
+            </a:extLst>
+          </a:blip>
+          <a:srcRect/>
+          <a:stretch/>
+        </p:blipFill>
+        <p:spPr>
+          <a:xfrm>
+            <a:off x="4774412" y="1267220"/>
+            <a:ext cx="5915503" cy="4333818"/>
+          </a:xfrm>
+          <a:prstGeom prst="rect">
+            <a:avLst/>
+          </a:prstGeom>
+        </p:spPr>
+      </p:pic>
+      <p:pic>
+        <p:nvPicPr>
+          <p:cNvPr id="7" name="Picture 6">
+            <a:extLst>
+              <a:ext uri="{FF2B5EF4-FFF2-40B4-BE49-F238E27FC236}">
+                <a16:creationId xmlns:a16="http://schemas.microsoft.com/office/drawing/2014/main" id="{2BCF6774-B92C-7836-786A-79A8C0612D8B}"/>
+              </a:ext>
+            </a:extLst>
+          </p:cNvPr>
+          <p:cNvPicPr>
+            <a:picLocks noChangeAspect="1"/>
+          </p:cNvPicPr>
+          <p:nvPr/>
+        </p:nvPicPr>
+        <p:blipFill>
+          <a:blip r:embed="rId3">
+            <a:extLst>
+              <a:ext uri="{28A0092B-C50C-407E-A947-70E740481C1C}">
+                <a14:useLocalDpi xmlns:a14="http://schemas.microsoft.com/office/drawing/2010/main" val="0"/>
+              </a:ext>
+            </a:extLst>
+          </a:blip>
+          <a:srcRect/>
+          <a:stretch/>
+        </p:blipFill>
+        <p:spPr>
+          <a:xfrm>
+            <a:off x="822231" y="3184869"/>
+            <a:ext cx="3077094" cy="2416169"/>
+          </a:xfrm>
+          <a:prstGeom prst="rect">
+            <a:avLst/>
+          </a:prstGeom>
+        </p:spPr>
+      </p:pic>
     </p:spTree>
     <p:extLst>
       <p:ext uri="{BB962C8B-B14F-4D97-AF65-F5344CB8AC3E}">
-        <p14:creationId xmlns:p14="http://schemas.microsoft.com/office/powerpoint/2010/main" val="2565230527"/>
+        <p14:creationId xmlns:p14="http://schemas.microsoft.com/office/powerpoint/2010/main" val="843578592"/>
       </p:ext>
     </p:extLst>
   </p:cSld>
   <p:clrMapOvr>
     <a:masterClrMapping/>
   </p:clrMapOvr>
+  <p:timing>
+    <p:tnLst>
+      <p:par>
+        <p:cTn id="1" dur="indefinite" restart="never" nodeType="tmRoot">
+          <p:childTnLst>
+            <p:seq concurrent="1" nextAc="seek">
+              <p:cTn id="2" dur="indefinite" nodeType="mainSeq">
+                <p:childTnLst>
+                  <p:par>
+                    <p:cTn id="3" fill="hold">
+                      <p:stCondLst>
+                        <p:cond delay="indefinite"/>
+                      </p:stCondLst>
+                      <p:childTnLst>
+                        <p:par>
+                          <p:cTn id="4" fill="hold">
+                            <p:stCondLst>
+                              <p:cond delay="0"/>
+                            </p:stCondLst>
+                            <p:childTnLst>
+                              <p:par>
+                                <p:cTn id="5" presetID="26" presetClass="entr" presetSubtype="0" fill="hold" nodeType="clickEffect">
+                                  <p:stCondLst>
+                                    <p:cond delay="0"/>
+                                  </p:stCondLst>
+                                  <p:childTnLst>
+                                    <p:set>
+                                      <p:cBhvr>
+                                        <p:cTn id="6" dur="1" fill="hold">
+                                          <p:stCondLst>
+                                            <p:cond delay="0"/>
+                                          </p:stCondLst>
+                                        </p:cTn>
+                                        <p:tgtEl>
+                                          <p:spTgt spid="7"/>
+                                        </p:tgtEl>
+                                        <p:attrNameLst>
+                                          <p:attrName>style.visibility</p:attrName>
+                                        </p:attrNameLst>
+                                      </p:cBhvr>
+                                      <p:to>
+                                        <p:strVal val="visible"/>
+                                      </p:to>
+                                    </p:set>
+                                    <p:animEffect transition="in" filter="wipe(down)">
+                                      <p:cBhvr>
+                                        <p:cTn id="7" dur="580">
+                                          <p:stCondLst>
+                                            <p:cond delay="0"/>
+                                          </p:stCondLst>
+                                        </p:cTn>
+                                        <p:tgtEl>
+                                          <p:spTgt spid="7"/>
+                                        </p:tgtEl>
+                                      </p:cBhvr>
+                                    </p:animEffect>
+                                    <p:anim calcmode="lin" valueType="num">
+                                      <p:cBhvr>
+                                        <p:cTn id="8" dur="1822" tmFilter="0,0; 0.14,0.36; 0.43,0.73; 0.71,0.91; 1.0,1.0">
+                                          <p:stCondLst>
+                                            <p:cond delay="0"/>
+                                          </p:stCondLst>
+                                        </p:cTn>
+                                        <p:tgtEl>
+                                          <p:spTgt spid="7"/>
+                                        </p:tgtEl>
+                                        <p:attrNameLst>
+                                          <p:attrName>ppt_x</p:attrName>
+                                        </p:attrNameLst>
+                                      </p:cBhvr>
+                                      <p:tavLst>
+                                        <p:tav tm="0">
+                                          <p:val>
+                                            <p:strVal val="#ppt_x-0.25"/>
+                                          </p:val>
+                                        </p:tav>
+                                        <p:tav tm="100000">
+                                          <p:val>
+                                            <p:strVal val="#ppt_x"/>
+                                          </p:val>
+                                        </p:tav>
+                                      </p:tavLst>
+                                    </p:anim>
+                                    <p:anim calcmode="lin" valueType="num">
+                                      <p:cBhvr>
+                                        <p:cTn id="9" dur="664" tmFilter="0.0,0.0; 0.25,0.07; 0.50,0.2; 0.75,0.467; 1.0,1.0">
+                                          <p:stCondLst>
+                                            <p:cond delay="0"/>
+                                          </p:stCondLst>
+                                        </p:cTn>
+                                        <p:tgtEl>
+                                          <p:spTgt spid="7"/>
+                                        </p:tgtEl>
+                                        <p:attrNameLst>
+                                          <p:attrName>ppt_y</p:attrName>
+                                        </p:attrNameLst>
+                                      </p:cBhvr>
+                                      <p:tavLst>
+                                        <p:tav tm="0" fmla="#ppt_y-sin(pi*$)/3">
+                                          <p:val>
+                                            <p:fltVal val="0.5"/>
+                                          </p:val>
+                                        </p:tav>
+                                        <p:tav tm="100000">
+                                          <p:val>
+                                            <p:fltVal val="1"/>
+                                          </p:val>
+                                        </p:tav>
+                                      </p:tavLst>
+                                    </p:anim>
+                                    <p:anim calcmode="lin" valueType="num">
+                                      <p:cBhvr>
+                                        <p:cTn id="10" dur="664" tmFilter="0, 0; 0.125,0.2665; 0.25,0.4; 0.375,0.465; 0.5,0.5;  0.625,0.535; 0.75,0.6; 0.875,0.7335; 1,1">
+                                          <p:stCondLst>
+                                            <p:cond delay="664"/>
+                                          </p:stCondLst>
+                                        </p:cTn>
+                                        <p:tgtEl>
+                                          <p:spTgt spid="7"/>
+                                        </p:tgtEl>
+                                        <p:attrNameLst>
+                                          <p:attrName>ppt_y</p:attrName>
+                                        </p:attrNameLst>
+                                      </p:cBhvr>
+                                      <p:tavLst>
+                                        <p:tav tm="0" fmla="#ppt_y-sin(pi*$)/9">
+                                          <p:val>
+                                            <p:fltVal val="0"/>
+                                          </p:val>
+                                        </p:tav>
+                                        <p:tav tm="100000">
+                                          <p:val>
+                                            <p:fltVal val="1"/>
+                                          </p:val>
+                                        </p:tav>
+                                      </p:tavLst>
+                                    </p:anim>
+                                    <p:anim calcmode="lin" valueType="num">
+                                      <p:cBhvr>
+                                        <p:cTn id="11" dur="332" tmFilter="0, 0; 0.125,0.2665; 0.25,0.4; 0.375,0.465; 0.5,0.5;  0.625,0.535; 0.75,0.6; 0.875,0.7335; 1,1">
+                                          <p:stCondLst>
+                                            <p:cond delay="1324"/>
+                                          </p:stCondLst>
+                                        </p:cTn>
+                                        <p:tgtEl>
+                                          <p:spTgt spid="7"/>
+                                        </p:tgtEl>
+                                        <p:attrNameLst>
+                                          <p:attrName>ppt_y</p:attrName>
+                                        </p:attrNameLst>
+                                      </p:cBhvr>
+                                      <p:tavLst>
+                                        <p:tav tm="0" fmla="#ppt_y-sin(pi*$)/27">
+                                          <p:val>
+                                            <p:fltVal val="0"/>
+                                          </p:val>
+                                        </p:tav>
+                                        <p:tav tm="100000">
+                                          <p:val>
+                                            <p:fltVal val="1"/>
+                                          </p:val>
+                                        </p:tav>
+                                      </p:tavLst>
+                                    </p:anim>
+                                    <p:anim calcmode="lin" valueType="num">
+                                      <p:cBhvr>
+                                        <p:cTn id="12" dur="164" tmFilter="0, 0; 0.125,0.2665; 0.25,0.4; 0.375,0.465; 0.5,0.5;  0.625,0.535; 0.75,0.6; 0.875,0.7335; 1,1">
+                                          <p:stCondLst>
+                                            <p:cond delay="1656"/>
+                                          </p:stCondLst>
+                                        </p:cTn>
+                                        <p:tgtEl>
+                                          <p:spTgt spid="7"/>
+                                        </p:tgtEl>
+                                        <p:attrNameLst>
+                                          <p:attrName>ppt_y</p:attrName>
+                                        </p:attrNameLst>
+                                      </p:cBhvr>
+                                      <p:tavLst>
+                                        <p:tav tm="0" fmla="#ppt_y-sin(pi*$)/81">
+                                          <p:val>
+                                            <p:fltVal val="0"/>
+                                          </p:val>
+                                        </p:tav>
+                                        <p:tav tm="100000">
+                                          <p:val>
+                                            <p:fltVal val="1"/>
+                                          </p:val>
+                                        </p:tav>
+                                      </p:tavLst>
+                                    </p:anim>
+                                    <p:animScale>
+                                      <p:cBhvr>
+                                        <p:cTn id="13" dur="26">
+                                          <p:stCondLst>
+                                            <p:cond delay="650"/>
+                                          </p:stCondLst>
+                                        </p:cTn>
+                                        <p:tgtEl>
+                                          <p:spTgt spid="7"/>
+                                        </p:tgtEl>
+                                      </p:cBhvr>
+                                      <p:to x="100000" y="60000"/>
+                                    </p:animScale>
+                                    <p:animScale>
+                                      <p:cBhvr>
+                                        <p:cTn id="14" dur="166" decel="50000">
+                                          <p:stCondLst>
+                                            <p:cond delay="676"/>
+                                          </p:stCondLst>
+                                        </p:cTn>
+                                        <p:tgtEl>
+                                          <p:spTgt spid="7"/>
+                                        </p:tgtEl>
+                                      </p:cBhvr>
+                                      <p:to x="100000" y="100000"/>
+                                    </p:animScale>
+                                    <p:animScale>
+                                      <p:cBhvr>
+                                        <p:cTn id="15" dur="26">
+                                          <p:stCondLst>
+                                            <p:cond delay="1312"/>
+                                          </p:stCondLst>
+                                        </p:cTn>
+                                        <p:tgtEl>
+                                          <p:spTgt spid="7"/>
+                                        </p:tgtEl>
+                                      </p:cBhvr>
+                                      <p:to x="100000" y="80000"/>
+                                    </p:animScale>
+                                    <p:animScale>
+                                      <p:cBhvr>
+                                        <p:cTn id="16" dur="166" decel="50000">
+                                          <p:stCondLst>
+                                            <p:cond delay="1338"/>
+                                          </p:stCondLst>
+                                        </p:cTn>
+                                        <p:tgtEl>
+                                          <p:spTgt spid="7"/>
+                                        </p:tgtEl>
+                                      </p:cBhvr>
+                                      <p:to x="100000" y="100000"/>
+                                    </p:animScale>
+                                    <p:animScale>
+                                      <p:cBhvr>
+                                        <p:cTn id="17" dur="26">
+                                          <p:stCondLst>
+                                            <p:cond delay="1642"/>
+                                          </p:stCondLst>
+                                        </p:cTn>
+                                        <p:tgtEl>
+                                          <p:spTgt spid="7"/>
+                                        </p:tgtEl>
+                                      </p:cBhvr>
+                                      <p:to x="100000" y="90000"/>
+                                    </p:animScale>
+                                    <p:animScale>
+                                      <p:cBhvr>
+                                        <p:cTn id="18" dur="166" decel="50000">
+                                          <p:stCondLst>
+                                            <p:cond delay="1668"/>
+                                          </p:stCondLst>
+                                        </p:cTn>
+                                        <p:tgtEl>
+                                          <p:spTgt spid="7"/>
+                                        </p:tgtEl>
+                                      </p:cBhvr>
+                                      <p:to x="100000" y="100000"/>
+                                    </p:animScale>
+                                    <p:animScale>
+                                      <p:cBhvr>
+                                        <p:cTn id="19" dur="26">
+                                          <p:stCondLst>
+                                            <p:cond delay="1808"/>
+                                          </p:stCondLst>
+                                        </p:cTn>
+                                        <p:tgtEl>
+                                          <p:spTgt spid="7"/>
+                                        </p:tgtEl>
+                                      </p:cBhvr>
+                                      <p:to x="100000" y="95000"/>
+                                    </p:animScale>
+                                    <p:animScale>
+                                      <p:cBhvr>
+                                        <p:cTn id="20" dur="166" decel="50000">
+                                          <p:stCondLst>
+                                            <p:cond delay="1834"/>
+                                          </p:stCondLst>
+                                        </p:cTn>
+                                        <p:tgtEl>
+                                          <p:spTgt spid="7"/>
+                                        </p:tgtEl>
+                                      </p:cBhvr>
+                                      <p:to x="100000" y="100000"/>
+                                    </p:animScale>
+                                  </p:childTnLst>
+                                </p:cTn>
+                              </p:par>
+                            </p:childTnLst>
+                          </p:cTn>
+                        </p:par>
+                      </p:childTnLst>
+                    </p:cTn>
+                  </p:par>
+                </p:childTnLst>
+              </p:cTn>
+              <p:prevCondLst>
+                <p:cond evt="onPrev" delay="0">
+                  <p:tgtEl>
+                    <p:sldTgt/>
+                  </p:tgtEl>
+                </p:cond>
+              </p:prevCondLst>
+              <p:nextCondLst>
+                <p:cond evt="onNext" delay="0">
+                  <p:tgtEl>
+                    <p:sldTgt/>
+                  </p:tgtEl>
+                </p:cond>
+              </p:nextCondLst>
+            </p:seq>
+          </p:childTnLst>
+        </p:cTn>
+      </p:par>
+    </p:tnLst>
+  </p:timing>
 </p:sld>
 </file>
 
@@ -5049,6 +5556,269 @@
           <p:cNvPr id="2" name="Title 1">
             <a:extLst>
               <a:ext uri="{FF2B5EF4-FFF2-40B4-BE49-F238E27FC236}">
+                <a16:creationId xmlns:a16="http://schemas.microsoft.com/office/drawing/2014/main" id="{278CBD3D-7DC6-9FDA-A7C0-B5891C73B033}"/>
+              </a:ext>
+            </a:extLst>
+          </p:cNvPr>
+          <p:cNvSpPr>
+            <a:spLocks noGrp="1"/>
+          </p:cNvSpPr>
+          <p:nvPr>
+            <p:ph type="title"/>
+          </p:nvPr>
+        </p:nvSpPr>
+        <p:spPr>
+          <a:xfrm>
+            <a:off x="2599981" y="165253"/>
+            <a:ext cx="5442335" cy="1526069"/>
+          </a:xfrm>
+        </p:spPr>
+        <p:txBody>
+          <a:bodyPr>
+            <a:normAutofit/>
+          </a:bodyPr>
+          <a:lstStyle/>
+          <a:p>
+            <a:pPr algn="ctr"/>
+            <a:r>
+              <a:rPr lang="en-GB" dirty="0"/>
+              <a:t>rebase vs merge</a:t>
+            </a:r>
+          </a:p>
+        </p:txBody>
+      </p:sp>
+      <p:sp>
+        <p:nvSpPr>
+          <p:cNvPr id="3" name="Content Placeholder 2">
+            <a:extLst>
+              <a:ext uri="{FF2B5EF4-FFF2-40B4-BE49-F238E27FC236}">
+                <a16:creationId xmlns:a16="http://schemas.microsoft.com/office/drawing/2014/main" id="{44E809A3-2317-C3E4-7289-A08C8F1C3609}"/>
+              </a:ext>
+            </a:extLst>
+          </p:cNvPr>
+          <p:cNvSpPr>
+            <a:spLocks noGrp="1"/>
+          </p:cNvSpPr>
+          <p:nvPr>
+            <p:ph idx="1"/>
+          </p:nvPr>
+        </p:nvSpPr>
+        <p:spPr>
+          <a:xfrm>
+            <a:off x="2699132" y="1883421"/>
+            <a:ext cx="5122843" cy="4296716"/>
+          </a:xfrm>
+        </p:spPr>
+        <p:txBody>
+          <a:bodyPr/>
+          <a:lstStyle/>
+          <a:p>
+            <a:r>
+              <a:rPr lang="en-GB" dirty="0"/>
+              <a:t>Rebase and merge both join two branches together, but result in a slightly different history tree.</a:t>
+            </a:r>
+          </a:p>
+          <a:p>
+            <a:pPr lvl="1"/>
+            <a:r>
+              <a:rPr lang="en-GB" dirty="0"/>
+              <a:t>git rebase will create a linear path along the history</a:t>
+            </a:r>
+          </a:p>
+          <a:p>
+            <a:pPr lvl="1"/>
+            <a:r>
+              <a:rPr lang="en-GB" dirty="0"/>
+              <a:t>git merge will leave the parallel paths in the history</a:t>
+            </a:r>
+          </a:p>
+          <a:p>
+            <a:r>
+              <a:rPr lang="en-GB" dirty="0"/>
+              <a:t>The main impact this can have is how you’ll handle undoing changes. With rebase you have a clearer lineage of what changes will be undone if you go back to a given commit.</a:t>
+            </a:r>
+          </a:p>
+        </p:txBody>
+      </p:sp>
+      <p:pic>
+        <p:nvPicPr>
+          <p:cNvPr id="4" name="Picture 3">
+            <a:extLst>
+              <a:ext uri="{FF2B5EF4-FFF2-40B4-BE49-F238E27FC236}">
+                <a16:creationId xmlns:a16="http://schemas.microsoft.com/office/drawing/2014/main" id="{19FA9CD7-4E09-F1AA-8C59-160DFA19F0D2}"/>
+              </a:ext>
+            </a:extLst>
+          </p:cNvPr>
+          <p:cNvPicPr>
+            <a:picLocks noChangeAspect="1"/>
+          </p:cNvPicPr>
+          <p:nvPr/>
+        </p:nvPicPr>
+        <p:blipFill rotWithShape="1">
+          <a:blip r:embed="rId2">
+            <a:extLst>
+              <a:ext uri="{28A0092B-C50C-407E-A947-70E740481C1C}">
+                <a14:useLocalDpi xmlns:a14="http://schemas.microsoft.com/office/drawing/2010/main" val="0"/>
+              </a:ext>
+            </a:extLst>
+          </a:blip>
+          <a:srcRect l="63619" t="9787" r="7999" b="4933"/>
+          <a:stretch/>
+        </p:blipFill>
+        <p:spPr>
+          <a:xfrm>
+            <a:off x="8042317" y="21496"/>
+            <a:ext cx="3231688" cy="6836504"/>
+          </a:xfrm>
+          <a:prstGeom prst="rect">
+            <a:avLst/>
+          </a:prstGeom>
+        </p:spPr>
+      </p:pic>
+      <p:pic>
+        <p:nvPicPr>
+          <p:cNvPr id="5" name="Picture 4">
+            <a:extLst>
+              <a:ext uri="{FF2B5EF4-FFF2-40B4-BE49-F238E27FC236}">
+                <a16:creationId xmlns:a16="http://schemas.microsoft.com/office/drawing/2014/main" id="{7DC6286E-7EEE-E4AA-08C9-35F1103F1308}"/>
+              </a:ext>
+            </a:extLst>
+          </p:cNvPr>
+          <p:cNvPicPr>
+            <a:picLocks noChangeAspect="1"/>
+          </p:cNvPicPr>
+          <p:nvPr/>
+        </p:nvPicPr>
+        <p:blipFill rotWithShape="1">
+          <a:blip r:embed="rId3"/>
+          <a:srcRect l="68692" t="11487" r="9394" b="6739"/>
+          <a:stretch/>
+        </p:blipFill>
+        <p:spPr>
+          <a:xfrm>
+            <a:off x="0" y="-26846"/>
+            <a:ext cx="2511846" cy="6863350"/>
+          </a:xfrm>
+          <a:prstGeom prst="rect">
+            <a:avLst/>
+          </a:prstGeom>
+        </p:spPr>
+      </p:pic>
+    </p:spTree>
+    <p:extLst>
+      <p:ext uri="{BB962C8B-B14F-4D97-AF65-F5344CB8AC3E}">
+        <p14:creationId xmlns:p14="http://schemas.microsoft.com/office/powerpoint/2010/main" val="3391762093"/>
+      </p:ext>
+    </p:extLst>
+  </p:cSld>
+  <p:clrMapOvr>
+    <a:masterClrMapping/>
+  </p:clrMapOvr>
+</p:sld>
+</file>
+
+<file path=ppt/slides/slide16.xml><?xml version="1.0" encoding="utf-8"?>
+<p:sld xmlns:a="http://schemas.openxmlformats.org/drawingml/2006/main" xmlns:r="http://schemas.openxmlformats.org/officeDocument/2006/relationships" xmlns:p="http://schemas.openxmlformats.org/presentationml/2006/main">
+  <p:cSld>
+    <p:spTree>
+      <p:nvGrpSpPr>
+        <p:cNvPr id="1" name=""/>
+        <p:cNvGrpSpPr/>
+        <p:nvPr/>
+      </p:nvGrpSpPr>
+      <p:grpSpPr>
+        <a:xfrm>
+          <a:off x="0" y="0"/>
+          <a:ext cx="0" cy="0"/>
+          <a:chOff x="0" y="0"/>
+          <a:chExt cx="0" cy="0"/>
+        </a:xfrm>
+      </p:grpSpPr>
+      <p:sp>
+        <p:nvSpPr>
+          <p:cNvPr id="2" name="Title 1">
+            <a:extLst>
+              <a:ext uri="{FF2B5EF4-FFF2-40B4-BE49-F238E27FC236}">
+                <a16:creationId xmlns:a16="http://schemas.microsoft.com/office/drawing/2014/main" id="{A15822F5-14F8-04A7-9687-2A92683631CA}"/>
+              </a:ext>
+            </a:extLst>
+          </p:cNvPr>
+          <p:cNvSpPr>
+            <a:spLocks noGrp="1"/>
+          </p:cNvSpPr>
+          <p:nvPr>
+            <p:ph type="title"/>
+          </p:nvPr>
+        </p:nvSpPr>
+        <p:spPr/>
+        <p:txBody>
+          <a:bodyPr/>
+          <a:lstStyle/>
+          <a:p>
+            <a:endParaRPr lang="en-GB"/>
+          </a:p>
+        </p:txBody>
+      </p:sp>
+      <p:sp>
+        <p:nvSpPr>
+          <p:cNvPr id="3" name="Content Placeholder 2">
+            <a:extLst>
+              <a:ext uri="{FF2B5EF4-FFF2-40B4-BE49-F238E27FC236}">
+                <a16:creationId xmlns:a16="http://schemas.microsoft.com/office/drawing/2014/main" id="{3021795C-3041-287E-53A7-9DFEBB69C084}"/>
+              </a:ext>
+            </a:extLst>
+          </p:cNvPr>
+          <p:cNvSpPr>
+            <a:spLocks noGrp="1"/>
+          </p:cNvSpPr>
+          <p:nvPr>
+            <p:ph idx="1"/>
+          </p:nvPr>
+        </p:nvSpPr>
+        <p:spPr/>
+        <p:txBody>
+          <a:bodyPr/>
+          <a:lstStyle/>
+          <a:p>
+            <a:endParaRPr lang="en-GB"/>
+          </a:p>
+        </p:txBody>
+      </p:sp>
+    </p:spTree>
+    <p:extLst>
+      <p:ext uri="{BB962C8B-B14F-4D97-AF65-F5344CB8AC3E}">
+        <p14:creationId xmlns:p14="http://schemas.microsoft.com/office/powerpoint/2010/main" val="2565230527"/>
+      </p:ext>
+    </p:extLst>
+  </p:cSld>
+  <p:clrMapOvr>
+    <a:masterClrMapping/>
+  </p:clrMapOvr>
+</p:sld>
+</file>
+
+<file path=ppt/slides/slide17.xml><?xml version="1.0" encoding="utf-8"?>
+<p:sld xmlns:a="http://schemas.openxmlformats.org/drawingml/2006/main" xmlns:r="http://schemas.openxmlformats.org/officeDocument/2006/relationships" xmlns:p="http://schemas.openxmlformats.org/presentationml/2006/main">
+  <p:cSld>
+    <p:spTree>
+      <p:nvGrpSpPr>
+        <p:cNvPr id="1" name=""/>
+        <p:cNvGrpSpPr/>
+        <p:nvPr/>
+      </p:nvGrpSpPr>
+      <p:grpSpPr>
+        <a:xfrm>
+          <a:off x="0" y="0"/>
+          <a:ext cx="0" cy="0"/>
+          <a:chOff x="0" y="0"/>
+          <a:chExt cx="0" cy="0"/>
+        </a:xfrm>
+      </p:grpSpPr>
+      <p:sp>
+        <p:nvSpPr>
+          <p:cNvPr id="2" name="Title 1">
+            <a:extLst>
+              <a:ext uri="{FF2B5EF4-FFF2-40B4-BE49-F238E27FC236}">
                 <a16:creationId xmlns:a16="http://schemas.microsoft.com/office/drawing/2014/main" id="{D8239B82-7EA9-5C9B-3542-132ED34C8B22}"/>
               </a:ext>
             </a:extLst>
@@ -5198,7 +5968,7 @@
 </p:sld>
 </file>
 
-<file path=ppt/slides/slide16.xml><?xml version="1.0" encoding="utf-8"?>
+<file path=ppt/slides/slide18.xml><?xml version="1.0" encoding="utf-8"?>
 <p:sld xmlns:a="http://schemas.openxmlformats.org/drawingml/2006/main" xmlns:r="http://schemas.openxmlformats.org/officeDocument/2006/relationships" xmlns:p="http://schemas.openxmlformats.org/presentationml/2006/main">
   <p:cSld>
     <p:bg>
@@ -5511,410 +6281,6 @@
 </p:sld>
 </file>
 
-<file path=ppt/slides/slide17.xml><?xml version="1.0" encoding="utf-8"?>
-<p:sld xmlns:a="http://schemas.openxmlformats.org/drawingml/2006/main" xmlns:r="http://schemas.openxmlformats.org/officeDocument/2006/relationships" xmlns:p="http://schemas.openxmlformats.org/presentationml/2006/main">
-  <p:cSld>
-    <p:spTree>
-      <p:nvGrpSpPr>
-        <p:cNvPr id="1" name=""/>
-        <p:cNvGrpSpPr/>
-        <p:nvPr/>
-      </p:nvGrpSpPr>
-      <p:grpSpPr>
-        <a:xfrm>
-          <a:off x="0" y="0"/>
-          <a:ext cx="0" cy="0"/>
-          <a:chOff x="0" y="0"/>
-          <a:chExt cx="0" cy="0"/>
-        </a:xfrm>
-      </p:grpSpPr>
-      <p:sp>
-        <p:nvSpPr>
-          <p:cNvPr id="2" name="Title 1">
-            <a:extLst>
-              <a:ext uri="{FF2B5EF4-FFF2-40B4-BE49-F238E27FC236}">
-                <a16:creationId xmlns:a16="http://schemas.microsoft.com/office/drawing/2014/main" id="{9B3B9A98-6151-2923-4C62-FE106DBBCDA0}"/>
-              </a:ext>
-            </a:extLst>
-          </p:cNvPr>
-          <p:cNvSpPr>
-            <a:spLocks noGrp="1"/>
-          </p:cNvSpPr>
-          <p:nvPr>
-            <p:ph type="title"/>
-          </p:nvPr>
-        </p:nvSpPr>
-        <p:spPr/>
-        <p:txBody>
-          <a:bodyPr/>
-          <a:lstStyle/>
-          <a:p>
-            <a:r>
-              <a:rPr lang="en-GB" dirty="0"/>
-              <a:t>Git basic concepts</a:t>
-            </a:r>
-          </a:p>
-        </p:txBody>
-      </p:sp>
-      <p:sp>
-        <p:nvSpPr>
-          <p:cNvPr id="3" name="Content Placeholder 2">
-            <a:extLst>
-              <a:ext uri="{FF2B5EF4-FFF2-40B4-BE49-F238E27FC236}">
-                <a16:creationId xmlns:a16="http://schemas.microsoft.com/office/drawing/2014/main" id="{D9102869-1947-3A8B-FE41-50754E81197C}"/>
-              </a:ext>
-            </a:extLst>
-          </p:cNvPr>
-          <p:cNvSpPr>
-            <a:spLocks noGrp="1"/>
-          </p:cNvSpPr>
-          <p:nvPr>
-            <p:ph idx="1"/>
-          </p:nvPr>
-        </p:nvSpPr>
-        <p:spPr/>
-        <p:txBody>
-          <a:bodyPr>
-            <a:normAutofit fontScale="92500" lnSpcReduction="20000"/>
-          </a:bodyPr>
-          <a:lstStyle/>
-          <a:p>
-            <a:r>
-              <a:rPr lang="en-GB" dirty="0"/>
-              <a:t>A repository can be created locally (i.e. on your laptop or desktop) or remotely (on GitHub or Dev Ops).</a:t>
-            </a:r>
-          </a:p>
-          <a:p>
-            <a:pPr lvl="1"/>
-            <a:r>
-              <a:rPr lang="en-GB" dirty="0"/>
-              <a:t>Most of the work you do on a repository, i.e. developing your code, will be done within the </a:t>
-            </a:r>
-            <a:r>
-              <a:rPr lang="en-GB" b="1" dirty="0"/>
-              <a:t>local</a:t>
-            </a:r>
-            <a:r>
-              <a:rPr lang="en-GB" dirty="0"/>
-              <a:t> copy.</a:t>
-            </a:r>
-          </a:p>
-          <a:p>
-            <a:pPr lvl="1"/>
-            <a:r>
-              <a:rPr lang="en-GB" dirty="0"/>
-              <a:t>The </a:t>
-            </a:r>
-            <a:r>
-              <a:rPr lang="en-GB" b="1" dirty="0"/>
-              <a:t>remote</a:t>
-            </a:r>
-            <a:r>
-              <a:rPr lang="en-GB" dirty="0"/>
-              <a:t> repo is effectively your reliable back-up of your code and somewhere where collaborators can view and get access your code.</a:t>
-            </a:r>
-          </a:p>
-          <a:p>
-            <a:pPr lvl="1"/>
-            <a:r>
-              <a:rPr lang="en-GB" dirty="0"/>
-              <a:t>You’re only going to have a single </a:t>
-            </a:r>
-            <a:r>
-              <a:rPr lang="en-GB" b="1" dirty="0"/>
-              <a:t>remote</a:t>
-            </a:r>
-            <a:r>
-              <a:rPr lang="en-GB" dirty="0"/>
-              <a:t> copy of the repo, but you (and collaborators) can have multiple </a:t>
-            </a:r>
-            <a:r>
-              <a:rPr lang="en-GB" b="1" dirty="0"/>
-              <a:t>local</a:t>
-            </a:r>
-            <a:r>
-              <a:rPr lang="en-GB" dirty="0"/>
-              <a:t> copies.</a:t>
-            </a:r>
-          </a:p>
-          <a:p>
-            <a:pPr lvl="1"/>
-            <a:r>
-              <a:rPr lang="en-GB" dirty="0"/>
-              <a:t>Syncing back and forth between the </a:t>
-            </a:r>
-            <a:r>
-              <a:rPr lang="en-GB" b="1" dirty="0"/>
-              <a:t>remote</a:t>
-            </a:r>
-            <a:r>
-              <a:rPr lang="en-GB" dirty="0"/>
-              <a:t> and </a:t>
-            </a:r>
-            <a:r>
-              <a:rPr lang="en-GB" b="1" dirty="0"/>
-              <a:t>local</a:t>
-            </a:r>
-            <a:r>
-              <a:rPr lang="en-GB" dirty="0"/>
-              <a:t> copies of a repo is done by </a:t>
-            </a:r>
-            <a:r>
-              <a:rPr lang="en-GB" b="1" dirty="0"/>
-              <a:t>Pushing </a:t>
-            </a:r>
-            <a:r>
-              <a:rPr lang="en-GB" dirty="0"/>
-              <a:t>(local to remote) and </a:t>
-            </a:r>
-            <a:r>
-              <a:rPr lang="en-GB" b="1" dirty="0"/>
-              <a:t>Pulling</a:t>
-            </a:r>
-            <a:r>
-              <a:rPr lang="en-GB" dirty="0"/>
-              <a:t> (remote to local).</a:t>
-            </a:r>
-          </a:p>
-          <a:p>
-            <a:r>
-              <a:rPr lang="en-GB" dirty="0"/>
-              <a:t>Recording the changes in your repo is performed using </a:t>
-            </a:r>
-            <a:r>
-              <a:rPr lang="en-GB" b="1" dirty="0"/>
-              <a:t>commits.</a:t>
-            </a:r>
-          </a:p>
-          <a:p>
-            <a:pPr lvl="1"/>
-            <a:r>
-              <a:rPr lang="en-GB" b="1" dirty="0"/>
-              <a:t>Commits</a:t>
-            </a:r>
-            <a:r>
-              <a:rPr lang="en-GB" dirty="0"/>
-              <a:t> record the current state of the repo to log files.</a:t>
-            </a:r>
-          </a:p>
-          <a:p>
-            <a:pPr lvl="1"/>
-            <a:r>
-              <a:rPr lang="en-GB" b="1" dirty="0"/>
-              <a:t>Commits </a:t>
-            </a:r>
-            <a:r>
-              <a:rPr lang="en-GB" dirty="0"/>
-              <a:t>should be made regularly (think of them as being like saving a file in Word – once saved, you’re less likely to lose your progress).</a:t>
-            </a:r>
-          </a:p>
-          <a:p>
-            <a:pPr lvl="1"/>
-            <a:r>
-              <a:rPr lang="en-GB" b="1" dirty="0"/>
-              <a:t>Commits</a:t>
-            </a:r>
-            <a:r>
-              <a:rPr lang="en-GB" dirty="0"/>
-              <a:t> by themselves </a:t>
-            </a:r>
-            <a:r>
-              <a:rPr lang="en-GB" i="1" dirty="0"/>
-              <a:t>do not</a:t>
-            </a:r>
-            <a:r>
-              <a:rPr lang="en-GB" dirty="0"/>
-              <a:t> log changes to the remote or other local repos, only the on that you’re working on.</a:t>
-            </a:r>
-          </a:p>
-          <a:p>
-            <a:pPr lvl="1"/>
-            <a:r>
-              <a:rPr lang="en-GB" dirty="0"/>
-              <a:t>After making a </a:t>
-            </a:r>
-            <a:r>
-              <a:rPr lang="en-GB" b="1" dirty="0"/>
-              <a:t>commit</a:t>
-            </a:r>
-            <a:r>
-              <a:rPr lang="en-GB" dirty="0"/>
-              <a:t>, it’s often worth making a Push to the remote so everything’s backed up.</a:t>
-            </a:r>
-          </a:p>
-          <a:p>
-            <a:pPr lvl="1"/>
-            <a:r>
-              <a:rPr lang="en-GB" dirty="0"/>
-              <a:t>You can undo changes by </a:t>
-            </a:r>
-            <a:r>
-              <a:rPr lang="en-GB" dirty="0" err="1"/>
-              <a:t>reseting</a:t>
-            </a:r>
-            <a:r>
-              <a:rPr lang="en-GB" dirty="0"/>
-              <a:t> to older </a:t>
-            </a:r>
-            <a:r>
-              <a:rPr lang="en-GB" b="1" dirty="0"/>
-              <a:t>commits</a:t>
-            </a:r>
-            <a:r>
-              <a:rPr lang="en-GB" dirty="0"/>
-              <a:t>.</a:t>
-            </a:r>
-          </a:p>
-          <a:p>
-            <a:pPr lvl="1"/>
-            <a:endParaRPr lang="en-GB" dirty="0"/>
-          </a:p>
-          <a:p>
-            <a:endParaRPr lang="en-GB" dirty="0"/>
-          </a:p>
-        </p:txBody>
-      </p:sp>
-    </p:spTree>
-    <p:extLst>
-      <p:ext uri="{BB962C8B-B14F-4D97-AF65-F5344CB8AC3E}">
-        <p14:creationId xmlns:p14="http://schemas.microsoft.com/office/powerpoint/2010/main" val="3408809189"/>
-      </p:ext>
-    </p:extLst>
-  </p:cSld>
-  <p:clrMapOvr>
-    <a:masterClrMapping/>
-  </p:clrMapOvr>
-</p:sld>
-</file>
-
-<file path=ppt/slides/slide18.xml><?xml version="1.0" encoding="utf-8"?>
-<p:sld xmlns:a="http://schemas.openxmlformats.org/drawingml/2006/main" xmlns:r="http://schemas.openxmlformats.org/officeDocument/2006/relationships" xmlns:p="http://schemas.openxmlformats.org/presentationml/2006/main">
-  <p:cSld>
-    <p:spTree>
-      <p:nvGrpSpPr>
-        <p:cNvPr id="1" name=""/>
-        <p:cNvGrpSpPr/>
-        <p:nvPr/>
-      </p:nvGrpSpPr>
-      <p:grpSpPr>
-        <a:xfrm>
-          <a:off x="0" y="0"/>
-          <a:ext cx="0" cy="0"/>
-          <a:chOff x="0" y="0"/>
-          <a:chExt cx="0" cy="0"/>
-        </a:xfrm>
-      </p:grpSpPr>
-      <p:sp>
-        <p:nvSpPr>
-          <p:cNvPr id="2" name="Title 1">
-            <a:extLst>
-              <a:ext uri="{FF2B5EF4-FFF2-40B4-BE49-F238E27FC236}">
-                <a16:creationId xmlns:a16="http://schemas.microsoft.com/office/drawing/2014/main" id="{3E411BA7-F591-20D1-EC9E-57C67251B6A2}"/>
-              </a:ext>
-            </a:extLst>
-          </p:cNvPr>
-          <p:cNvSpPr>
-            <a:spLocks noGrp="1"/>
-          </p:cNvSpPr>
-          <p:nvPr>
-            <p:ph type="title"/>
-          </p:nvPr>
-        </p:nvSpPr>
-        <p:spPr/>
-        <p:txBody>
-          <a:bodyPr/>
-          <a:lstStyle/>
-          <a:p>
-            <a:r>
-              <a:rPr lang="en-GB" dirty="0"/>
-              <a:t>How to work with git</a:t>
-            </a:r>
-          </a:p>
-        </p:txBody>
-      </p:sp>
-      <p:sp>
-        <p:nvSpPr>
-          <p:cNvPr id="3" name="Content Placeholder 2">
-            <a:extLst>
-              <a:ext uri="{FF2B5EF4-FFF2-40B4-BE49-F238E27FC236}">
-                <a16:creationId xmlns:a16="http://schemas.microsoft.com/office/drawing/2014/main" id="{2B695AAE-60D2-925A-54AB-8A450E57F129}"/>
-              </a:ext>
-            </a:extLst>
-          </p:cNvPr>
-          <p:cNvSpPr>
-            <a:spLocks noGrp="1"/>
-          </p:cNvSpPr>
-          <p:nvPr>
-            <p:ph idx="1"/>
-          </p:nvPr>
-        </p:nvSpPr>
-        <p:spPr/>
-        <p:txBody>
-          <a:bodyPr/>
-          <a:lstStyle/>
-          <a:p>
-            <a:r>
-              <a:rPr lang="en-GB" dirty="0"/>
-              <a:t>You’ll likely have two main ways you might work with git on your DfE laptop:</a:t>
-            </a:r>
-          </a:p>
-          <a:p>
-            <a:pPr lvl="1"/>
-            <a:r>
-              <a:rPr lang="en-GB" dirty="0"/>
-              <a:t>Git BASH terminal:</a:t>
-            </a:r>
-          </a:p>
-          <a:p>
-            <a:pPr lvl="2"/>
-            <a:r>
-              <a:rPr lang="en-GB" dirty="0"/>
-              <a:t>text driven</a:t>
-            </a:r>
-          </a:p>
-          <a:p>
-            <a:pPr lvl="2"/>
-            <a:r>
-              <a:rPr lang="en-GB" dirty="0"/>
-              <a:t>Offers the full range of git commands</a:t>
-            </a:r>
-          </a:p>
-          <a:p>
-            <a:pPr lvl="1"/>
-            <a:r>
-              <a:rPr lang="en-GB" dirty="0"/>
-              <a:t>R-Studio git interface</a:t>
-            </a:r>
-          </a:p>
-          <a:p>
-            <a:pPr lvl="2"/>
-            <a:r>
-              <a:rPr lang="en-GB" dirty="0"/>
-              <a:t>graphical user interface</a:t>
-            </a:r>
-          </a:p>
-          <a:p>
-            <a:pPr lvl="2"/>
-            <a:r>
-              <a:rPr lang="en-GB" dirty="0"/>
-              <a:t>Generally limited to commands around committing, pushing and pulling and viewing the history.</a:t>
-            </a:r>
-          </a:p>
-        </p:txBody>
-      </p:sp>
-    </p:spTree>
-    <p:extLst>
-      <p:ext uri="{BB962C8B-B14F-4D97-AF65-F5344CB8AC3E}">
-        <p14:creationId xmlns:p14="http://schemas.microsoft.com/office/powerpoint/2010/main" val="1830327008"/>
-      </p:ext>
-    </p:extLst>
-  </p:cSld>
-  <p:clrMapOvr>
-    <a:masterClrMapping/>
-  </p:clrMapOvr>
-</p:sld>
-</file>
-
 <file path=ppt/slides/slide19.xml><?xml version="1.0" encoding="utf-8"?>
 <p:sld xmlns:a="http://schemas.openxmlformats.org/drawingml/2006/main" xmlns:r="http://schemas.openxmlformats.org/officeDocument/2006/relationships" xmlns:p="http://schemas.openxmlformats.org/presentationml/2006/main">
   <p:cSld>
@@ -5937,7 +6303,7 @@
           <p:cNvPr id="2" name="Title 1">
             <a:extLst>
               <a:ext uri="{FF2B5EF4-FFF2-40B4-BE49-F238E27FC236}">
-                <a16:creationId xmlns:a16="http://schemas.microsoft.com/office/drawing/2014/main" id="{8431DC89-E69D-6C7F-3D17-A950A45DB015}"/>
+                <a16:creationId xmlns:a16="http://schemas.microsoft.com/office/drawing/2014/main" id="{9B3B9A98-6151-2923-4C62-FE106DBBCDA0}"/>
               </a:ext>
             </a:extLst>
           </p:cNvPr>
@@ -5955,7 +6321,7 @@
           <a:p>
             <a:r>
               <a:rPr lang="en-GB" dirty="0"/>
-              <a:t>Start working with git</a:t>
+              <a:t>Git basic concepts</a:t>
             </a:r>
           </a:p>
         </p:txBody>
@@ -5965,7 +6331,7 @@
           <p:cNvPr id="3" name="Content Placeholder 2">
             <a:extLst>
               <a:ext uri="{FF2B5EF4-FFF2-40B4-BE49-F238E27FC236}">
-                <a16:creationId xmlns:a16="http://schemas.microsoft.com/office/drawing/2014/main" id="{1133EE65-1383-3856-4034-0F8270D6284E}"/>
+                <a16:creationId xmlns:a16="http://schemas.microsoft.com/office/drawing/2014/main" id="{D9102869-1947-3A8B-FE41-50754E81197C}"/>
               </a:ext>
             </a:extLst>
           </p:cNvPr>
@@ -5978,32 +6344,210 @@
         </p:nvSpPr>
         <p:spPr/>
         <p:txBody>
-          <a:bodyPr/>
+          <a:bodyPr>
+            <a:normAutofit fontScale="92500" lnSpcReduction="20000"/>
+          </a:bodyPr>
           <a:lstStyle/>
           <a:p>
             <a:r>
               <a:rPr lang="en-GB" dirty="0"/>
-              <a:t>Get in to working groups of about 3</a:t>
-            </a:r>
-          </a:p>
-          <a:p>
-            <a:r>
-              <a:rPr lang="en-GB" dirty="0"/>
-              <a:t>Go to the Setting up the repository section of the pdf and start working through the walkthrough…</a:t>
-            </a:r>
-          </a:p>
-          <a:p>
-            <a:r>
-              <a:rPr lang="en-GB" dirty="0"/>
-              <a:t>Ask questions!</a:t>
-            </a:r>
+              <a:t>A repository can be created locally (i.e. on your laptop or desktop) or remotely (on GitHub or Dev Ops).</a:t>
+            </a:r>
+          </a:p>
+          <a:p>
+            <a:pPr lvl="1"/>
+            <a:r>
+              <a:rPr lang="en-GB" dirty="0"/>
+              <a:t>Most of the work you do on a repository, i.e. developing your code, will be done within the </a:t>
+            </a:r>
+            <a:r>
+              <a:rPr lang="en-GB" b="1" dirty="0"/>
+              <a:t>local</a:t>
+            </a:r>
+            <a:r>
+              <a:rPr lang="en-GB" dirty="0"/>
+              <a:t> copy.</a:t>
+            </a:r>
+          </a:p>
+          <a:p>
+            <a:pPr lvl="1"/>
+            <a:r>
+              <a:rPr lang="en-GB" dirty="0"/>
+              <a:t>The </a:t>
+            </a:r>
+            <a:r>
+              <a:rPr lang="en-GB" b="1" dirty="0"/>
+              <a:t>remote</a:t>
+            </a:r>
+            <a:r>
+              <a:rPr lang="en-GB" dirty="0"/>
+              <a:t> repo is effectively your reliable back-up of your code and somewhere where collaborators can view and get access your code.</a:t>
+            </a:r>
+          </a:p>
+          <a:p>
+            <a:pPr lvl="1"/>
+            <a:r>
+              <a:rPr lang="en-GB" dirty="0"/>
+              <a:t>You’re only going to have a single </a:t>
+            </a:r>
+            <a:r>
+              <a:rPr lang="en-GB" b="1" dirty="0"/>
+              <a:t>remote</a:t>
+            </a:r>
+            <a:r>
+              <a:rPr lang="en-GB" dirty="0"/>
+              <a:t> copy of the repo, but you (and collaborators) can have multiple </a:t>
+            </a:r>
+            <a:r>
+              <a:rPr lang="en-GB" b="1" dirty="0"/>
+              <a:t>local</a:t>
+            </a:r>
+            <a:r>
+              <a:rPr lang="en-GB" dirty="0"/>
+              <a:t> copies.</a:t>
+            </a:r>
+          </a:p>
+          <a:p>
+            <a:pPr lvl="1"/>
+            <a:r>
+              <a:rPr lang="en-GB" dirty="0"/>
+              <a:t>Syncing back and forth between the </a:t>
+            </a:r>
+            <a:r>
+              <a:rPr lang="en-GB" b="1" dirty="0"/>
+              <a:t>remote</a:t>
+            </a:r>
+            <a:r>
+              <a:rPr lang="en-GB" dirty="0"/>
+              <a:t> and </a:t>
+            </a:r>
+            <a:r>
+              <a:rPr lang="en-GB" b="1" dirty="0"/>
+              <a:t>local</a:t>
+            </a:r>
+            <a:r>
+              <a:rPr lang="en-GB" dirty="0"/>
+              <a:t> copies of a repo is done by </a:t>
+            </a:r>
+            <a:r>
+              <a:rPr lang="en-GB" b="1" dirty="0"/>
+              <a:t>Pushing </a:t>
+            </a:r>
+            <a:r>
+              <a:rPr lang="en-GB" dirty="0"/>
+              <a:t>(local to remote) and </a:t>
+            </a:r>
+            <a:r>
+              <a:rPr lang="en-GB" b="1" dirty="0"/>
+              <a:t>Pulling</a:t>
+            </a:r>
+            <a:r>
+              <a:rPr lang="en-GB" dirty="0"/>
+              <a:t> (remote to local).</a:t>
+            </a:r>
+          </a:p>
+          <a:p>
+            <a:r>
+              <a:rPr lang="en-GB" dirty="0"/>
+              <a:t>Recording the changes in your repo is performed using </a:t>
+            </a:r>
+            <a:r>
+              <a:rPr lang="en-GB" b="1" dirty="0"/>
+              <a:t>commits.</a:t>
+            </a:r>
+          </a:p>
+          <a:p>
+            <a:pPr lvl="1"/>
+            <a:r>
+              <a:rPr lang="en-GB" b="1" dirty="0"/>
+              <a:t>Commits</a:t>
+            </a:r>
+            <a:r>
+              <a:rPr lang="en-GB" dirty="0"/>
+              <a:t> record the current state of the repo to log files.</a:t>
+            </a:r>
+          </a:p>
+          <a:p>
+            <a:pPr lvl="1"/>
+            <a:r>
+              <a:rPr lang="en-GB" b="1" dirty="0"/>
+              <a:t>Commits </a:t>
+            </a:r>
+            <a:r>
+              <a:rPr lang="en-GB" dirty="0"/>
+              <a:t>should be made regularly (think of them as being like saving a file in Word – once saved, you’re less likely to lose your progress).</a:t>
+            </a:r>
+          </a:p>
+          <a:p>
+            <a:pPr lvl="1"/>
+            <a:r>
+              <a:rPr lang="en-GB" b="1" dirty="0"/>
+              <a:t>Commits</a:t>
+            </a:r>
+            <a:r>
+              <a:rPr lang="en-GB" dirty="0"/>
+              <a:t> by themselves </a:t>
+            </a:r>
+            <a:r>
+              <a:rPr lang="en-GB" i="1" dirty="0"/>
+              <a:t>do not</a:t>
+            </a:r>
+            <a:r>
+              <a:rPr lang="en-GB" dirty="0"/>
+              <a:t> log changes to the remote or other local repos, only the on that you’re working on.</a:t>
+            </a:r>
+          </a:p>
+          <a:p>
+            <a:pPr lvl="1"/>
+            <a:r>
+              <a:rPr lang="en-GB" dirty="0"/>
+              <a:t>After making a </a:t>
+            </a:r>
+            <a:r>
+              <a:rPr lang="en-GB" b="1" dirty="0"/>
+              <a:t>commit</a:t>
+            </a:r>
+            <a:r>
+              <a:rPr lang="en-GB" dirty="0"/>
+              <a:t>, it’s often worth making a Push to the remote so everything’s backed up.</a:t>
+            </a:r>
+          </a:p>
+          <a:p>
+            <a:pPr lvl="1"/>
+            <a:r>
+              <a:rPr lang="en-GB" dirty="0"/>
+              <a:t>You can undo changes by </a:t>
+            </a:r>
+            <a:r>
+              <a:rPr lang="en-GB" dirty="0" err="1"/>
+              <a:t>reseting</a:t>
+            </a:r>
+            <a:r>
+              <a:rPr lang="en-GB" dirty="0"/>
+              <a:t> to older </a:t>
+            </a:r>
+            <a:r>
+              <a:rPr lang="en-GB" b="1" dirty="0"/>
+              <a:t>commits</a:t>
+            </a:r>
+            <a:r>
+              <a:rPr lang="en-GB" dirty="0"/>
+              <a:t>.</a:t>
+            </a:r>
+          </a:p>
+          <a:p>
+            <a:pPr lvl="1"/>
+            <a:endParaRPr lang="en-GB" dirty="0"/>
+          </a:p>
+          <a:p>
+            <a:endParaRPr lang="en-GB" dirty="0"/>
           </a:p>
         </p:txBody>
       </p:sp>
     </p:spTree>
     <p:extLst>
       <p:ext uri="{BB962C8B-B14F-4D97-AF65-F5344CB8AC3E}">
-        <p14:creationId xmlns:p14="http://schemas.microsoft.com/office/powerpoint/2010/main" val="1058510910"/>
+        <p14:creationId xmlns:p14="http://schemas.microsoft.com/office/powerpoint/2010/main" val="3408809189"/>
       </p:ext>
     </p:extLst>
   </p:cSld>
@@ -6098,6 +6642,232 @@
     <p:extLst>
       <p:ext uri="{BB962C8B-B14F-4D97-AF65-F5344CB8AC3E}">
         <p14:creationId xmlns:p14="http://schemas.microsoft.com/office/powerpoint/2010/main" val="3561758237"/>
+      </p:ext>
+    </p:extLst>
+  </p:cSld>
+  <p:clrMapOvr>
+    <a:masterClrMapping/>
+  </p:clrMapOvr>
+</p:sld>
+</file>
+
+<file path=ppt/slides/slide20.xml><?xml version="1.0" encoding="utf-8"?>
+<p:sld xmlns:a="http://schemas.openxmlformats.org/drawingml/2006/main" xmlns:r="http://schemas.openxmlformats.org/officeDocument/2006/relationships" xmlns:p="http://schemas.openxmlformats.org/presentationml/2006/main">
+  <p:cSld>
+    <p:spTree>
+      <p:nvGrpSpPr>
+        <p:cNvPr id="1" name=""/>
+        <p:cNvGrpSpPr/>
+        <p:nvPr/>
+      </p:nvGrpSpPr>
+      <p:grpSpPr>
+        <a:xfrm>
+          <a:off x="0" y="0"/>
+          <a:ext cx="0" cy="0"/>
+          <a:chOff x="0" y="0"/>
+          <a:chExt cx="0" cy="0"/>
+        </a:xfrm>
+      </p:grpSpPr>
+      <p:sp>
+        <p:nvSpPr>
+          <p:cNvPr id="2" name="Title 1">
+            <a:extLst>
+              <a:ext uri="{FF2B5EF4-FFF2-40B4-BE49-F238E27FC236}">
+                <a16:creationId xmlns:a16="http://schemas.microsoft.com/office/drawing/2014/main" id="{3E411BA7-F591-20D1-EC9E-57C67251B6A2}"/>
+              </a:ext>
+            </a:extLst>
+          </p:cNvPr>
+          <p:cNvSpPr>
+            <a:spLocks noGrp="1"/>
+          </p:cNvSpPr>
+          <p:nvPr>
+            <p:ph type="title"/>
+          </p:nvPr>
+        </p:nvSpPr>
+        <p:spPr/>
+        <p:txBody>
+          <a:bodyPr/>
+          <a:lstStyle/>
+          <a:p>
+            <a:r>
+              <a:rPr lang="en-GB" dirty="0"/>
+              <a:t>How to work with git</a:t>
+            </a:r>
+          </a:p>
+        </p:txBody>
+      </p:sp>
+      <p:sp>
+        <p:nvSpPr>
+          <p:cNvPr id="3" name="Content Placeholder 2">
+            <a:extLst>
+              <a:ext uri="{FF2B5EF4-FFF2-40B4-BE49-F238E27FC236}">
+                <a16:creationId xmlns:a16="http://schemas.microsoft.com/office/drawing/2014/main" id="{2B695AAE-60D2-925A-54AB-8A450E57F129}"/>
+              </a:ext>
+            </a:extLst>
+          </p:cNvPr>
+          <p:cNvSpPr>
+            <a:spLocks noGrp="1"/>
+          </p:cNvSpPr>
+          <p:nvPr>
+            <p:ph idx="1"/>
+          </p:nvPr>
+        </p:nvSpPr>
+        <p:spPr/>
+        <p:txBody>
+          <a:bodyPr/>
+          <a:lstStyle/>
+          <a:p>
+            <a:r>
+              <a:rPr lang="en-GB" dirty="0"/>
+              <a:t>You’ll likely have two main ways you might work with git on your DfE laptop:</a:t>
+            </a:r>
+          </a:p>
+          <a:p>
+            <a:pPr lvl="1"/>
+            <a:r>
+              <a:rPr lang="en-GB" dirty="0"/>
+              <a:t>Git BASH terminal:</a:t>
+            </a:r>
+          </a:p>
+          <a:p>
+            <a:pPr lvl="2"/>
+            <a:r>
+              <a:rPr lang="en-GB" dirty="0"/>
+              <a:t>text driven</a:t>
+            </a:r>
+          </a:p>
+          <a:p>
+            <a:pPr lvl="2"/>
+            <a:r>
+              <a:rPr lang="en-GB" dirty="0"/>
+              <a:t>Offers the full range of git commands</a:t>
+            </a:r>
+          </a:p>
+          <a:p>
+            <a:pPr lvl="1"/>
+            <a:r>
+              <a:rPr lang="en-GB" dirty="0"/>
+              <a:t>R-Studio git interface</a:t>
+            </a:r>
+          </a:p>
+          <a:p>
+            <a:pPr lvl="2"/>
+            <a:r>
+              <a:rPr lang="en-GB" dirty="0"/>
+              <a:t>graphical user interface</a:t>
+            </a:r>
+          </a:p>
+          <a:p>
+            <a:pPr lvl="2"/>
+            <a:r>
+              <a:rPr lang="en-GB" dirty="0"/>
+              <a:t>Generally limited to commands around committing, pushing and pulling and viewing the history.</a:t>
+            </a:r>
+          </a:p>
+        </p:txBody>
+      </p:sp>
+    </p:spTree>
+    <p:extLst>
+      <p:ext uri="{BB962C8B-B14F-4D97-AF65-F5344CB8AC3E}">
+        <p14:creationId xmlns:p14="http://schemas.microsoft.com/office/powerpoint/2010/main" val="1830327008"/>
+      </p:ext>
+    </p:extLst>
+  </p:cSld>
+  <p:clrMapOvr>
+    <a:masterClrMapping/>
+  </p:clrMapOvr>
+</p:sld>
+</file>
+
+<file path=ppt/slides/slide21.xml><?xml version="1.0" encoding="utf-8"?>
+<p:sld xmlns:a="http://schemas.openxmlformats.org/drawingml/2006/main" xmlns:r="http://schemas.openxmlformats.org/officeDocument/2006/relationships" xmlns:p="http://schemas.openxmlformats.org/presentationml/2006/main">
+  <p:cSld>
+    <p:spTree>
+      <p:nvGrpSpPr>
+        <p:cNvPr id="1" name=""/>
+        <p:cNvGrpSpPr/>
+        <p:nvPr/>
+      </p:nvGrpSpPr>
+      <p:grpSpPr>
+        <a:xfrm>
+          <a:off x="0" y="0"/>
+          <a:ext cx="0" cy="0"/>
+          <a:chOff x="0" y="0"/>
+          <a:chExt cx="0" cy="0"/>
+        </a:xfrm>
+      </p:grpSpPr>
+      <p:sp>
+        <p:nvSpPr>
+          <p:cNvPr id="2" name="Title 1">
+            <a:extLst>
+              <a:ext uri="{FF2B5EF4-FFF2-40B4-BE49-F238E27FC236}">
+                <a16:creationId xmlns:a16="http://schemas.microsoft.com/office/drawing/2014/main" id="{8431DC89-E69D-6C7F-3D17-A950A45DB015}"/>
+              </a:ext>
+            </a:extLst>
+          </p:cNvPr>
+          <p:cNvSpPr>
+            <a:spLocks noGrp="1"/>
+          </p:cNvSpPr>
+          <p:nvPr>
+            <p:ph type="title"/>
+          </p:nvPr>
+        </p:nvSpPr>
+        <p:spPr/>
+        <p:txBody>
+          <a:bodyPr/>
+          <a:lstStyle/>
+          <a:p>
+            <a:r>
+              <a:rPr lang="en-GB" dirty="0"/>
+              <a:t>Start working with git</a:t>
+            </a:r>
+          </a:p>
+        </p:txBody>
+      </p:sp>
+      <p:sp>
+        <p:nvSpPr>
+          <p:cNvPr id="3" name="Content Placeholder 2">
+            <a:extLst>
+              <a:ext uri="{FF2B5EF4-FFF2-40B4-BE49-F238E27FC236}">
+                <a16:creationId xmlns:a16="http://schemas.microsoft.com/office/drawing/2014/main" id="{1133EE65-1383-3856-4034-0F8270D6284E}"/>
+              </a:ext>
+            </a:extLst>
+          </p:cNvPr>
+          <p:cNvSpPr>
+            <a:spLocks noGrp="1"/>
+          </p:cNvSpPr>
+          <p:nvPr>
+            <p:ph idx="1"/>
+          </p:nvPr>
+        </p:nvSpPr>
+        <p:spPr/>
+        <p:txBody>
+          <a:bodyPr/>
+          <a:lstStyle/>
+          <a:p>
+            <a:r>
+              <a:rPr lang="en-GB" dirty="0"/>
+              <a:t>Get in to working groups of about 3</a:t>
+            </a:r>
+          </a:p>
+          <a:p>
+            <a:r>
+              <a:rPr lang="en-GB" dirty="0"/>
+              <a:t>Go to the Setting up the repository section of the pdf and start working through the walkthrough…</a:t>
+            </a:r>
+          </a:p>
+          <a:p>
+            <a:r>
+              <a:rPr lang="en-GB" dirty="0"/>
+              <a:t>Ask questions!</a:t>
+            </a:r>
+          </a:p>
+        </p:txBody>
+      </p:sp>
+    </p:spTree>
+    <p:extLst>
+      <p:ext uri="{BB962C8B-B14F-4D97-AF65-F5344CB8AC3E}">
+        <p14:creationId xmlns:p14="http://schemas.microsoft.com/office/powerpoint/2010/main" val="1058510910"/>
       </p:ext>
     </p:extLst>
   </p:cSld>

</xml_diff>

<commit_message>
Added in navigating commits and undoing changes
</commit_message>
<xml_diff>
--- a/slides/workshopslides_quick-git.pptx
+++ b/slides/workshopslides_quick-git.pptx
@@ -20,15 +20,21 @@
     <p:sldId id="274" r:id="rId14"/>
     <p:sldId id="275" r:id="rId15"/>
     <p:sldId id="276" r:id="rId16"/>
-    <p:sldId id="279" r:id="rId17"/>
-    <p:sldId id="270" r:id="rId18"/>
-    <p:sldId id="280" r:id="rId19"/>
-    <p:sldId id="278" r:id="rId20"/>
-    <p:sldId id="281" r:id="rId21"/>
-    <p:sldId id="277" r:id="rId22"/>
-    <p:sldId id="282" r:id="rId23"/>
-    <p:sldId id="283" r:id="rId24"/>
-    <p:sldId id="284" r:id="rId25"/>
+    <p:sldId id="285" r:id="rId17"/>
+    <p:sldId id="287" r:id="rId18"/>
+    <p:sldId id="288" r:id="rId19"/>
+    <p:sldId id="289" r:id="rId20"/>
+    <p:sldId id="291" r:id="rId21"/>
+    <p:sldId id="286" r:id="rId22"/>
+    <p:sldId id="279" r:id="rId23"/>
+    <p:sldId id="270" r:id="rId24"/>
+    <p:sldId id="280" r:id="rId25"/>
+    <p:sldId id="278" r:id="rId26"/>
+    <p:sldId id="281" r:id="rId27"/>
+    <p:sldId id="277" r:id="rId28"/>
+    <p:sldId id="282" r:id="rId29"/>
+    <p:sldId id="283" r:id="rId30"/>
+    <p:sldId id="284" r:id="rId31"/>
   </p:sldIdLst>
   <p:sldSz cx="12192000" cy="6858000"/>
   <p:notesSz cx="6858000" cy="9144000"/>
@@ -155,6 +161,12 @@
             <p14:sldId id="274"/>
             <p14:sldId id="275"/>
             <p14:sldId id="276"/>
+            <p14:sldId id="285"/>
+            <p14:sldId id="287"/>
+            <p14:sldId id="288"/>
+            <p14:sldId id="289"/>
+            <p14:sldId id="291"/>
+            <p14:sldId id="286"/>
           </p14:sldIdLst>
         </p14:section>
         <p14:section name="IRL" id="{3084BC28-3028-45B7-BD36-4578B14C9F45}">
@@ -379,7 +391,7 @@
           <a:p>
             <a:fld id="{7E3A1397-DDBE-4990-A86F-207B0B9A1F2C}" type="datetimeFigureOut">
               <a:rPr lang="en-GB" smtClean="0"/>
-              <a:t>19/09/2023</a:t>
+              <a:t>20/09/2023</a:t>
             </a:fld>
             <a:endParaRPr lang="en-GB"/>
           </a:p>
@@ -603,7 +615,7 @@
           <a:p>
             <a:fld id="{7E3A1397-DDBE-4990-A86F-207B0B9A1F2C}" type="datetimeFigureOut">
               <a:rPr lang="en-GB" smtClean="0"/>
-              <a:t>19/09/2023</a:t>
+              <a:t>20/09/2023</a:t>
             </a:fld>
             <a:endParaRPr lang="en-GB"/>
           </a:p>
@@ -783,7 +795,7 @@
           <a:p>
             <a:fld id="{7E3A1397-DDBE-4990-A86F-207B0B9A1F2C}" type="datetimeFigureOut">
               <a:rPr lang="en-GB" smtClean="0"/>
-              <a:t>19/09/2023</a:t>
+              <a:t>20/09/2023</a:t>
             </a:fld>
             <a:endParaRPr lang="en-GB"/>
           </a:p>
@@ -953,7 +965,7 @@
           <a:p>
             <a:fld id="{7E3A1397-DDBE-4990-A86F-207B0B9A1F2C}" type="datetimeFigureOut">
               <a:rPr lang="en-GB" smtClean="0"/>
-              <a:t>19/09/2023</a:t>
+              <a:t>20/09/2023</a:t>
             </a:fld>
             <a:endParaRPr lang="en-GB"/>
           </a:p>
@@ -1244,7 +1256,7 @@
           <a:p>
             <a:fld id="{7E3A1397-DDBE-4990-A86F-207B0B9A1F2C}" type="datetimeFigureOut">
               <a:rPr lang="en-GB" smtClean="0"/>
-              <a:t>19/09/2023</a:t>
+              <a:t>20/09/2023</a:t>
             </a:fld>
             <a:endParaRPr lang="en-GB"/>
           </a:p>
@@ -1570,7 +1582,7 @@
           <a:p>
             <a:fld id="{7E3A1397-DDBE-4990-A86F-207B0B9A1F2C}" type="datetimeFigureOut">
               <a:rPr lang="en-GB" smtClean="0"/>
-              <a:t>19/09/2023</a:t>
+              <a:t>20/09/2023</a:t>
             </a:fld>
             <a:endParaRPr lang="en-GB"/>
           </a:p>
@@ -1982,7 +1994,7 @@
           <a:p>
             <a:fld id="{7E3A1397-DDBE-4990-A86F-207B0B9A1F2C}" type="datetimeFigureOut">
               <a:rPr lang="en-GB" smtClean="0"/>
-              <a:t>19/09/2023</a:t>
+              <a:t>20/09/2023</a:t>
             </a:fld>
             <a:endParaRPr lang="en-GB"/>
           </a:p>
@@ -2100,7 +2112,7 @@
           <a:p>
             <a:fld id="{7E3A1397-DDBE-4990-A86F-207B0B9A1F2C}" type="datetimeFigureOut">
               <a:rPr lang="en-GB" smtClean="0"/>
-              <a:t>19/09/2023</a:t>
+              <a:t>20/09/2023</a:t>
             </a:fld>
             <a:endParaRPr lang="en-GB"/>
           </a:p>
@@ -2195,7 +2207,7 @@
           <a:p>
             <a:fld id="{7E3A1397-DDBE-4990-A86F-207B0B9A1F2C}" type="datetimeFigureOut">
               <a:rPr lang="en-GB" smtClean="0"/>
-              <a:t>19/09/2023</a:t>
+              <a:t>20/09/2023</a:t>
             </a:fld>
             <a:endParaRPr lang="en-GB"/>
           </a:p>
@@ -2482,7 +2494,7 @@
           <a:p>
             <a:fld id="{7E3A1397-DDBE-4990-A86F-207B0B9A1F2C}" type="datetimeFigureOut">
               <a:rPr lang="en-GB" smtClean="0"/>
-              <a:t>19/09/2023</a:t>
+              <a:t>20/09/2023</a:t>
             </a:fld>
             <a:endParaRPr lang="en-GB"/>
           </a:p>
@@ -2759,7 +2771,7 @@
           <a:p>
             <a:fld id="{7E3A1397-DDBE-4990-A86F-207B0B9A1F2C}" type="datetimeFigureOut">
               <a:rPr lang="en-GB" smtClean="0"/>
-              <a:t>19/09/2023</a:t>
+              <a:t>20/09/2023</a:t>
             </a:fld>
             <a:endParaRPr lang="en-GB"/>
           </a:p>
@@ -3010,7 +3022,7 @@
           <a:p>
             <a:fld id="{7E3A1397-DDBE-4990-A86F-207B0B9A1F2C}" type="datetimeFigureOut">
               <a:rPr lang="en-GB" smtClean="0"/>
-              <a:t>19/09/2023</a:t>
+              <a:t>20/09/2023</a:t>
             </a:fld>
             <a:endParaRPr lang="en-GB"/>
           </a:p>
@@ -3541,7 +3553,7 @@
             </a:br>
             <a:r>
               <a:rPr lang="en-GB" dirty="0"/>
-              <a:t>A quick intro to git</a:t>
+              <a:t>A quick intro to Git</a:t>
             </a:r>
           </a:p>
         </p:txBody>
@@ -5755,6 +5767,2540 @@
           <p:cNvPr id="2" name="Title 1">
             <a:extLst>
               <a:ext uri="{FF2B5EF4-FFF2-40B4-BE49-F238E27FC236}">
+                <a16:creationId xmlns:a16="http://schemas.microsoft.com/office/drawing/2014/main" id="{D047F8EF-BECC-CB05-2042-8E1A2F6D1C1A}"/>
+              </a:ext>
+            </a:extLst>
+          </p:cNvPr>
+          <p:cNvSpPr>
+            <a:spLocks noGrp="1"/>
+          </p:cNvSpPr>
+          <p:nvPr>
+            <p:ph type="title"/>
+          </p:nvPr>
+        </p:nvSpPr>
+        <p:spPr>
+          <a:xfrm>
+            <a:off x="643831" y="640080"/>
+            <a:ext cx="3690425" cy="1325562"/>
+          </a:xfrm>
+        </p:spPr>
+        <p:txBody>
+          <a:bodyPr>
+            <a:normAutofit/>
+          </a:bodyPr>
+          <a:lstStyle/>
+          <a:p>
+            <a:r>
+              <a:rPr lang="en-GB" sz="3200" dirty="0"/>
+              <a:t>Navigating around commits</a:t>
+            </a:r>
+          </a:p>
+        </p:txBody>
+      </p:sp>
+      <p:sp>
+        <p:nvSpPr>
+          <p:cNvPr id="3" name="Content Placeholder 2">
+            <a:extLst>
+              <a:ext uri="{FF2B5EF4-FFF2-40B4-BE49-F238E27FC236}">
+                <a16:creationId xmlns:a16="http://schemas.microsoft.com/office/drawing/2014/main" id="{476F0551-B6E7-9358-79EA-9B20DDC8DAF3}"/>
+              </a:ext>
+            </a:extLst>
+          </p:cNvPr>
+          <p:cNvSpPr>
+            <a:spLocks noGrp="1"/>
+          </p:cNvSpPr>
+          <p:nvPr>
+            <p:ph idx="1"/>
+          </p:nvPr>
+        </p:nvSpPr>
+        <p:spPr>
+          <a:xfrm>
+            <a:off x="643831" y="1936955"/>
+            <a:ext cx="3690425" cy="4243182"/>
+          </a:xfrm>
+        </p:spPr>
+        <p:txBody>
+          <a:bodyPr>
+            <a:normAutofit/>
+          </a:bodyPr>
+          <a:lstStyle/>
+          <a:p>
+            <a:r>
+              <a:rPr lang="en-GB" sz="1600" dirty="0"/>
+              <a:t>Try working through tasks 5-7 quickly:</a:t>
+            </a:r>
+          </a:p>
+          <a:p>
+            <a:pPr lvl="1"/>
+            <a:r>
+              <a:rPr lang="en-GB" sz="1400" dirty="0"/>
+              <a:t>Task 5 (rampup1) - “Detach </a:t>
+            </a:r>
+            <a:r>
+              <a:rPr lang="en-GB" sz="1400" dirty="0" err="1"/>
+              <a:t>yo</a:t>
+            </a:r>
+            <a:r>
+              <a:rPr lang="en-GB" sz="1400" dirty="0"/>
+              <a:t>’ HEAD”</a:t>
+            </a:r>
+            <a:endParaRPr lang="en-GB" dirty="0"/>
+          </a:p>
+        </p:txBody>
+      </p:sp>
+      <p:pic>
+        <p:nvPicPr>
+          <p:cNvPr id="5" name="Picture 4">
+            <a:extLst>
+              <a:ext uri="{FF2B5EF4-FFF2-40B4-BE49-F238E27FC236}">
+                <a16:creationId xmlns:a16="http://schemas.microsoft.com/office/drawing/2014/main" id="{685F5EBE-F77B-5283-ADF8-524FA77773C4}"/>
+              </a:ext>
+            </a:extLst>
+          </p:cNvPr>
+          <p:cNvPicPr>
+            <a:picLocks noChangeAspect="1"/>
+          </p:cNvPicPr>
+          <p:nvPr/>
+        </p:nvPicPr>
+        <p:blipFill>
+          <a:blip r:embed="rId2">
+            <a:extLst>
+              <a:ext uri="{28A0092B-C50C-407E-A947-70E740481C1C}">
+                <a14:useLocalDpi xmlns:a14="http://schemas.microsoft.com/office/drawing/2010/main" val="0"/>
+              </a:ext>
+            </a:extLst>
+          </a:blip>
+          <a:srcRect/>
+          <a:stretch/>
+        </p:blipFill>
+        <p:spPr>
+          <a:xfrm>
+            <a:off x="4878778" y="1267220"/>
+            <a:ext cx="5706771" cy="4333818"/>
+          </a:xfrm>
+          <a:prstGeom prst="rect">
+            <a:avLst/>
+          </a:prstGeom>
+        </p:spPr>
+      </p:pic>
+      <p:pic>
+        <p:nvPicPr>
+          <p:cNvPr id="7" name="Picture 6">
+            <a:extLst>
+              <a:ext uri="{FF2B5EF4-FFF2-40B4-BE49-F238E27FC236}">
+                <a16:creationId xmlns:a16="http://schemas.microsoft.com/office/drawing/2014/main" id="{2BCF6774-B92C-7836-786A-79A8C0612D8B}"/>
+              </a:ext>
+            </a:extLst>
+          </p:cNvPr>
+          <p:cNvPicPr>
+            <a:picLocks noChangeAspect="1"/>
+          </p:cNvPicPr>
+          <p:nvPr/>
+        </p:nvPicPr>
+        <p:blipFill>
+          <a:blip r:embed="rId3">
+            <a:extLst>
+              <a:ext uri="{28A0092B-C50C-407E-A947-70E740481C1C}">
+                <a14:useLocalDpi xmlns:a14="http://schemas.microsoft.com/office/drawing/2010/main" val="0"/>
+              </a:ext>
+            </a:extLst>
+          </a:blip>
+          <a:srcRect/>
+          <a:stretch/>
+        </p:blipFill>
+        <p:spPr>
+          <a:xfrm>
+            <a:off x="779896" y="3141567"/>
+            <a:ext cx="3214014" cy="1750792"/>
+          </a:xfrm>
+          <a:prstGeom prst="rect">
+            <a:avLst/>
+          </a:prstGeom>
+        </p:spPr>
+      </p:pic>
+    </p:spTree>
+    <p:extLst>
+      <p:ext uri="{BB962C8B-B14F-4D97-AF65-F5344CB8AC3E}">
+        <p14:creationId xmlns:p14="http://schemas.microsoft.com/office/powerpoint/2010/main" val="1414791164"/>
+      </p:ext>
+    </p:extLst>
+  </p:cSld>
+  <p:clrMapOvr>
+    <a:masterClrMapping/>
+  </p:clrMapOvr>
+  <p:timing>
+    <p:tnLst>
+      <p:par>
+        <p:cTn id="1" dur="indefinite" restart="never" nodeType="tmRoot">
+          <p:childTnLst>
+            <p:seq concurrent="1" nextAc="seek">
+              <p:cTn id="2" dur="indefinite" nodeType="mainSeq">
+                <p:childTnLst>
+                  <p:par>
+                    <p:cTn id="3" fill="hold">
+                      <p:stCondLst>
+                        <p:cond delay="indefinite"/>
+                      </p:stCondLst>
+                      <p:childTnLst>
+                        <p:par>
+                          <p:cTn id="4" fill="hold">
+                            <p:stCondLst>
+                              <p:cond delay="0"/>
+                            </p:stCondLst>
+                            <p:childTnLst>
+                              <p:par>
+                                <p:cTn id="5" presetID="26" presetClass="entr" presetSubtype="0" fill="hold" nodeType="clickEffect">
+                                  <p:stCondLst>
+                                    <p:cond delay="0"/>
+                                  </p:stCondLst>
+                                  <p:childTnLst>
+                                    <p:set>
+                                      <p:cBhvr>
+                                        <p:cTn id="6" dur="1" fill="hold">
+                                          <p:stCondLst>
+                                            <p:cond delay="0"/>
+                                          </p:stCondLst>
+                                        </p:cTn>
+                                        <p:tgtEl>
+                                          <p:spTgt spid="7"/>
+                                        </p:tgtEl>
+                                        <p:attrNameLst>
+                                          <p:attrName>style.visibility</p:attrName>
+                                        </p:attrNameLst>
+                                      </p:cBhvr>
+                                      <p:to>
+                                        <p:strVal val="visible"/>
+                                      </p:to>
+                                    </p:set>
+                                    <p:animEffect transition="in" filter="wipe(down)">
+                                      <p:cBhvr>
+                                        <p:cTn id="7" dur="580">
+                                          <p:stCondLst>
+                                            <p:cond delay="0"/>
+                                          </p:stCondLst>
+                                        </p:cTn>
+                                        <p:tgtEl>
+                                          <p:spTgt spid="7"/>
+                                        </p:tgtEl>
+                                      </p:cBhvr>
+                                    </p:animEffect>
+                                    <p:anim calcmode="lin" valueType="num">
+                                      <p:cBhvr>
+                                        <p:cTn id="8" dur="1822" tmFilter="0,0; 0.14,0.36; 0.43,0.73; 0.71,0.91; 1.0,1.0">
+                                          <p:stCondLst>
+                                            <p:cond delay="0"/>
+                                          </p:stCondLst>
+                                        </p:cTn>
+                                        <p:tgtEl>
+                                          <p:spTgt spid="7"/>
+                                        </p:tgtEl>
+                                        <p:attrNameLst>
+                                          <p:attrName>ppt_x</p:attrName>
+                                        </p:attrNameLst>
+                                      </p:cBhvr>
+                                      <p:tavLst>
+                                        <p:tav tm="0">
+                                          <p:val>
+                                            <p:strVal val="#ppt_x-0.25"/>
+                                          </p:val>
+                                        </p:tav>
+                                        <p:tav tm="100000">
+                                          <p:val>
+                                            <p:strVal val="#ppt_x"/>
+                                          </p:val>
+                                        </p:tav>
+                                      </p:tavLst>
+                                    </p:anim>
+                                    <p:anim calcmode="lin" valueType="num">
+                                      <p:cBhvr>
+                                        <p:cTn id="9" dur="664" tmFilter="0.0,0.0; 0.25,0.07; 0.50,0.2; 0.75,0.467; 1.0,1.0">
+                                          <p:stCondLst>
+                                            <p:cond delay="0"/>
+                                          </p:stCondLst>
+                                        </p:cTn>
+                                        <p:tgtEl>
+                                          <p:spTgt spid="7"/>
+                                        </p:tgtEl>
+                                        <p:attrNameLst>
+                                          <p:attrName>ppt_y</p:attrName>
+                                        </p:attrNameLst>
+                                      </p:cBhvr>
+                                      <p:tavLst>
+                                        <p:tav tm="0" fmla="#ppt_y-sin(pi*$)/3">
+                                          <p:val>
+                                            <p:fltVal val="0.5"/>
+                                          </p:val>
+                                        </p:tav>
+                                        <p:tav tm="100000">
+                                          <p:val>
+                                            <p:fltVal val="1"/>
+                                          </p:val>
+                                        </p:tav>
+                                      </p:tavLst>
+                                    </p:anim>
+                                    <p:anim calcmode="lin" valueType="num">
+                                      <p:cBhvr>
+                                        <p:cTn id="10" dur="664" tmFilter="0, 0; 0.125,0.2665; 0.25,0.4; 0.375,0.465; 0.5,0.5;  0.625,0.535; 0.75,0.6; 0.875,0.7335; 1,1">
+                                          <p:stCondLst>
+                                            <p:cond delay="664"/>
+                                          </p:stCondLst>
+                                        </p:cTn>
+                                        <p:tgtEl>
+                                          <p:spTgt spid="7"/>
+                                        </p:tgtEl>
+                                        <p:attrNameLst>
+                                          <p:attrName>ppt_y</p:attrName>
+                                        </p:attrNameLst>
+                                      </p:cBhvr>
+                                      <p:tavLst>
+                                        <p:tav tm="0" fmla="#ppt_y-sin(pi*$)/9">
+                                          <p:val>
+                                            <p:fltVal val="0"/>
+                                          </p:val>
+                                        </p:tav>
+                                        <p:tav tm="100000">
+                                          <p:val>
+                                            <p:fltVal val="1"/>
+                                          </p:val>
+                                        </p:tav>
+                                      </p:tavLst>
+                                    </p:anim>
+                                    <p:anim calcmode="lin" valueType="num">
+                                      <p:cBhvr>
+                                        <p:cTn id="11" dur="332" tmFilter="0, 0; 0.125,0.2665; 0.25,0.4; 0.375,0.465; 0.5,0.5;  0.625,0.535; 0.75,0.6; 0.875,0.7335; 1,1">
+                                          <p:stCondLst>
+                                            <p:cond delay="1324"/>
+                                          </p:stCondLst>
+                                        </p:cTn>
+                                        <p:tgtEl>
+                                          <p:spTgt spid="7"/>
+                                        </p:tgtEl>
+                                        <p:attrNameLst>
+                                          <p:attrName>ppt_y</p:attrName>
+                                        </p:attrNameLst>
+                                      </p:cBhvr>
+                                      <p:tavLst>
+                                        <p:tav tm="0" fmla="#ppt_y-sin(pi*$)/27">
+                                          <p:val>
+                                            <p:fltVal val="0"/>
+                                          </p:val>
+                                        </p:tav>
+                                        <p:tav tm="100000">
+                                          <p:val>
+                                            <p:fltVal val="1"/>
+                                          </p:val>
+                                        </p:tav>
+                                      </p:tavLst>
+                                    </p:anim>
+                                    <p:anim calcmode="lin" valueType="num">
+                                      <p:cBhvr>
+                                        <p:cTn id="12" dur="164" tmFilter="0, 0; 0.125,0.2665; 0.25,0.4; 0.375,0.465; 0.5,0.5;  0.625,0.535; 0.75,0.6; 0.875,0.7335; 1,1">
+                                          <p:stCondLst>
+                                            <p:cond delay="1656"/>
+                                          </p:stCondLst>
+                                        </p:cTn>
+                                        <p:tgtEl>
+                                          <p:spTgt spid="7"/>
+                                        </p:tgtEl>
+                                        <p:attrNameLst>
+                                          <p:attrName>ppt_y</p:attrName>
+                                        </p:attrNameLst>
+                                      </p:cBhvr>
+                                      <p:tavLst>
+                                        <p:tav tm="0" fmla="#ppt_y-sin(pi*$)/81">
+                                          <p:val>
+                                            <p:fltVal val="0"/>
+                                          </p:val>
+                                        </p:tav>
+                                        <p:tav tm="100000">
+                                          <p:val>
+                                            <p:fltVal val="1"/>
+                                          </p:val>
+                                        </p:tav>
+                                      </p:tavLst>
+                                    </p:anim>
+                                    <p:animScale>
+                                      <p:cBhvr>
+                                        <p:cTn id="13" dur="26">
+                                          <p:stCondLst>
+                                            <p:cond delay="650"/>
+                                          </p:stCondLst>
+                                        </p:cTn>
+                                        <p:tgtEl>
+                                          <p:spTgt spid="7"/>
+                                        </p:tgtEl>
+                                      </p:cBhvr>
+                                      <p:to x="100000" y="60000"/>
+                                    </p:animScale>
+                                    <p:animScale>
+                                      <p:cBhvr>
+                                        <p:cTn id="14" dur="166" decel="50000">
+                                          <p:stCondLst>
+                                            <p:cond delay="676"/>
+                                          </p:stCondLst>
+                                        </p:cTn>
+                                        <p:tgtEl>
+                                          <p:spTgt spid="7"/>
+                                        </p:tgtEl>
+                                      </p:cBhvr>
+                                      <p:to x="100000" y="100000"/>
+                                    </p:animScale>
+                                    <p:animScale>
+                                      <p:cBhvr>
+                                        <p:cTn id="15" dur="26">
+                                          <p:stCondLst>
+                                            <p:cond delay="1312"/>
+                                          </p:stCondLst>
+                                        </p:cTn>
+                                        <p:tgtEl>
+                                          <p:spTgt spid="7"/>
+                                        </p:tgtEl>
+                                      </p:cBhvr>
+                                      <p:to x="100000" y="80000"/>
+                                    </p:animScale>
+                                    <p:animScale>
+                                      <p:cBhvr>
+                                        <p:cTn id="16" dur="166" decel="50000">
+                                          <p:stCondLst>
+                                            <p:cond delay="1338"/>
+                                          </p:stCondLst>
+                                        </p:cTn>
+                                        <p:tgtEl>
+                                          <p:spTgt spid="7"/>
+                                        </p:tgtEl>
+                                      </p:cBhvr>
+                                      <p:to x="100000" y="100000"/>
+                                    </p:animScale>
+                                    <p:animScale>
+                                      <p:cBhvr>
+                                        <p:cTn id="17" dur="26">
+                                          <p:stCondLst>
+                                            <p:cond delay="1642"/>
+                                          </p:stCondLst>
+                                        </p:cTn>
+                                        <p:tgtEl>
+                                          <p:spTgt spid="7"/>
+                                        </p:tgtEl>
+                                      </p:cBhvr>
+                                      <p:to x="100000" y="90000"/>
+                                    </p:animScale>
+                                    <p:animScale>
+                                      <p:cBhvr>
+                                        <p:cTn id="18" dur="166" decel="50000">
+                                          <p:stCondLst>
+                                            <p:cond delay="1668"/>
+                                          </p:stCondLst>
+                                        </p:cTn>
+                                        <p:tgtEl>
+                                          <p:spTgt spid="7"/>
+                                        </p:tgtEl>
+                                      </p:cBhvr>
+                                      <p:to x="100000" y="100000"/>
+                                    </p:animScale>
+                                    <p:animScale>
+                                      <p:cBhvr>
+                                        <p:cTn id="19" dur="26">
+                                          <p:stCondLst>
+                                            <p:cond delay="1808"/>
+                                          </p:stCondLst>
+                                        </p:cTn>
+                                        <p:tgtEl>
+                                          <p:spTgt spid="7"/>
+                                        </p:tgtEl>
+                                      </p:cBhvr>
+                                      <p:to x="100000" y="95000"/>
+                                    </p:animScale>
+                                    <p:animScale>
+                                      <p:cBhvr>
+                                        <p:cTn id="20" dur="166" decel="50000">
+                                          <p:stCondLst>
+                                            <p:cond delay="1834"/>
+                                          </p:stCondLst>
+                                        </p:cTn>
+                                        <p:tgtEl>
+                                          <p:spTgt spid="7"/>
+                                        </p:tgtEl>
+                                      </p:cBhvr>
+                                      <p:to x="100000" y="100000"/>
+                                    </p:animScale>
+                                  </p:childTnLst>
+                                </p:cTn>
+                              </p:par>
+                            </p:childTnLst>
+                          </p:cTn>
+                        </p:par>
+                      </p:childTnLst>
+                    </p:cTn>
+                  </p:par>
+                </p:childTnLst>
+              </p:cTn>
+              <p:prevCondLst>
+                <p:cond evt="onPrev" delay="0">
+                  <p:tgtEl>
+                    <p:sldTgt/>
+                  </p:tgtEl>
+                </p:cond>
+              </p:prevCondLst>
+              <p:nextCondLst>
+                <p:cond evt="onNext" delay="0">
+                  <p:tgtEl>
+                    <p:sldTgt/>
+                  </p:tgtEl>
+                </p:cond>
+              </p:nextCondLst>
+            </p:seq>
+          </p:childTnLst>
+        </p:cTn>
+      </p:par>
+    </p:tnLst>
+  </p:timing>
+</p:sld>
+</file>
+
+<file path=ppt/slides/slide17.xml><?xml version="1.0" encoding="utf-8"?>
+<p:sld xmlns:a="http://schemas.openxmlformats.org/drawingml/2006/main" xmlns:r="http://schemas.openxmlformats.org/officeDocument/2006/relationships" xmlns:p="http://schemas.openxmlformats.org/presentationml/2006/main">
+  <p:cSld>
+    <p:spTree>
+      <p:nvGrpSpPr>
+        <p:cNvPr id="1" name=""/>
+        <p:cNvGrpSpPr/>
+        <p:nvPr/>
+      </p:nvGrpSpPr>
+      <p:grpSpPr>
+        <a:xfrm>
+          <a:off x="0" y="0"/>
+          <a:ext cx="0" cy="0"/>
+          <a:chOff x="0" y="0"/>
+          <a:chExt cx="0" cy="0"/>
+        </a:xfrm>
+      </p:grpSpPr>
+      <p:sp>
+        <p:nvSpPr>
+          <p:cNvPr id="2" name="Title 1">
+            <a:extLst>
+              <a:ext uri="{FF2B5EF4-FFF2-40B4-BE49-F238E27FC236}">
+                <a16:creationId xmlns:a16="http://schemas.microsoft.com/office/drawing/2014/main" id="{D047F8EF-BECC-CB05-2042-8E1A2F6D1C1A}"/>
+              </a:ext>
+            </a:extLst>
+          </p:cNvPr>
+          <p:cNvSpPr>
+            <a:spLocks noGrp="1"/>
+          </p:cNvSpPr>
+          <p:nvPr>
+            <p:ph type="title"/>
+          </p:nvPr>
+        </p:nvSpPr>
+        <p:spPr>
+          <a:xfrm>
+            <a:off x="643831" y="640080"/>
+            <a:ext cx="3690425" cy="1325562"/>
+          </a:xfrm>
+        </p:spPr>
+        <p:txBody>
+          <a:bodyPr>
+            <a:normAutofit/>
+          </a:bodyPr>
+          <a:lstStyle/>
+          <a:p>
+            <a:r>
+              <a:rPr lang="en-GB" sz="3200" dirty="0"/>
+              <a:t>Navigating around commits</a:t>
+            </a:r>
+          </a:p>
+        </p:txBody>
+      </p:sp>
+      <p:sp>
+        <p:nvSpPr>
+          <p:cNvPr id="3" name="Content Placeholder 2">
+            <a:extLst>
+              <a:ext uri="{FF2B5EF4-FFF2-40B4-BE49-F238E27FC236}">
+                <a16:creationId xmlns:a16="http://schemas.microsoft.com/office/drawing/2014/main" id="{476F0551-B6E7-9358-79EA-9B20DDC8DAF3}"/>
+              </a:ext>
+            </a:extLst>
+          </p:cNvPr>
+          <p:cNvSpPr>
+            <a:spLocks noGrp="1"/>
+          </p:cNvSpPr>
+          <p:nvPr>
+            <p:ph idx="1"/>
+          </p:nvPr>
+        </p:nvSpPr>
+        <p:spPr>
+          <a:xfrm>
+            <a:off x="643831" y="1936955"/>
+            <a:ext cx="3690425" cy="4243182"/>
+          </a:xfrm>
+        </p:spPr>
+        <p:txBody>
+          <a:bodyPr>
+            <a:normAutofit/>
+          </a:bodyPr>
+          <a:lstStyle/>
+          <a:p>
+            <a:r>
+              <a:rPr lang="en-GB" sz="1600" dirty="0"/>
+              <a:t>Try working through tasks 5-7 quickly:</a:t>
+            </a:r>
+          </a:p>
+          <a:p>
+            <a:pPr lvl="1"/>
+            <a:r>
+              <a:rPr lang="en-GB" sz="1400" dirty="0"/>
+              <a:t>Task 6 (rampup2) - “Relative Refs #1 (^)”</a:t>
+            </a:r>
+            <a:endParaRPr lang="en-GB" dirty="0"/>
+          </a:p>
+        </p:txBody>
+      </p:sp>
+      <p:pic>
+        <p:nvPicPr>
+          <p:cNvPr id="5" name="Picture 4">
+            <a:extLst>
+              <a:ext uri="{FF2B5EF4-FFF2-40B4-BE49-F238E27FC236}">
+                <a16:creationId xmlns:a16="http://schemas.microsoft.com/office/drawing/2014/main" id="{685F5EBE-F77B-5283-ADF8-524FA77773C4}"/>
+              </a:ext>
+            </a:extLst>
+          </p:cNvPr>
+          <p:cNvPicPr>
+            <a:picLocks noChangeAspect="1"/>
+          </p:cNvPicPr>
+          <p:nvPr/>
+        </p:nvPicPr>
+        <p:blipFill>
+          <a:blip r:embed="rId2">
+            <a:extLst>
+              <a:ext uri="{28A0092B-C50C-407E-A947-70E740481C1C}">
+                <a14:useLocalDpi xmlns:a14="http://schemas.microsoft.com/office/drawing/2010/main" val="0"/>
+              </a:ext>
+            </a:extLst>
+          </a:blip>
+          <a:srcRect/>
+          <a:stretch/>
+        </p:blipFill>
+        <p:spPr>
+          <a:xfrm>
+            <a:off x="5026830" y="1267220"/>
+            <a:ext cx="5410666" cy="4333818"/>
+          </a:xfrm>
+          <a:prstGeom prst="rect">
+            <a:avLst/>
+          </a:prstGeom>
+        </p:spPr>
+      </p:pic>
+      <p:pic>
+        <p:nvPicPr>
+          <p:cNvPr id="7" name="Picture 6">
+            <a:extLst>
+              <a:ext uri="{FF2B5EF4-FFF2-40B4-BE49-F238E27FC236}">
+                <a16:creationId xmlns:a16="http://schemas.microsoft.com/office/drawing/2014/main" id="{2BCF6774-B92C-7836-786A-79A8C0612D8B}"/>
+              </a:ext>
+            </a:extLst>
+          </p:cNvPr>
+          <p:cNvPicPr>
+            <a:picLocks noChangeAspect="1"/>
+          </p:cNvPicPr>
+          <p:nvPr/>
+        </p:nvPicPr>
+        <p:blipFill>
+          <a:blip r:embed="rId3">
+            <a:extLst>
+              <a:ext uri="{28A0092B-C50C-407E-A947-70E740481C1C}">
+                <a14:useLocalDpi xmlns:a14="http://schemas.microsoft.com/office/drawing/2010/main" val="0"/>
+              </a:ext>
+            </a:extLst>
+          </a:blip>
+          <a:srcRect/>
+          <a:stretch/>
+        </p:blipFill>
+        <p:spPr>
+          <a:xfrm>
+            <a:off x="779896" y="3202859"/>
+            <a:ext cx="3214014" cy="1628207"/>
+          </a:xfrm>
+          <a:prstGeom prst="rect">
+            <a:avLst/>
+          </a:prstGeom>
+        </p:spPr>
+      </p:pic>
+    </p:spTree>
+    <p:extLst>
+      <p:ext uri="{BB962C8B-B14F-4D97-AF65-F5344CB8AC3E}">
+        <p14:creationId xmlns:p14="http://schemas.microsoft.com/office/powerpoint/2010/main" val="705020633"/>
+      </p:ext>
+    </p:extLst>
+  </p:cSld>
+  <p:clrMapOvr>
+    <a:masterClrMapping/>
+  </p:clrMapOvr>
+  <p:timing>
+    <p:tnLst>
+      <p:par>
+        <p:cTn id="1" dur="indefinite" restart="never" nodeType="tmRoot">
+          <p:childTnLst>
+            <p:seq concurrent="1" nextAc="seek">
+              <p:cTn id="2" dur="indefinite" nodeType="mainSeq">
+                <p:childTnLst>
+                  <p:par>
+                    <p:cTn id="3" fill="hold">
+                      <p:stCondLst>
+                        <p:cond delay="indefinite"/>
+                      </p:stCondLst>
+                      <p:childTnLst>
+                        <p:par>
+                          <p:cTn id="4" fill="hold">
+                            <p:stCondLst>
+                              <p:cond delay="0"/>
+                            </p:stCondLst>
+                            <p:childTnLst>
+                              <p:par>
+                                <p:cTn id="5" presetID="26" presetClass="entr" presetSubtype="0" fill="hold" nodeType="clickEffect">
+                                  <p:stCondLst>
+                                    <p:cond delay="0"/>
+                                  </p:stCondLst>
+                                  <p:childTnLst>
+                                    <p:set>
+                                      <p:cBhvr>
+                                        <p:cTn id="6" dur="1" fill="hold">
+                                          <p:stCondLst>
+                                            <p:cond delay="0"/>
+                                          </p:stCondLst>
+                                        </p:cTn>
+                                        <p:tgtEl>
+                                          <p:spTgt spid="7"/>
+                                        </p:tgtEl>
+                                        <p:attrNameLst>
+                                          <p:attrName>style.visibility</p:attrName>
+                                        </p:attrNameLst>
+                                      </p:cBhvr>
+                                      <p:to>
+                                        <p:strVal val="visible"/>
+                                      </p:to>
+                                    </p:set>
+                                    <p:animEffect transition="in" filter="wipe(down)">
+                                      <p:cBhvr>
+                                        <p:cTn id="7" dur="580">
+                                          <p:stCondLst>
+                                            <p:cond delay="0"/>
+                                          </p:stCondLst>
+                                        </p:cTn>
+                                        <p:tgtEl>
+                                          <p:spTgt spid="7"/>
+                                        </p:tgtEl>
+                                      </p:cBhvr>
+                                    </p:animEffect>
+                                    <p:anim calcmode="lin" valueType="num">
+                                      <p:cBhvr>
+                                        <p:cTn id="8" dur="1822" tmFilter="0,0; 0.14,0.36; 0.43,0.73; 0.71,0.91; 1.0,1.0">
+                                          <p:stCondLst>
+                                            <p:cond delay="0"/>
+                                          </p:stCondLst>
+                                        </p:cTn>
+                                        <p:tgtEl>
+                                          <p:spTgt spid="7"/>
+                                        </p:tgtEl>
+                                        <p:attrNameLst>
+                                          <p:attrName>ppt_x</p:attrName>
+                                        </p:attrNameLst>
+                                      </p:cBhvr>
+                                      <p:tavLst>
+                                        <p:tav tm="0">
+                                          <p:val>
+                                            <p:strVal val="#ppt_x-0.25"/>
+                                          </p:val>
+                                        </p:tav>
+                                        <p:tav tm="100000">
+                                          <p:val>
+                                            <p:strVal val="#ppt_x"/>
+                                          </p:val>
+                                        </p:tav>
+                                      </p:tavLst>
+                                    </p:anim>
+                                    <p:anim calcmode="lin" valueType="num">
+                                      <p:cBhvr>
+                                        <p:cTn id="9" dur="664" tmFilter="0.0,0.0; 0.25,0.07; 0.50,0.2; 0.75,0.467; 1.0,1.0">
+                                          <p:stCondLst>
+                                            <p:cond delay="0"/>
+                                          </p:stCondLst>
+                                        </p:cTn>
+                                        <p:tgtEl>
+                                          <p:spTgt spid="7"/>
+                                        </p:tgtEl>
+                                        <p:attrNameLst>
+                                          <p:attrName>ppt_y</p:attrName>
+                                        </p:attrNameLst>
+                                      </p:cBhvr>
+                                      <p:tavLst>
+                                        <p:tav tm="0" fmla="#ppt_y-sin(pi*$)/3">
+                                          <p:val>
+                                            <p:fltVal val="0.5"/>
+                                          </p:val>
+                                        </p:tav>
+                                        <p:tav tm="100000">
+                                          <p:val>
+                                            <p:fltVal val="1"/>
+                                          </p:val>
+                                        </p:tav>
+                                      </p:tavLst>
+                                    </p:anim>
+                                    <p:anim calcmode="lin" valueType="num">
+                                      <p:cBhvr>
+                                        <p:cTn id="10" dur="664" tmFilter="0, 0; 0.125,0.2665; 0.25,0.4; 0.375,0.465; 0.5,0.5;  0.625,0.535; 0.75,0.6; 0.875,0.7335; 1,1">
+                                          <p:stCondLst>
+                                            <p:cond delay="664"/>
+                                          </p:stCondLst>
+                                        </p:cTn>
+                                        <p:tgtEl>
+                                          <p:spTgt spid="7"/>
+                                        </p:tgtEl>
+                                        <p:attrNameLst>
+                                          <p:attrName>ppt_y</p:attrName>
+                                        </p:attrNameLst>
+                                      </p:cBhvr>
+                                      <p:tavLst>
+                                        <p:tav tm="0" fmla="#ppt_y-sin(pi*$)/9">
+                                          <p:val>
+                                            <p:fltVal val="0"/>
+                                          </p:val>
+                                        </p:tav>
+                                        <p:tav tm="100000">
+                                          <p:val>
+                                            <p:fltVal val="1"/>
+                                          </p:val>
+                                        </p:tav>
+                                      </p:tavLst>
+                                    </p:anim>
+                                    <p:anim calcmode="lin" valueType="num">
+                                      <p:cBhvr>
+                                        <p:cTn id="11" dur="332" tmFilter="0, 0; 0.125,0.2665; 0.25,0.4; 0.375,0.465; 0.5,0.5;  0.625,0.535; 0.75,0.6; 0.875,0.7335; 1,1">
+                                          <p:stCondLst>
+                                            <p:cond delay="1324"/>
+                                          </p:stCondLst>
+                                        </p:cTn>
+                                        <p:tgtEl>
+                                          <p:spTgt spid="7"/>
+                                        </p:tgtEl>
+                                        <p:attrNameLst>
+                                          <p:attrName>ppt_y</p:attrName>
+                                        </p:attrNameLst>
+                                      </p:cBhvr>
+                                      <p:tavLst>
+                                        <p:tav tm="0" fmla="#ppt_y-sin(pi*$)/27">
+                                          <p:val>
+                                            <p:fltVal val="0"/>
+                                          </p:val>
+                                        </p:tav>
+                                        <p:tav tm="100000">
+                                          <p:val>
+                                            <p:fltVal val="1"/>
+                                          </p:val>
+                                        </p:tav>
+                                      </p:tavLst>
+                                    </p:anim>
+                                    <p:anim calcmode="lin" valueType="num">
+                                      <p:cBhvr>
+                                        <p:cTn id="12" dur="164" tmFilter="0, 0; 0.125,0.2665; 0.25,0.4; 0.375,0.465; 0.5,0.5;  0.625,0.535; 0.75,0.6; 0.875,0.7335; 1,1">
+                                          <p:stCondLst>
+                                            <p:cond delay="1656"/>
+                                          </p:stCondLst>
+                                        </p:cTn>
+                                        <p:tgtEl>
+                                          <p:spTgt spid="7"/>
+                                        </p:tgtEl>
+                                        <p:attrNameLst>
+                                          <p:attrName>ppt_y</p:attrName>
+                                        </p:attrNameLst>
+                                      </p:cBhvr>
+                                      <p:tavLst>
+                                        <p:tav tm="0" fmla="#ppt_y-sin(pi*$)/81">
+                                          <p:val>
+                                            <p:fltVal val="0"/>
+                                          </p:val>
+                                        </p:tav>
+                                        <p:tav tm="100000">
+                                          <p:val>
+                                            <p:fltVal val="1"/>
+                                          </p:val>
+                                        </p:tav>
+                                      </p:tavLst>
+                                    </p:anim>
+                                    <p:animScale>
+                                      <p:cBhvr>
+                                        <p:cTn id="13" dur="26">
+                                          <p:stCondLst>
+                                            <p:cond delay="650"/>
+                                          </p:stCondLst>
+                                        </p:cTn>
+                                        <p:tgtEl>
+                                          <p:spTgt spid="7"/>
+                                        </p:tgtEl>
+                                      </p:cBhvr>
+                                      <p:to x="100000" y="60000"/>
+                                    </p:animScale>
+                                    <p:animScale>
+                                      <p:cBhvr>
+                                        <p:cTn id="14" dur="166" decel="50000">
+                                          <p:stCondLst>
+                                            <p:cond delay="676"/>
+                                          </p:stCondLst>
+                                        </p:cTn>
+                                        <p:tgtEl>
+                                          <p:spTgt spid="7"/>
+                                        </p:tgtEl>
+                                      </p:cBhvr>
+                                      <p:to x="100000" y="100000"/>
+                                    </p:animScale>
+                                    <p:animScale>
+                                      <p:cBhvr>
+                                        <p:cTn id="15" dur="26">
+                                          <p:stCondLst>
+                                            <p:cond delay="1312"/>
+                                          </p:stCondLst>
+                                        </p:cTn>
+                                        <p:tgtEl>
+                                          <p:spTgt spid="7"/>
+                                        </p:tgtEl>
+                                      </p:cBhvr>
+                                      <p:to x="100000" y="80000"/>
+                                    </p:animScale>
+                                    <p:animScale>
+                                      <p:cBhvr>
+                                        <p:cTn id="16" dur="166" decel="50000">
+                                          <p:stCondLst>
+                                            <p:cond delay="1338"/>
+                                          </p:stCondLst>
+                                        </p:cTn>
+                                        <p:tgtEl>
+                                          <p:spTgt spid="7"/>
+                                        </p:tgtEl>
+                                      </p:cBhvr>
+                                      <p:to x="100000" y="100000"/>
+                                    </p:animScale>
+                                    <p:animScale>
+                                      <p:cBhvr>
+                                        <p:cTn id="17" dur="26">
+                                          <p:stCondLst>
+                                            <p:cond delay="1642"/>
+                                          </p:stCondLst>
+                                        </p:cTn>
+                                        <p:tgtEl>
+                                          <p:spTgt spid="7"/>
+                                        </p:tgtEl>
+                                      </p:cBhvr>
+                                      <p:to x="100000" y="90000"/>
+                                    </p:animScale>
+                                    <p:animScale>
+                                      <p:cBhvr>
+                                        <p:cTn id="18" dur="166" decel="50000">
+                                          <p:stCondLst>
+                                            <p:cond delay="1668"/>
+                                          </p:stCondLst>
+                                        </p:cTn>
+                                        <p:tgtEl>
+                                          <p:spTgt spid="7"/>
+                                        </p:tgtEl>
+                                      </p:cBhvr>
+                                      <p:to x="100000" y="100000"/>
+                                    </p:animScale>
+                                    <p:animScale>
+                                      <p:cBhvr>
+                                        <p:cTn id="19" dur="26">
+                                          <p:stCondLst>
+                                            <p:cond delay="1808"/>
+                                          </p:stCondLst>
+                                        </p:cTn>
+                                        <p:tgtEl>
+                                          <p:spTgt spid="7"/>
+                                        </p:tgtEl>
+                                      </p:cBhvr>
+                                      <p:to x="100000" y="95000"/>
+                                    </p:animScale>
+                                    <p:animScale>
+                                      <p:cBhvr>
+                                        <p:cTn id="20" dur="166" decel="50000">
+                                          <p:stCondLst>
+                                            <p:cond delay="1834"/>
+                                          </p:stCondLst>
+                                        </p:cTn>
+                                        <p:tgtEl>
+                                          <p:spTgt spid="7"/>
+                                        </p:tgtEl>
+                                      </p:cBhvr>
+                                      <p:to x="100000" y="100000"/>
+                                    </p:animScale>
+                                  </p:childTnLst>
+                                </p:cTn>
+                              </p:par>
+                            </p:childTnLst>
+                          </p:cTn>
+                        </p:par>
+                      </p:childTnLst>
+                    </p:cTn>
+                  </p:par>
+                </p:childTnLst>
+              </p:cTn>
+              <p:prevCondLst>
+                <p:cond evt="onPrev" delay="0">
+                  <p:tgtEl>
+                    <p:sldTgt/>
+                  </p:tgtEl>
+                </p:cond>
+              </p:prevCondLst>
+              <p:nextCondLst>
+                <p:cond evt="onNext" delay="0">
+                  <p:tgtEl>
+                    <p:sldTgt/>
+                  </p:tgtEl>
+                </p:cond>
+              </p:nextCondLst>
+            </p:seq>
+          </p:childTnLst>
+        </p:cTn>
+      </p:par>
+    </p:tnLst>
+  </p:timing>
+</p:sld>
+</file>
+
+<file path=ppt/slides/slide18.xml><?xml version="1.0" encoding="utf-8"?>
+<p:sld xmlns:a="http://schemas.openxmlformats.org/drawingml/2006/main" xmlns:r="http://schemas.openxmlformats.org/officeDocument/2006/relationships" xmlns:p="http://schemas.openxmlformats.org/presentationml/2006/main">
+  <p:cSld>
+    <p:spTree>
+      <p:nvGrpSpPr>
+        <p:cNvPr id="1" name=""/>
+        <p:cNvGrpSpPr/>
+        <p:nvPr/>
+      </p:nvGrpSpPr>
+      <p:grpSpPr>
+        <a:xfrm>
+          <a:off x="0" y="0"/>
+          <a:ext cx="0" cy="0"/>
+          <a:chOff x="0" y="0"/>
+          <a:chExt cx="0" cy="0"/>
+        </a:xfrm>
+      </p:grpSpPr>
+      <p:sp>
+        <p:nvSpPr>
+          <p:cNvPr id="2" name="Title 1">
+            <a:extLst>
+              <a:ext uri="{FF2B5EF4-FFF2-40B4-BE49-F238E27FC236}">
+                <a16:creationId xmlns:a16="http://schemas.microsoft.com/office/drawing/2014/main" id="{D047F8EF-BECC-CB05-2042-8E1A2F6D1C1A}"/>
+              </a:ext>
+            </a:extLst>
+          </p:cNvPr>
+          <p:cNvSpPr>
+            <a:spLocks noGrp="1"/>
+          </p:cNvSpPr>
+          <p:nvPr>
+            <p:ph type="title"/>
+          </p:nvPr>
+        </p:nvSpPr>
+        <p:spPr>
+          <a:xfrm>
+            <a:off x="643831" y="640080"/>
+            <a:ext cx="3690425" cy="1325562"/>
+          </a:xfrm>
+        </p:spPr>
+        <p:txBody>
+          <a:bodyPr>
+            <a:normAutofit/>
+          </a:bodyPr>
+          <a:lstStyle/>
+          <a:p>
+            <a:r>
+              <a:rPr lang="en-GB" sz="3200" dirty="0"/>
+              <a:t>Navigating around commits</a:t>
+            </a:r>
+          </a:p>
+        </p:txBody>
+      </p:sp>
+      <p:sp>
+        <p:nvSpPr>
+          <p:cNvPr id="3" name="Content Placeholder 2">
+            <a:extLst>
+              <a:ext uri="{FF2B5EF4-FFF2-40B4-BE49-F238E27FC236}">
+                <a16:creationId xmlns:a16="http://schemas.microsoft.com/office/drawing/2014/main" id="{476F0551-B6E7-9358-79EA-9B20DDC8DAF3}"/>
+              </a:ext>
+            </a:extLst>
+          </p:cNvPr>
+          <p:cNvSpPr>
+            <a:spLocks noGrp="1"/>
+          </p:cNvSpPr>
+          <p:nvPr>
+            <p:ph idx="1"/>
+          </p:nvPr>
+        </p:nvSpPr>
+        <p:spPr>
+          <a:xfrm>
+            <a:off x="643831" y="1936955"/>
+            <a:ext cx="3690425" cy="4243182"/>
+          </a:xfrm>
+        </p:spPr>
+        <p:txBody>
+          <a:bodyPr>
+            <a:normAutofit/>
+          </a:bodyPr>
+          <a:lstStyle/>
+          <a:p>
+            <a:r>
+              <a:rPr lang="en-GB" sz="1600" dirty="0"/>
+              <a:t>Try working through tasks 5-7 quickly:</a:t>
+            </a:r>
+          </a:p>
+          <a:p>
+            <a:pPr lvl="1"/>
+            <a:r>
+              <a:rPr lang="en-GB" sz="1400" dirty="0"/>
+              <a:t>Task 7 (rampup3) - “Relative Refs #2 (~)”</a:t>
+            </a:r>
+            <a:endParaRPr lang="en-GB" dirty="0"/>
+          </a:p>
+        </p:txBody>
+      </p:sp>
+      <p:pic>
+        <p:nvPicPr>
+          <p:cNvPr id="5" name="Picture 4">
+            <a:extLst>
+              <a:ext uri="{FF2B5EF4-FFF2-40B4-BE49-F238E27FC236}">
+                <a16:creationId xmlns:a16="http://schemas.microsoft.com/office/drawing/2014/main" id="{685F5EBE-F77B-5283-ADF8-524FA77773C4}"/>
+              </a:ext>
+            </a:extLst>
+          </p:cNvPr>
+          <p:cNvPicPr>
+            <a:picLocks noChangeAspect="1"/>
+          </p:cNvPicPr>
+          <p:nvPr/>
+        </p:nvPicPr>
+        <p:blipFill>
+          <a:blip r:embed="rId2">
+            <a:extLst>
+              <a:ext uri="{28A0092B-C50C-407E-A947-70E740481C1C}">
+                <a14:useLocalDpi xmlns:a14="http://schemas.microsoft.com/office/drawing/2010/main" val="0"/>
+              </a:ext>
+            </a:extLst>
+          </a:blip>
+          <a:srcRect/>
+          <a:stretch/>
+        </p:blipFill>
+        <p:spPr>
+          <a:xfrm>
+            <a:off x="5026830" y="1273142"/>
+            <a:ext cx="5410666" cy="4321974"/>
+          </a:xfrm>
+          <a:prstGeom prst="rect">
+            <a:avLst/>
+          </a:prstGeom>
+        </p:spPr>
+      </p:pic>
+      <p:pic>
+        <p:nvPicPr>
+          <p:cNvPr id="7" name="Picture 6">
+            <a:extLst>
+              <a:ext uri="{FF2B5EF4-FFF2-40B4-BE49-F238E27FC236}">
+                <a16:creationId xmlns:a16="http://schemas.microsoft.com/office/drawing/2014/main" id="{2BCF6774-B92C-7836-786A-79A8C0612D8B}"/>
+              </a:ext>
+            </a:extLst>
+          </p:cNvPr>
+          <p:cNvPicPr>
+            <a:picLocks noChangeAspect="1"/>
+          </p:cNvPicPr>
+          <p:nvPr/>
+        </p:nvPicPr>
+        <p:blipFill>
+          <a:blip r:embed="rId3">
+            <a:extLst>
+              <a:ext uri="{28A0092B-C50C-407E-A947-70E740481C1C}">
+                <a14:useLocalDpi xmlns:a14="http://schemas.microsoft.com/office/drawing/2010/main" val="0"/>
+              </a:ext>
+            </a:extLst>
+          </a:blip>
+          <a:srcRect/>
+          <a:stretch/>
+        </p:blipFill>
+        <p:spPr>
+          <a:xfrm>
+            <a:off x="1162517" y="3202859"/>
+            <a:ext cx="2448771" cy="1628207"/>
+          </a:xfrm>
+          <a:prstGeom prst="rect">
+            <a:avLst/>
+          </a:prstGeom>
+        </p:spPr>
+      </p:pic>
+    </p:spTree>
+    <p:extLst>
+      <p:ext uri="{BB962C8B-B14F-4D97-AF65-F5344CB8AC3E}">
+        <p14:creationId xmlns:p14="http://schemas.microsoft.com/office/powerpoint/2010/main" val="1336506100"/>
+      </p:ext>
+    </p:extLst>
+  </p:cSld>
+  <p:clrMapOvr>
+    <a:masterClrMapping/>
+  </p:clrMapOvr>
+  <p:timing>
+    <p:tnLst>
+      <p:par>
+        <p:cTn id="1" dur="indefinite" restart="never" nodeType="tmRoot">
+          <p:childTnLst>
+            <p:seq concurrent="1" nextAc="seek">
+              <p:cTn id="2" dur="indefinite" nodeType="mainSeq">
+                <p:childTnLst>
+                  <p:par>
+                    <p:cTn id="3" fill="hold">
+                      <p:stCondLst>
+                        <p:cond delay="indefinite"/>
+                      </p:stCondLst>
+                      <p:childTnLst>
+                        <p:par>
+                          <p:cTn id="4" fill="hold">
+                            <p:stCondLst>
+                              <p:cond delay="0"/>
+                            </p:stCondLst>
+                            <p:childTnLst>
+                              <p:par>
+                                <p:cTn id="5" presetID="26" presetClass="entr" presetSubtype="0" fill="hold" nodeType="clickEffect">
+                                  <p:stCondLst>
+                                    <p:cond delay="0"/>
+                                  </p:stCondLst>
+                                  <p:childTnLst>
+                                    <p:set>
+                                      <p:cBhvr>
+                                        <p:cTn id="6" dur="1" fill="hold">
+                                          <p:stCondLst>
+                                            <p:cond delay="0"/>
+                                          </p:stCondLst>
+                                        </p:cTn>
+                                        <p:tgtEl>
+                                          <p:spTgt spid="7"/>
+                                        </p:tgtEl>
+                                        <p:attrNameLst>
+                                          <p:attrName>style.visibility</p:attrName>
+                                        </p:attrNameLst>
+                                      </p:cBhvr>
+                                      <p:to>
+                                        <p:strVal val="visible"/>
+                                      </p:to>
+                                    </p:set>
+                                    <p:animEffect transition="in" filter="wipe(down)">
+                                      <p:cBhvr>
+                                        <p:cTn id="7" dur="580">
+                                          <p:stCondLst>
+                                            <p:cond delay="0"/>
+                                          </p:stCondLst>
+                                        </p:cTn>
+                                        <p:tgtEl>
+                                          <p:spTgt spid="7"/>
+                                        </p:tgtEl>
+                                      </p:cBhvr>
+                                    </p:animEffect>
+                                    <p:anim calcmode="lin" valueType="num">
+                                      <p:cBhvr>
+                                        <p:cTn id="8" dur="1822" tmFilter="0,0; 0.14,0.36; 0.43,0.73; 0.71,0.91; 1.0,1.0">
+                                          <p:stCondLst>
+                                            <p:cond delay="0"/>
+                                          </p:stCondLst>
+                                        </p:cTn>
+                                        <p:tgtEl>
+                                          <p:spTgt spid="7"/>
+                                        </p:tgtEl>
+                                        <p:attrNameLst>
+                                          <p:attrName>ppt_x</p:attrName>
+                                        </p:attrNameLst>
+                                      </p:cBhvr>
+                                      <p:tavLst>
+                                        <p:tav tm="0">
+                                          <p:val>
+                                            <p:strVal val="#ppt_x-0.25"/>
+                                          </p:val>
+                                        </p:tav>
+                                        <p:tav tm="100000">
+                                          <p:val>
+                                            <p:strVal val="#ppt_x"/>
+                                          </p:val>
+                                        </p:tav>
+                                      </p:tavLst>
+                                    </p:anim>
+                                    <p:anim calcmode="lin" valueType="num">
+                                      <p:cBhvr>
+                                        <p:cTn id="9" dur="664" tmFilter="0.0,0.0; 0.25,0.07; 0.50,0.2; 0.75,0.467; 1.0,1.0">
+                                          <p:stCondLst>
+                                            <p:cond delay="0"/>
+                                          </p:stCondLst>
+                                        </p:cTn>
+                                        <p:tgtEl>
+                                          <p:spTgt spid="7"/>
+                                        </p:tgtEl>
+                                        <p:attrNameLst>
+                                          <p:attrName>ppt_y</p:attrName>
+                                        </p:attrNameLst>
+                                      </p:cBhvr>
+                                      <p:tavLst>
+                                        <p:tav tm="0" fmla="#ppt_y-sin(pi*$)/3">
+                                          <p:val>
+                                            <p:fltVal val="0.5"/>
+                                          </p:val>
+                                        </p:tav>
+                                        <p:tav tm="100000">
+                                          <p:val>
+                                            <p:fltVal val="1"/>
+                                          </p:val>
+                                        </p:tav>
+                                      </p:tavLst>
+                                    </p:anim>
+                                    <p:anim calcmode="lin" valueType="num">
+                                      <p:cBhvr>
+                                        <p:cTn id="10" dur="664" tmFilter="0, 0; 0.125,0.2665; 0.25,0.4; 0.375,0.465; 0.5,0.5;  0.625,0.535; 0.75,0.6; 0.875,0.7335; 1,1">
+                                          <p:stCondLst>
+                                            <p:cond delay="664"/>
+                                          </p:stCondLst>
+                                        </p:cTn>
+                                        <p:tgtEl>
+                                          <p:spTgt spid="7"/>
+                                        </p:tgtEl>
+                                        <p:attrNameLst>
+                                          <p:attrName>ppt_y</p:attrName>
+                                        </p:attrNameLst>
+                                      </p:cBhvr>
+                                      <p:tavLst>
+                                        <p:tav tm="0" fmla="#ppt_y-sin(pi*$)/9">
+                                          <p:val>
+                                            <p:fltVal val="0"/>
+                                          </p:val>
+                                        </p:tav>
+                                        <p:tav tm="100000">
+                                          <p:val>
+                                            <p:fltVal val="1"/>
+                                          </p:val>
+                                        </p:tav>
+                                      </p:tavLst>
+                                    </p:anim>
+                                    <p:anim calcmode="lin" valueType="num">
+                                      <p:cBhvr>
+                                        <p:cTn id="11" dur="332" tmFilter="0, 0; 0.125,0.2665; 0.25,0.4; 0.375,0.465; 0.5,0.5;  0.625,0.535; 0.75,0.6; 0.875,0.7335; 1,1">
+                                          <p:stCondLst>
+                                            <p:cond delay="1324"/>
+                                          </p:stCondLst>
+                                        </p:cTn>
+                                        <p:tgtEl>
+                                          <p:spTgt spid="7"/>
+                                        </p:tgtEl>
+                                        <p:attrNameLst>
+                                          <p:attrName>ppt_y</p:attrName>
+                                        </p:attrNameLst>
+                                      </p:cBhvr>
+                                      <p:tavLst>
+                                        <p:tav tm="0" fmla="#ppt_y-sin(pi*$)/27">
+                                          <p:val>
+                                            <p:fltVal val="0"/>
+                                          </p:val>
+                                        </p:tav>
+                                        <p:tav tm="100000">
+                                          <p:val>
+                                            <p:fltVal val="1"/>
+                                          </p:val>
+                                        </p:tav>
+                                      </p:tavLst>
+                                    </p:anim>
+                                    <p:anim calcmode="lin" valueType="num">
+                                      <p:cBhvr>
+                                        <p:cTn id="12" dur="164" tmFilter="0, 0; 0.125,0.2665; 0.25,0.4; 0.375,0.465; 0.5,0.5;  0.625,0.535; 0.75,0.6; 0.875,0.7335; 1,1">
+                                          <p:stCondLst>
+                                            <p:cond delay="1656"/>
+                                          </p:stCondLst>
+                                        </p:cTn>
+                                        <p:tgtEl>
+                                          <p:spTgt spid="7"/>
+                                        </p:tgtEl>
+                                        <p:attrNameLst>
+                                          <p:attrName>ppt_y</p:attrName>
+                                        </p:attrNameLst>
+                                      </p:cBhvr>
+                                      <p:tavLst>
+                                        <p:tav tm="0" fmla="#ppt_y-sin(pi*$)/81">
+                                          <p:val>
+                                            <p:fltVal val="0"/>
+                                          </p:val>
+                                        </p:tav>
+                                        <p:tav tm="100000">
+                                          <p:val>
+                                            <p:fltVal val="1"/>
+                                          </p:val>
+                                        </p:tav>
+                                      </p:tavLst>
+                                    </p:anim>
+                                    <p:animScale>
+                                      <p:cBhvr>
+                                        <p:cTn id="13" dur="26">
+                                          <p:stCondLst>
+                                            <p:cond delay="650"/>
+                                          </p:stCondLst>
+                                        </p:cTn>
+                                        <p:tgtEl>
+                                          <p:spTgt spid="7"/>
+                                        </p:tgtEl>
+                                      </p:cBhvr>
+                                      <p:to x="100000" y="60000"/>
+                                    </p:animScale>
+                                    <p:animScale>
+                                      <p:cBhvr>
+                                        <p:cTn id="14" dur="166" decel="50000">
+                                          <p:stCondLst>
+                                            <p:cond delay="676"/>
+                                          </p:stCondLst>
+                                        </p:cTn>
+                                        <p:tgtEl>
+                                          <p:spTgt spid="7"/>
+                                        </p:tgtEl>
+                                      </p:cBhvr>
+                                      <p:to x="100000" y="100000"/>
+                                    </p:animScale>
+                                    <p:animScale>
+                                      <p:cBhvr>
+                                        <p:cTn id="15" dur="26">
+                                          <p:stCondLst>
+                                            <p:cond delay="1312"/>
+                                          </p:stCondLst>
+                                        </p:cTn>
+                                        <p:tgtEl>
+                                          <p:spTgt spid="7"/>
+                                        </p:tgtEl>
+                                      </p:cBhvr>
+                                      <p:to x="100000" y="80000"/>
+                                    </p:animScale>
+                                    <p:animScale>
+                                      <p:cBhvr>
+                                        <p:cTn id="16" dur="166" decel="50000">
+                                          <p:stCondLst>
+                                            <p:cond delay="1338"/>
+                                          </p:stCondLst>
+                                        </p:cTn>
+                                        <p:tgtEl>
+                                          <p:spTgt spid="7"/>
+                                        </p:tgtEl>
+                                      </p:cBhvr>
+                                      <p:to x="100000" y="100000"/>
+                                    </p:animScale>
+                                    <p:animScale>
+                                      <p:cBhvr>
+                                        <p:cTn id="17" dur="26">
+                                          <p:stCondLst>
+                                            <p:cond delay="1642"/>
+                                          </p:stCondLst>
+                                        </p:cTn>
+                                        <p:tgtEl>
+                                          <p:spTgt spid="7"/>
+                                        </p:tgtEl>
+                                      </p:cBhvr>
+                                      <p:to x="100000" y="90000"/>
+                                    </p:animScale>
+                                    <p:animScale>
+                                      <p:cBhvr>
+                                        <p:cTn id="18" dur="166" decel="50000">
+                                          <p:stCondLst>
+                                            <p:cond delay="1668"/>
+                                          </p:stCondLst>
+                                        </p:cTn>
+                                        <p:tgtEl>
+                                          <p:spTgt spid="7"/>
+                                        </p:tgtEl>
+                                      </p:cBhvr>
+                                      <p:to x="100000" y="100000"/>
+                                    </p:animScale>
+                                    <p:animScale>
+                                      <p:cBhvr>
+                                        <p:cTn id="19" dur="26">
+                                          <p:stCondLst>
+                                            <p:cond delay="1808"/>
+                                          </p:stCondLst>
+                                        </p:cTn>
+                                        <p:tgtEl>
+                                          <p:spTgt spid="7"/>
+                                        </p:tgtEl>
+                                      </p:cBhvr>
+                                      <p:to x="100000" y="95000"/>
+                                    </p:animScale>
+                                    <p:animScale>
+                                      <p:cBhvr>
+                                        <p:cTn id="20" dur="166" decel="50000">
+                                          <p:stCondLst>
+                                            <p:cond delay="1834"/>
+                                          </p:stCondLst>
+                                        </p:cTn>
+                                        <p:tgtEl>
+                                          <p:spTgt spid="7"/>
+                                        </p:tgtEl>
+                                      </p:cBhvr>
+                                      <p:to x="100000" y="100000"/>
+                                    </p:animScale>
+                                  </p:childTnLst>
+                                </p:cTn>
+                              </p:par>
+                            </p:childTnLst>
+                          </p:cTn>
+                        </p:par>
+                      </p:childTnLst>
+                    </p:cTn>
+                  </p:par>
+                </p:childTnLst>
+              </p:cTn>
+              <p:prevCondLst>
+                <p:cond evt="onPrev" delay="0">
+                  <p:tgtEl>
+                    <p:sldTgt/>
+                  </p:tgtEl>
+                </p:cond>
+              </p:prevCondLst>
+              <p:nextCondLst>
+                <p:cond evt="onNext" delay="0">
+                  <p:tgtEl>
+                    <p:sldTgt/>
+                  </p:tgtEl>
+                </p:cond>
+              </p:nextCondLst>
+            </p:seq>
+          </p:childTnLst>
+        </p:cTn>
+      </p:par>
+    </p:tnLst>
+  </p:timing>
+</p:sld>
+</file>
+
+<file path=ppt/slides/slide19.xml><?xml version="1.0" encoding="utf-8"?>
+<p:sld xmlns:a="http://schemas.openxmlformats.org/drawingml/2006/main" xmlns:r="http://schemas.openxmlformats.org/officeDocument/2006/relationships" xmlns:p="http://schemas.openxmlformats.org/presentationml/2006/main">
+  <p:cSld>
+    <p:spTree>
+      <p:nvGrpSpPr>
+        <p:cNvPr id="1" name=""/>
+        <p:cNvGrpSpPr/>
+        <p:nvPr/>
+      </p:nvGrpSpPr>
+      <p:grpSpPr>
+        <a:xfrm>
+          <a:off x="0" y="0"/>
+          <a:ext cx="0" cy="0"/>
+          <a:chOff x="0" y="0"/>
+          <a:chExt cx="0" cy="0"/>
+        </a:xfrm>
+      </p:grpSpPr>
+      <p:sp>
+        <p:nvSpPr>
+          <p:cNvPr id="2" name="Title 1">
+            <a:extLst>
+              <a:ext uri="{FF2B5EF4-FFF2-40B4-BE49-F238E27FC236}">
+                <a16:creationId xmlns:a16="http://schemas.microsoft.com/office/drawing/2014/main" id="{D047F8EF-BECC-CB05-2042-8E1A2F6D1C1A}"/>
+              </a:ext>
+            </a:extLst>
+          </p:cNvPr>
+          <p:cNvSpPr>
+            <a:spLocks noGrp="1"/>
+          </p:cNvSpPr>
+          <p:nvPr>
+            <p:ph type="title"/>
+          </p:nvPr>
+        </p:nvSpPr>
+        <p:spPr>
+          <a:xfrm>
+            <a:off x="643831" y="640080"/>
+            <a:ext cx="7951529" cy="666206"/>
+          </a:xfrm>
+        </p:spPr>
+        <p:txBody>
+          <a:bodyPr>
+            <a:normAutofit/>
+          </a:bodyPr>
+          <a:lstStyle/>
+          <a:p>
+            <a:r>
+              <a:rPr lang="en-GB" sz="3200" dirty="0"/>
+              <a:t>Navigating and undoing changes</a:t>
+            </a:r>
+          </a:p>
+        </p:txBody>
+      </p:sp>
+      <p:sp>
+        <p:nvSpPr>
+          <p:cNvPr id="3" name="Content Placeholder 2">
+            <a:extLst>
+              <a:ext uri="{FF2B5EF4-FFF2-40B4-BE49-F238E27FC236}">
+                <a16:creationId xmlns:a16="http://schemas.microsoft.com/office/drawing/2014/main" id="{476F0551-B6E7-9358-79EA-9B20DDC8DAF3}"/>
+              </a:ext>
+            </a:extLst>
+          </p:cNvPr>
+          <p:cNvSpPr>
+            <a:spLocks noGrp="1"/>
+          </p:cNvSpPr>
+          <p:nvPr>
+            <p:ph idx="1"/>
+          </p:nvPr>
+        </p:nvSpPr>
+        <p:spPr>
+          <a:xfrm>
+            <a:off x="643831" y="1584960"/>
+            <a:ext cx="7873152" cy="4595177"/>
+          </a:xfrm>
+        </p:spPr>
+        <p:txBody>
+          <a:bodyPr>
+            <a:normAutofit/>
+          </a:bodyPr>
+          <a:lstStyle/>
+          <a:p>
+            <a:r>
+              <a:rPr lang="en-GB" sz="2800" dirty="0"/>
+              <a:t>Now that we’ve had some experience of moving around between commits up and down the history tree and between branches, we’re in a place where we can take a look at undoing changes…</a:t>
+            </a:r>
+          </a:p>
+          <a:p>
+            <a:pPr lvl="1"/>
+            <a:r>
+              <a:rPr lang="en-GB" sz="2400" dirty="0"/>
+              <a:t>This can be with either of:</a:t>
+            </a:r>
+          </a:p>
+          <a:p>
+            <a:pPr lvl="2"/>
+            <a:r>
+              <a:rPr lang="en-GB" sz="2000" i="1" dirty="0"/>
+              <a:t>git reset</a:t>
+            </a:r>
+            <a:r>
+              <a:rPr lang="en-GB" sz="2000" dirty="0"/>
+              <a:t>  </a:t>
+            </a:r>
+          </a:p>
+          <a:p>
+            <a:pPr lvl="2"/>
+            <a:r>
+              <a:rPr lang="en-GB" sz="2000" i="1" dirty="0"/>
+              <a:t>git revert</a:t>
+            </a:r>
+          </a:p>
+          <a:p>
+            <a:r>
+              <a:rPr lang="en-GB" sz="2800" dirty="0"/>
+              <a:t>Have a go at the next level on git branching…</a:t>
+            </a:r>
+          </a:p>
+        </p:txBody>
+      </p:sp>
+      <p:pic>
+        <p:nvPicPr>
+          <p:cNvPr id="5" name="Picture 4">
+            <a:extLst>
+              <a:ext uri="{FF2B5EF4-FFF2-40B4-BE49-F238E27FC236}">
+                <a16:creationId xmlns:a16="http://schemas.microsoft.com/office/drawing/2014/main" id="{685F5EBE-F77B-5283-ADF8-524FA77773C4}"/>
+              </a:ext>
+            </a:extLst>
+          </p:cNvPr>
+          <p:cNvPicPr>
+            <a:picLocks noChangeAspect="1"/>
+          </p:cNvPicPr>
+          <p:nvPr/>
+        </p:nvPicPr>
+        <p:blipFill>
+          <a:blip r:embed="rId2">
+            <a:extLst>
+              <a:ext uri="{28A0092B-C50C-407E-A947-70E740481C1C}">
+                <a14:useLocalDpi xmlns:a14="http://schemas.microsoft.com/office/drawing/2010/main" val="0"/>
+              </a:ext>
+            </a:extLst>
+          </a:blip>
+          <a:srcRect/>
+          <a:stretch/>
+        </p:blipFill>
+        <p:spPr>
+          <a:xfrm>
+            <a:off x="8978537" y="4577489"/>
+            <a:ext cx="2669449" cy="2132323"/>
+          </a:xfrm>
+          <a:prstGeom prst="rect">
+            <a:avLst/>
+          </a:prstGeom>
+        </p:spPr>
+      </p:pic>
+      <p:pic>
+        <p:nvPicPr>
+          <p:cNvPr id="4" name="Picture 3">
+            <a:extLst>
+              <a:ext uri="{FF2B5EF4-FFF2-40B4-BE49-F238E27FC236}">
+                <a16:creationId xmlns:a16="http://schemas.microsoft.com/office/drawing/2014/main" id="{768C7F93-0FD7-0366-72A9-B83131E71A34}"/>
+              </a:ext>
+            </a:extLst>
+          </p:cNvPr>
+          <p:cNvPicPr>
+            <a:picLocks noChangeAspect="1"/>
+          </p:cNvPicPr>
+          <p:nvPr/>
+        </p:nvPicPr>
+        <p:blipFill>
+          <a:blip r:embed="rId3">
+            <a:extLst>
+              <a:ext uri="{28A0092B-C50C-407E-A947-70E740481C1C}">
+                <a14:useLocalDpi xmlns:a14="http://schemas.microsoft.com/office/drawing/2010/main" val="0"/>
+              </a:ext>
+            </a:extLst>
+          </a:blip>
+          <a:srcRect/>
+          <a:stretch/>
+        </p:blipFill>
+        <p:spPr>
+          <a:xfrm>
+            <a:off x="8978537" y="2314728"/>
+            <a:ext cx="2669449" cy="2138167"/>
+          </a:xfrm>
+          <a:prstGeom prst="rect">
+            <a:avLst/>
+          </a:prstGeom>
+        </p:spPr>
+      </p:pic>
+      <p:pic>
+        <p:nvPicPr>
+          <p:cNvPr id="6" name="Picture 5">
+            <a:extLst>
+              <a:ext uri="{FF2B5EF4-FFF2-40B4-BE49-F238E27FC236}">
+                <a16:creationId xmlns:a16="http://schemas.microsoft.com/office/drawing/2014/main" id="{740885C5-D989-B7EC-ADB0-D69A9041768E}"/>
+              </a:ext>
+            </a:extLst>
+          </p:cNvPr>
+          <p:cNvPicPr>
+            <a:picLocks noChangeAspect="1"/>
+          </p:cNvPicPr>
+          <p:nvPr/>
+        </p:nvPicPr>
+        <p:blipFill>
+          <a:blip r:embed="rId4">
+            <a:extLst>
+              <a:ext uri="{28A0092B-C50C-407E-A947-70E740481C1C}">
+                <a14:useLocalDpi xmlns:a14="http://schemas.microsoft.com/office/drawing/2010/main" val="0"/>
+              </a:ext>
+            </a:extLst>
+          </a:blip>
+          <a:srcRect/>
+          <a:stretch/>
+        </p:blipFill>
+        <p:spPr>
+          <a:xfrm>
+            <a:off x="8974192" y="159611"/>
+            <a:ext cx="2673794" cy="2030524"/>
+          </a:xfrm>
+          <a:prstGeom prst="rect">
+            <a:avLst/>
+          </a:prstGeom>
+        </p:spPr>
+      </p:pic>
+    </p:spTree>
+    <p:extLst>
+      <p:ext uri="{BB962C8B-B14F-4D97-AF65-F5344CB8AC3E}">
+        <p14:creationId xmlns:p14="http://schemas.microsoft.com/office/powerpoint/2010/main" val="2389326006"/>
+      </p:ext>
+    </p:extLst>
+  </p:cSld>
+  <p:clrMapOvr>
+    <a:masterClrMapping/>
+  </p:clrMapOvr>
+</p:sld>
+</file>
+
+<file path=ppt/slides/slide2.xml><?xml version="1.0" encoding="utf-8"?>
+<p:sld xmlns:a="http://schemas.openxmlformats.org/drawingml/2006/main" xmlns:r="http://schemas.openxmlformats.org/officeDocument/2006/relationships" xmlns:p="http://schemas.openxmlformats.org/presentationml/2006/main">
+  <p:cSld>
+    <p:spTree>
+      <p:nvGrpSpPr>
+        <p:cNvPr id="1" name=""/>
+        <p:cNvGrpSpPr/>
+        <p:nvPr/>
+      </p:nvGrpSpPr>
+      <p:grpSpPr>
+        <a:xfrm>
+          <a:off x="0" y="0"/>
+          <a:ext cx="0" cy="0"/>
+          <a:chOff x="0" y="0"/>
+          <a:chExt cx="0" cy="0"/>
+        </a:xfrm>
+      </p:grpSpPr>
+      <p:sp>
+        <p:nvSpPr>
+          <p:cNvPr id="2" name="Title 1">
+            <a:extLst>
+              <a:ext uri="{FF2B5EF4-FFF2-40B4-BE49-F238E27FC236}">
+                <a16:creationId xmlns:a16="http://schemas.microsoft.com/office/drawing/2014/main" id="{ABAFFC0C-75B9-F1D8-7F37-DF17A0C915C0}"/>
+              </a:ext>
+            </a:extLst>
+          </p:cNvPr>
+          <p:cNvSpPr>
+            <a:spLocks noGrp="1"/>
+          </p:cNvSpPr>
+          <p:nvPr>
+            <p:ph type="title"/>
+          </p:nvPr>
+        </p:nvSpPr>
+        <p:spPr/>
+        <p:txBody>
+          <a:bodyPr/>
+          <a:lstStyle/>
+          <a:p>
+            <a:r>
+              <a:rPr lang="en-GB" dirty="0"/>
+              <a:t>Intros</a:t>
+            </a:r>
+          </a:p>
+        </p:txBody>
+      </p:sp>
+      <p:sp>
+        <p:nvSpPr>
+          <p:cNvPr id="3" name="Content Placeholder 2">
+            <a:extLst>
+              <a:ext uri="{FF2B5EF4-FFF2-40B4-BE49-F238E27FC236}">
+                <a16:creationId xmlns:a16="http://schemas.microsoft.com/office/drawing/2014/main" id="{4930FBD0-31AF-8FE7-DC2D-4B3BD356AA19}"/>
+              </a:ext>
+            </a:extLst>
+          </p:cNvPr>
+          <p:cNvSpPr>
+            <a:spLocks noGrp="1"/>
+          </p:cNvSpPr>
+          <p:nvPr>
+            <p:ph idx="1"/>
+          </p:nvPr>
+        </p:nvSpPr>
+        <p:spPr/>
+        <p:txBody>
+          <a:bodyPr>
+            <a:normAutofit/>
+          </a:bodyPr>
+          <a:lstStyle/>
+          <a:p>
+            <a:r>
+              <a:rPr lang="en-GB" sz="6400" dirty="0"/>
+              <a:t>Who are we?</a:t>
+            </a:r>
+          </a:p>
+          <a:p>
+            <a:r>
+              <a:rPr lang="en-GB" sz="6400" dirty="0"/>
+              <a:t>Who are you?</a:t>
+            </a:r>
+          </a:p>
+        </p:txBody>
+      </p:sp>
+    </p:spTree>
+    <p:extLst>
+      <p:ext uri="{BB962C8B-B14F-4D97-AF65-F5344CB8AC3E}">
+        <p14:creationId xmlns:p14="http://schemas.microsoft.com/office/powerpoint/2010/main" val="3561758237"/>
+      </p:ext>
+    </p:extLst>
+  </p:cSld>
+  <p:clrMapOvr>
+    <a:masterClrMapping/>
+  </p:clrMapOvr>
+</p:sld>
+</file>
+
+<file path=ppt/slides/slide20.xml><?xml version="1.0" encoding="utf-8"?>
+<p:sld xmlns:a="http://schemas.openxmlformats.org/drawingml/2006/main" xmlns:r="http://schemas.openxmlformats.org/officeDocument/2006/relationships" xmlns:p="http://schemas.openxmlformats.org/presentationml/2006/main">
+  <p:cSld>
+    <p:spTree>
+      <p:nvGrpSpPr>
+        <p:cNvPr id="1" name=""/>
+        <p:cNvGrpSpPr/>
+        <p:nvPr/>
+      </p:nvGrpSpPr>
+      <p:grpSpPr>
+        <a:xfrm>
+          <a:off x="0" y="0"/>
+          <a:ext cx="0" cy="0"/>
+          <a:chOff x="0" y="0"/>
+          <a:chExt cx="0" cy="0"/>
+        </a:xfrm>
+      </p:grpSpPr>
+      <p:sp>
+        <p:nvSpPr>
+          <p:cNvPr id="2" name="Title 1">
+            <a:extLst>
+              <a:ext uri="{FF2B5EF4-FFF2-40B4-BE49-F238E27FC236}">
+                <a16:creationId xmlns:a16="http://schemas.microsoft.com/office/drawing/2014/main" id="{D047F8EF-BECC-CB05-2042-8E1A2F6D1C1A}"/>
+              </a:ext>
+            </a:extLst>
+          </p:cNvPr>
+          <p:cNvSpPr>
+            <a:spLocks noGrp="1"/>
+          </p:cNvSpPr>
+          <p:nvPr>
+            <p:ph type="title"/>
+          </p:nvPr>
+        </p:nvSpPr>
+        <p:spPr>
+          <a:xfrm>
+            <a:off x="643831" y="640080"/>
+            <a:ext cx="3690425" cy="1325562"/>
+          </a:xfrm>
+        </p:spPr>
+        <p:txBody>
+          <a:bodyPr>
+            <a:normAutofit/>
+          </a:bodyPr>
+          <a:lstStyle/>
+          <a:p>
+            <a:r>
+              <a:rPr lang="en-GB" sz="3200" dirty="0"/>
+              <a:t>Undoing your changes</a:t>
+            </a:r>
+          </a:p>
+        </p:txBody>
+      </p:sp>
+      <p:sp>
+        <p:nvSpPr>
+          <p:cNvPr id="3" name="Content Placeholder 2">
+            <a:extLst>
+              <a:ext uri="{FF2B5EF4-FFF2-40B4-BE49-F238E27FC236}">
+                <a16:creationId xmlns:a16="http://schemas.microsoft.com/office/drawing/2014/main" id="{476F0551-B6E7-9358-79EA-9B20DDC8DAF3}"/>
+              </a:ext>
+            </a:extLst>
+          </p:cNvPr>
+          <p:cNvSpPr>
+            <a:spLocks noGrp="1"/>
+          </p:cNvSpPr>
+          <p:nvPr>
+            <p:ph idx="1"/>
+          </p:nvPr>
+        </p:nvSpPr>
+        <p:spPr>
+          <a:xfrm>
+            <a:off x="643831" y="1936955"/>
+            <a:ext cx="3690425" cy="4243182"/>
+          </a:xfrm>
+        </p:spPr>
+        <p:txBody>
+          <a:bodyPr>
+            <a:normAutofit/>
+          </a:bodyPr>
+          <a:lstStyle/>
+          <a:p>
+            <a:r>
+              <a:rPr lang="en-GB" sz="1600" dirty="0"/>
+              <a:t>Last task we’ll do today:</a:t>
+            </a:r>
+          </a:p>
+          <a:p>
+            <a:pPr lvl="1"/>
+            <a:r>
+              <a:rPr lang="en-GB" sz="1400" dirty="0"/>
+              <a:t>Task 8 (rampup4) - “Reversing changes in Git”</a:t>
+            </a:r>
+            <a:endParaRPr lang="en-GB" dirty="0"/>
+          </a:p>
+        </p:txBody>
+      </p:sp>
+      <p:pic>
+        <p:nvPicPr>
+          <p:cNvPr id="5" name="Picture 4">
+            <a:extLst>
+              <a:ext uri="{FF2B5EF4-FFF2-40B4-BE49-F238E27FC236}">
+                <a16:creationId xmlns:a16="http://schemas.microsoft.com/office/drawing/2014/main" id="{685F5EBE-F77B-5283-ADF8-524FA77773C4}"/>
+              </a:ext>
+            </a:extLst>
+          </p:cNvPr>
+          <p:cNvPicPr>
+            <a:picLocks noChangeAspect="1"/>
+          </p:cNvPicPr>
+          <p:nvPr/>
+        </p:nvPicPr>
+        <p:blipFill>
+          <a:blip r:embed="rId2">
+            <a:extLst>
+              <a:ext uri="{28A0092B-C50C-407E-A947-70E740481C1C}">
+                <a14:useLocalDpi xmlns:a14="http://schemas.microsoft.com/office/drawing/2010/main" val="0"/>
+              </a:ext>
+            </a:extLst>
+          </a:blip>
+          <a:srcRect/>
+          <a:stretch/>
+        </p:blipFill>
+        <p:spPr>
+          <a:xfrm>
+            <a:off x="5117270" y="1273142"/>
+            <a:ext cx="5229785" cy="4321974"/>
+          </a:xfrm>
+          <a:prstGeom prst="rect">
+            <a:avLst/>
+          </a:prstGeom>
+        </p:spPr>
+      </p:pic>
+      <p:pic>
+        <p:nvPicPr>
+          <p:cNvPr id="7" name="Picture 6">
+            <a:extLst>
+              <a:ext uri="{FF2B5EF4-FFF2-40B4-BE49-F238E27FC236}">
+                <a16:creationId xmlns:a16="http://schemas.microsoft.com/office/drawing/2014/main" id="{2BCF6774-B92C-7836-786A-79A8C0612D8B}"/>
+              </a:ext>
+            </a:extLst>
+          </p:cNvPr>
+          <p:cNvPicPr>
+            <a:picLocks noChangeAspect="1"/>
+          </p:cNvPicPr>
+          <p:nvPr/>
+        </p:nvPicPr>
+        <p:blipFill>
+          <a:blip r:embed="rId3">
+            <a:extLst>
+              <a:ext uri="{28A0092B-C50C-407E-A947-70E740481C1C}">
+                <a14:useLocalDpi xmlns:a14="http://schemas.microsoft.com/office/drawing/2010/main" val="0"/>
+              </a:ext>
+            </a:extLst>
+          </a:blip>
+          <a:srcRect/>
+          <a:stretch/>
+        </p:blipFill>
+        <p:spPr>
+          <a:xfrm>
+            <a:off x="1204737" y="3202859"/>
+            <a:ext cx="2364331" cy="1628207"/>
+          </a:xfrm>
+          <a:prstGeom prst="rect">
+            <a:avLst/>
+          </a:prstGeom>
+        </p:spPr>
+      </p:pic>
+    </p:spTree>
+    <p:extLst>
+      <p:ext uri="{BB962C8B-B14F-4D97-AF65-F5344CB8AC3E}">
+        <p14:creationId xmlns:p14="http://schemas.microsoft.com/office/powerpoint/2010/main" val="1396509500"/>
+      </p:ext>
+    </p:extLst>
+  </p:cSld>
+  <p:clrMapOvr>
+    <a:masterClrMapping/>
+  </p:clrMapOvr>
+  <p:timing>
+    <p:tnLst>
+      <p:par>
+        <p:cTn id="1" dur="indefinite" restart="never" nodeType="tmRoot">
+          <p:childTnLst>
+            <p:seq concurrent="1" nextAc="seek">
+              <p:cTn id="2" dur="indefinite" nodeType="mainSeq">
+                <p:childTnLst>
+                  <p:par>
+                    <p:cTn id="3" fill="hold">
+                      <p:stCondLst>
+                        <p:cond delay="indefinite"/>
+                      </p:stCondLst>
+                      <p:childTnLst>
+                        <p:par>
+                          <p:cTn id="4" fill="hold">
+                            <p:stCondLst>
+                              <p:cond delay="0"/>
+                            </p:stCondLst>
+                            <p:childTnLst>
+                              <p:par>
+                                <p:cTn id="5" presetID="26" presetClass="entr" presetSubtype="0" fill="hold" nodeType="clickEffect">
+                                  <p:stCondLst>
+                                    <p:cond delay="0"/>
+                                  </p:stCondLst>
+                                  <p:childTnLst>
+                                    <p:set>
+                                      <p:cBhvr>
+                                        <p:cTn id="6" dur="1" fill="hold">
+                                          <p:stCondLst>
+                                            <p:cond delay="0"/>
+                                          </p:stCondLst>
+                                        </p:cTn>
+                                        <p:tgtEl>
+                                          <p:spTgt spid="7"/>
+                                        </p:tgtEl>
+                                        <p:attrNameLst>
+                                          <p:attrName>style.visibility</p:attrName>
+                                        </p:attrNameLst>
+                                      </p:cBhvr>
+                                      <p:to>
+                                        <p:strVal val="visible"/>
+                                      </p:to>
+                                    </p:set>
+                                    <p:animEffect transition="in" filter="wipe(down)">
+                                      <p:cBhvr>
+                                        <p:cTn id="7" dur="580">
+                                          <p:stCondLst>
+                                            <p:cond delay="0"/>
+                                          </p:stCondLst>
+                                        </p:cTn>
+                                        <p:tgtEl>
+                                          <p:spTgt spid="7"/>
+                                        </p:tgtEl>
+                                      </p:cBhvr>
+                                    </p:animEffect>
+                                    <p:anim calcmode="lin" valueType="num">
+                                      <p:cBhvr>
+                                        <p:cTn id="8" dur="1822" tmFilter="0,0; 0.14,0.36; 0.43,0.73; 0.71,0.91; 1.0,1.0">
+                                          <p:stCondLst>
+                                            <p:cond delay="0"/>
+                                          </p:stCondLst>
+                                        </p:cTn>
+                                        <p:tgtEl>
+                                          <p:spTgt spid="7"/>
+                                        </p:tgtEl>
+                                        <p:attrNameLst>
+                                          <p:attrName>ppt_x</p:attrName>
+                                        </p:attrNameLst>
+                                      </p:cBhvr>
+                                      <p:tavLst>
+                                        <p:tav tm="0">
+                                          <p:val>
+                                            <p:strVal val="#ppt_x-0.25"/>
+                                          </p:val>
+                                        </p:tav>
+                                        <p:tav tm="100000">
+                                          <p:val>
+                                            <p:strVal val="#ppt_x"/>
+                                          </p:val>
+                                        </p:tav>
+                                      </p:tavLst>
+                                    </p:anim>
+                                    <p:anim calcmode="lin" valueType="num">
+                                      <p:cBhvr>
+                                        <p:cTn id="9" dur="664" tmFilter="0.0,0.0; 0.25,0.07; 0.50,0.2; 0.75,0.467; 1.0,1.0">
+                                          <p:stCondLst>
+                                            <p:cond delay="0"/>
+                                          </p:stCondLst>
+                                        </p:cTn>
+                                        <p:tgtEl>
+                                          <p:spTgt spid="7"/>
+                                        </p:tgtEl>
+                                        <p:attrNameLst>
+                                          <p:attrName>ppt_y</p:attrName>
+                                        </p:attrNameLst>
+                                      </p:cBhvr>
+                                      <p:tavLst>
+                                        <p:tav tm="0" fmla="#ppt_y-sin(pi*$)/3">
+                                          <p:val>
+                                            <p:fltVal val="0.5"/>
+                                          </p:val>
+                                        </p:tav>
+                                        <p:tav tm="100000">
+                                          <p:val>
+                                            <p:fltVal val="1"/>
+                                          </p:val>
+                                        </p:tav>
+                                      </p:tavLst>
+                                    </p:anim>
+                                    <p:anim calcmode="lin" valueType="num">
+                                      <p:cBhvr>
+                                        <p:cTn id="10" dur="664" tmFilter="0, 0; 0.125,0.2665; 0.25,0.4; 0.375,0.465; 0.5,0.5;  0.625,0.535; 0.75,0.6; 0.875,0.7335; 1,1">
+                                          <p:stCondLst>
+                                            <p:cond delay="664"/>
+                                          </p:stCondLst>
+                                        </p:cTn>
+                                        <p:tgtEl>
+                                          <p:spTgt spid="7"/>
+                                        </p:tgtEl>
+                                        <p:attrNameLst>
+                                          <p:attrName>ppt_y</p:attrName>
+                                        </p:attrNameLst>
+                                      </p:cBhvr>
+                                      <p:tavLst>
+                                        <p:tav tm="0" fmla="#ppt_y-sin(pi*$)/9">
+                                          <p:val>
+                                            <p:fltVal val="0"/>
+                                          </p:val>
+                                        </p:tav>
+                                        <p:tav tm="100000">
+                                          <p:val>
+                                            <p:fltVal val="1"/>
+                                          </p:val>
+                                        </p:tav>
+                                      </p:tavLst>
+                                    </p:anim>
+                                    <p:anim calcmode="lin" valueType="num">
+                                      <p:cBhvr>
+                                        <p:cTn id="11" dur="332" tmFilter="0, 0; 0.125,0.2665; 0.25,0.4; 0.375,0.465; 0.5,0.5;  0.625,0.535; 0.75,0.6; 0.875,0.7335; 1,1">
+                                          <p:stCondLst>
+                                            <p:cond delay="1324"/>
+                                          </p:stCondLst>
+                                        </p:cTn>
+                                        <p:tgtEl>
+                                          <p:spTgt spid="7"/>
+                                        </p:tgtEl>
+                                        <p:attrNameLst>
+                                          <p:attrName>ppt_y</p:attrName>
+                                        </p:attrNameLst>
+                                      </p:cBhvr>
+                                      <p:tavLst>
+                                        <p:tav tm="0" fmla="#ppt_y-sin(pi*$)/27">
+                                          <p:val>
+                                            <p:fltVal val="0"/>
+                                          </p:val>
+                                        </p:tav>
+                                        <p:tav tm="100000">
+                                          <p:val>
+                                            <p:fltVal val="1"/>
+                                          </p:val>
+                                        </p:tav>
+                                      </p:tavLst>
+                                    </p:anim>
+                                    <p:anim calcmode="lin" valueType="num">
+                                      <p:cBhvr>
+                                        <p:cTn id="12" dur="164" tmFilter="0, 0; 0.125,0.2665; 0.25,0.4; 0.375,0.465; 0.5,0.5;  0.625,0.535; 0.75,0.6; 0.875,0.7335; 1,1">
+                                          <p:stCondLst>
+                                            <p:cond delay="1656"/>
+                                          </p:stCondLst>
+                                        </p:cTn>
+                                        <p:tgtEl>
+                                          <p:spTgt spid="7"/>
+                                        </p:tgtEl>
+                                        <p:attrNameLst>
+                                          <p:attrName>ppt_y</p:attrName>
+                                        </p:attrNameLst>
+                                      </p:cBhvr>
+                                      <p:tavLst>
+                                        <p:tav tm="0" fmla="#ppt_y-sin(pi*$)/81">
+                                          <p:val>
+                                            <p:fltVal val="0"/>
+                                          </p:val>
+                                        </p:tav>
+                                        <p:tav tm="100000">
+                                          <p:val>
+                                            <p:fltVal val="1"/>
+                                          </p:val>
+                                        </p:tav>
+                                      </p:tavLst>
+                                    </p:anim>
+                                    <p:animScale>
+                                      <p:cBhvr>
+                                        <p:cTn id="13" dur="26">
+                                          <p:stCondLst>
+                                            <p:cond delay="650"/>
+                                          </p:stCondLst>
+                                        </p:cTn>
+                                        <p:tgtEl>
+                                          <p:spTgt spid="7"/>
+                                        </p:tgtEl>
+                                      </p:cBhvr>
+                                      <p:to x="100000" y="60000"/>
+                                    </p:animScale>
+                                    <p:animScale>
+                                      <p:cBhvr>
+                                        <p:cTn id="14" dur="166" decel="50000">
+                                          <p:stCondLst>
+                                            <p:cond delay="676"/>
+                                          </p:stCondLst>
+                                        </p:cTn>
+                                        <p:tgtEl>
+                                          <p:spTgt spid="7"/>
+                                        </p:tgtEl>
+                                      </p:cBhvr>
+                                      <p:to x="100000" y="100000"/>
+                                    </p:animScale>
+                                    <p:animScale>
+                                      <p:cBhvr>
+                                        <p:cTn id="15" dur="26">
+                                          <p:stCondLst>
+                                            <p:cond delay="1312"/>
+                                          </p:stCondLst>
+                                        </p:cTn>
+                                        <p:tgtEl>
+                                          <p:spTgt spid="7"/>
+                                        </p:tgtEl>
+                                      </p:cBhvr>
+                                      <p:to x="100000" y="80000"/>
+                                    </p:animScale>
+                                    <p:animScale>
+                                      <p:cBhvr>
+                                        <p:cTn id="16" dur="166" decel="50000">
+                                          <p:stCondLst>
+                                            <p:cond delay="1338"/>
+                                          </p:stCondLst>
+                                        </p:cTn>
+                                        <p:tgtEl>
+                                          <p:spTgt spid="7"/>
+                                        </p:tgtEl>
+                                      </p:cBhvr>
+                                      <p:to x="100000" y="100000"/>
+                                    </p:animScale>
+                                    <p:animScale>
+                                      <p:cBhvr>
+                                        <p:cTn id="17" dur="26">
+                                          <p:stCondLst>
+                                            <p:cond delay="1642"/>
+                                          </p:stCondLst>
+                                        </p:cTn>
+                                        <p:tgtEl>
+                                          <p:spTgt spid="7"/>
+                                        </p:tgtEl>
+                                      </p:cBhvr>
+                                      <p:to x="100000" y="90000"/>
+                                    </p:animScale>
+                                    <p:animScale>
+                                      <p:cBhvr>
+                                        <p:cTn id="18" dur="166" decel="50000">
+                                          <p:stCondLst>
+                                            <p:cond delay="1668"/>
+                                          </p:stCondLst>
+                                        </p:cTn>
+                                        <p:tgtEl>
+                                          <p:spTgt spid="7"/>
+                                        </p:tgtEl>
+                                      </p:cBhvr>
+                                      <p:to x="100000" y="100000"/>
+                                    </p:animScale>
+                                    <p:animScale>
+                                      <p:cBhvr>
+                                        <p:cTn id="19" dur="26">
+                                          <p:stCondLst>
+                                            <p:cond delay="1808"/>
+                                          </p:stCondLst>
+                                        </p:cTn>
+                                        <p:tgtEl>
+                                          <p:spTgt spid="7"/>
+                                        </p:tgtEl>
+                                      </p:cBhvr>
+                                      <p:to x="100000" y="95000"/>
+                                    </p:animScale>
+                                    <p:animScale>
+                                      <p:cBhvr>
+                                        <p:cTn id="20" dur="166" decel="50000">
+                                          <p:stCondLst>
+                                            <p:cond delay="1834"/>
+                                          </p:stCondLst>
+                                        </p:cTn>
+                                        <p:tgtEl>
+                                          <p:spTgt spid="7"/>
+                                        </p:tgtEl>
+                                      </p:cBhvr>
+                                      <p:to x="100000" y="100000"/>
+                                    </p:animScale>
+                                  </p:childTnLst>
+                                </p:cTn>
+                              </p:par>
+                            </p:childTnLst>
+                          </p:cTn>
+                        </p:par>
+                      </p:childTnLst>
+                    </p:cTn>
+                  </p:par>
+                </p:childTnLst>
+              </p:cTn>
+              <p:prevCondLst>
+                <p:cond evt="onPrev" delay="0">
+                  <p:tgtEl>
+                    <p:sldTgt/>
+                  </p:tgtEl>
+                </p:cond>
+              </p:prevCondLst>
+              <p:nextCondLst>
+                <p:cond evt="onNext" delay="0">
+                  <p:tgtEl>
+                    <p:sldTgt/>
+                  </p:tgtEl>
+                </p:cond>
+              </p:nextCondLst>
+            </p:seq>
+          </p:childTnLst>
+        </p:cTn>
+      </p:par>
+    </p:tnLst>
+  </p:timing>
+</p:sld>
+</file>
+
+<file path=ppt/slides/slide21.xml><?xml version="1.0" encoding="utf-8"?>
+<p:sld xmlns:a="http://schemas.openxmlformats.org/drawingml/2006/main" xmlns:r="http://schemas.openxmlformats.org/officeDocument/2006/relationships" xmlns:p="http://schemas.openxmlformats.org/presentationml/2006/main">
+  <p:cSld>
+    <p:bg>
+      <p:bgPr>
+        <a:solidFill>
+          <a:schemeClr val="bg1"/>
+        </a:solidFill>
+        <a:effectLst/>
+      </p:bgPr>
+    </p:bg>
+    <p:spTree>
+      <p:nvGrpSpPr>
+        <p:cNvPr id="1" name=""/>
+        <p:cNvGrpSpPr/>
+        <p:nvPr/>
+      </p:nvGrpSpPr>
+      <p:grpSpPr>
+        <a:xfrm>
+          <a:off x="0" y="0"/>
+          <a:ext cx="0" cy="0"/>
+          <a:chOff x="0" y="0"/>
+          <a:chExt cx="0" cy="0"/>
+        </a:xfrm>
+      </p:grpSpPr>
+      <p:sp>
+        <p:nvSpPr>
+          <p:cNvPr id="2" name="Title 1">
+            <a:extLst>
+              <a:ext uri="{FF2B5EF4-FFF2-40B4-BE49-F238E27FC236}">
+                <a16:creationId xmlns:a16="http://schemas.microsoft.com/office/drawing/2014/main" id="{278CBD3D-7DC6-9FDA-A7C0-B5891C73B033}"/>
+              </a:ext>
+            </a:extLst>
+          </p:cNvPr>
+          <p:cNvSpPr>
+            <a:spLocks noGrp="1"/>
+          </p:cNvSpPr>
+          <p:nvPr>
+            <p:ph type="title"/>
+          </p:nvPr>
+        </p:nvSpPr>
+        <p:spPr>
+          <a:xfrm>
+            <a:off x="643831" y="640080"/>
+            <a:ext cx="4343805" cy="1325562"/>
+          </a:xfrm>
+        </p:spPr>
+        <p:txBody>
+          <a:bodyPr>
+            <a:normAutofit/>
+          </a:bodyPr>
+          <a:lstStyle/>
+          <a:p>
+            <a:r>
+              <a:rPr lang="en-GB" sz="3200" dirty="0"/>
+              <a:t>git reset and git revert</a:t>
+            </a:r>
+          </a:p>
+        </p:txBody>
+      </p:sp>
+      <p:sp>
+        <p:nvSpPr>
+          <p:cNvPr id="3" name="Content Placeholder 2">
+            <a:extLst>
+              <a:ext uri="{FF2B5EF4-FFF2-40B4-BE49-F238E27FC236}">
+                <a16:creationId xmlns:a16="http://schemas.microsoft.com/office/drawing/2014/main" id="{44E809A3-2317-C3E4-7289-A08C8F1C3609}"/>
+              </a:ext>
+            </a:extLst>
+          </p:cNvPr>
+          <p:cNvSpPr>
+            <a:spLocks noGrp="1"/>
+          </p:cNvSpPr>
+          <p:nvPr>
+            <p:ph idx="1"/>
+          </p:nvPr>
+        </p:nvSpPr>
+        <p:spPr>
+          <a:xfrm>
+            <a:off x="643831" y="1936955"/>
+            <a:ext cx="4159078" cy="4243182"/>
+          </a:xfrm>
+        </p:spPr>
+        <p:txBody>
+          <a:bodyPr>
+            <a:normAutofit/>
+          </a:bodyPr>
+          <a:lstStyle/>
+          <a:p>
+            <a:r>
+              <a:rPr lang="en-GB" sz="1600" dirty="0"/>
+              <a:t>git reset can remove past changes entirely from the history tree (useful for if you’ve made something visible that you shouldn’t have!)</a:t>
+            </a:r>
+          </a:p>
+          <a:p>
+            <a:pPr lvl="1"/>
+            <a:r>
+              <a:rPr lang="en-GB" sz="1400" dirty="0"/>
+              <a:t>But, you’ll need to push –f (force push) to apply that reset to the remote</a:t>
+            </a:r>
+          </a:p>
+          <a:p>
+            <a:pPr lvl="1"/>
+            <a:r>
+              <a:rPr lang="en-GB" sz="1400" dirty="0"/>
+              <a:t>And anyone else with a local copy of the repo will need to perform the same reset to remove the commit (otherwise their next push will just add it back into the remote again).</a:t>
+            </a:r>
+          </a:p>
+          <a:p>
+            <a:r>
+              <a:rPr lang="en-GB" sz="1600" dirty="0"/>
+              <a:t>git revert keeps the changes in the history tree, but just undoes them as part of a new commit.</a:t>
+            </a:r>
+          </a:p>
+          <a:p>
+            <a:pPr lvl="1"/>
+            <a:r>
+              <a:rPr lang="en-GB" sz="1400" dirty="0"/>
+              <a:t>Full transparency of what’s been done</a:t>
+            </a:r>
+          </a:p>
+          <a:p>
+            <a:pPr lvl="1"/>
+            <a:r>
+              <a:rPr lang="en-GB" sz="1400" dirty="0"/>
+              <a:t>Other local repos will just need to pull to get the same effect.</a:t>
+            </a:r>
+          </a:p>
+          <a:p>
+            <a:pPr lvl="1"/>
+            <a:endParaRPr lang="en-GB" dirty="0"/>
+          </a:p>
+        </p:txBody>
+      </p:sp>
+      <p:pic>
+        <p:nvPicPr>
+          <p:cNvPr id="5" name="Picture 4">
+            <a:extLst>
+              <a:ext uri="{FF2B5EF4-FFF2-40B4-BE49-F238E27FC236}">
+                <a16:creationId xmlns:a16="http://schemas.microsoft.com/office/drawing/2014/main" id="{71424E79-00EC-A80D-8066-46894D60DE94}"/>
+              </a:ext>
+            </a:extLst>
+          </p:cNvPr>
+          <p:cNvPicPr>
+            <a:picLocks noChangeAspect="1"/>
+          </p:cNvPicPr>
+          <p:nvPr/>
+        </p:nvPicPr>
+        <p:blipFill>
+          <a:blip r:embed="rId2">
+            <a:extLst>
+              <a:ext uri="{28A0092B-C50C-407E-A947-70E740481C1C}">
+                <a14:useLocalDpi xmlns:a14="http://schemas.microsoft.com/office/drawing/2010/main" val="0"/>
+              </a:ext>
+            </a:extLst>
+          </a:blip>
+          <a:stretch/>
+        </p:blipFill>
+        <p:spPr>
+          <a:xfrm>
+            <a:off x="5079167" y="640080"/>
+            <a:ext cx="6798795" cy="5626002"/>
+          </a:xfrm>
+          <a:prstGeom prst="rect">
+            <a:avLst/>
+          </a:prstGeom>
+        </p:spPr>
+      </p:pic>
+    </p:spTree>
+    <p:extLst>
+      <p:ext uri="{BB962C8B-B14F-4D97-AF65-F5344CB8AC3E}">
+        <p14:creationId xmlns:p14="http://schemas.microsoft.com/office/powerpoint/2010/main" val="2037339343"/>
+      </p:ext>
+    </p:extLst>
+  </p:cSld>
+  <p:clrMapOvr>
+    <a:masterClrMapping/>
+  </p:clrMapOvr>
+</p:sld>
+</file>
+
+<file path=ppt/slides/slide22.xml><?xml version="1.0" encoding="utf-8"?>
+<p:sld xmlns:a="http://schemas.openxmlformats.org/drawingml/2006/main" xmlns:r="http://schemas.openxmlformats.org/officeDocument/2006/relationships" xmlns:p="http://schemas.openxmlformats.org/presentationml/2006/main">
+  <p:cSld>
+    <p:spTree>
+      <p:nvGrpSpPr>
+        <p:cNvPr id="1" name=""/>
+        <p:cNvGrpSpPr/>
+        <p:nvPr/>
+      </p:nvGrpSpPr>
+      <p:grpSpPr>
+        <a:xfrm>
+          <a:off x="0" y="0"/>
+          <a:ext cx="0" cy="0"/>
+          <a:chOff x="0" y="0"/>
+          <a:chExt cx="0" cy="0"/>
+        </a:xfrm>
+      </p:grpSpPr>
+      <p:sp>
+        <p:nvSpPr>
+          <p:cNvPr id="2" name="Title 1">
+            <a:extLst>
+              <a:ext uri="{FF2B5EF4-FFF2-40B4-BE49-F238E27FC236}">
                 <a16:creationId xmlns:a16="http://schemas.microsoft.com/office/drawing/2014/main" id="{88A48057-241C-3059-AE60-FC31E249F856}"/>
               </a:ext>
             </a:extLst>
@@ -6716,7 +9262,7 @@
 </p:sld>
 </file>
 
-<file path=ppt/slides/slide17.xml><?xml version="1.0" encoding="utf-8"?>
+<file path=ppt/slides/slide23.xml><?xml version="1.0" encoding="utf-8"?>
 <p:sld xmlns:a="http://schemas.openxmlformats.org/drawingml/2006/main" xmlns:r="http://schemas.openxmlformats.org/officeDocument/2006/relationships" xmlns:p="http://schemas.openxmlformats.org/presentationml/2006/main">
   <p:cSld>
     <p:spTree>
@@ -6890,7 +9436,7 @@
 </p:sld>
 </file>
 
-<file path=ppt/slides/slide18.xml><?xml version="1.0" encoding="utf-8"?>
+<file path=ppt/slides/slide24.xml><?xml version="1.0" encoding="utf-8"?>
 <p:sld xmlns:a="http://schemas.openxmlformats.org/drawingml/2006/main" xmlns:r="http://schemas.openxmlformats.org/officeDocument/2006/relationships" xmlns:p="http://schemas.openxmlformats.org/presentationml/2006/main">
   <p:cSld>
     <p:spTree>
@@ -7069,7 +9615,7 @@
 </p:sld>
 </file>
 
-<file path=ppt/slides/slide19.xml><?xml version="1.0" encoding="utf-8"?>
+<file path=ppt/slides/slide25.xml><?xml version="1.0" encoding="utf-8"?>
 <p:sld xmlns:a="http://schemas.openxmlformats.org/drawingml/2006/main" xmlns:r="http://schemas.openxmlformats.org/officeDocument/2006/relationships" xmlns:p="http://schemas.openxmlformats.org/presentationml/2006/main">
   <p:cSld>
     <p:spTree>
@@ -7281,7 +9827,7 @@
 </p:sld>
 </file>
 
-<file path=ppt/slides/slide2.xml><?xml version="1.0" encoding="utf-8"?>
+<file path=ppt/slides/slide26.xml><?xml version="1.0" encoding="utf-8"?>
 <p:sld xmlns:a="http://schemas.openxmlformats.org/drawingml/2006/main" xmlns:r="http://schemas.openxmlformats.org/officeDocument/2006/relationships" xmlns:p="http://schemas.openxmlformats.org/presentationml/2006/main">
   <p:cSld>
     <p:spTree>
@@ -7303,7 +9849,7 @@
           <p:cNvPr id="2" name="Title 1">
             <a:extLst>
               <a:ext uri="{FF2B5EF4-FFF2-40B4-BE49-F238E27FC236}">
-                <a16:creationId xmlns:a16="http://schemas.microsoft.com/office/drawing/2014/main" id="{ABAFFC0C-75B9-F1D8-7F37-DF17A0C915C0}"/>
+                <a16:creationId xmlns:a16="http://schemas.microsoft.com/office/drawing/2014/main" id="{A15822F5-14F8-04A7-9687-2A92683631CA}"/>
               </a:ext>
             </a:extLst>
           </p:cNvPr>
@@ -7321,7 +9867,7 @@
           <a:p>
             <a:r>
               <a:rPr lang="en-GB" dirty="0"/>
-              <a:t>Intros</a:t>
+              <a:t>How do I use git on my DfE laptop?</a:t>
             </a:r>
           </a:p>
         </p:txBody>
@@ -7331,7 +9877,7 @@
           <p:cNvPr id="3" name="Content Placeholder 2">
             <a:extLst>
               <a:ext uri="{FF2B5EF4-FFF2-40B4-BE49-F238E27FC236}">
-                <a16:creationId xmlns:a16="http://schemas.microsoft.com/office/drawing/2014/main" id="{4930FBD0-31AF-8FE7-DC2D-4B3BD356AA19}"/>
+                <a16:creationId xmlns:a16="http://schemas.microsoft.com/office/drawing/2014/main" id="{3021795C-3041-287E-53A7-9DFEBB69C084}"/>
               </a:ext>
             </a:extLst>
           </p:cNvPr>
@@ -7342,30 +9888,142 @@
             <p:ph idx="1"/>
           </p:nvPr>
         </p:nvSpPr>
-        <p:spPr/>
+        <p:spPr>
+          <a:xfrm>
+            <a:off x="1261873" y="1828800"/>
+            <a:ext cx="6127218" cy="4351337"/>
+          </a:xfrm>
+        </p:spPr>
         <p:txBody>
-          <a:bodyPr>
-            <a:normAutofit/>
-          </a:bodyPr>
+          <a:bodyPr/>
           <a:lstStyle/>
           <a:p>
             <a:r>
-              <a:rPr lang="en-GB" sz="6400" dirty="0"/>
-              <a:t>Who are we?</a:t>
-            </a:r>
-          </a:p>
-          <a:p>
-            <a:r>
-              <a:rPr lang="en-GB" sz="6400" dirty="0"/>
-              <a:t>Who are you?</a:t>
-            </a:r>
+              <a:rPr lang="en-GB" dirty="0"/>
+              <a:t>Lots of software can be used to run the git commands:</a:t>
+            </a:r>
+          </a:p>
+          <a:p>
+            <a:pPr lvl="1"/>
+            <a:r>
+              <a:rPr lang="en-GB" dirty="0"/>
+              <a:t>The git download comes with the git bash terminal where you can run git commands like the ones that we’ve seen in this session.</a:t>
+            </a:r>
+          </a:p>
+          <a:p>
+            <a:pPr lvl="1"/>
+            <a:r>
+              <a:rPr lang="en-GB" dirty="0"/>
+              <a:t>For day-to-day coding, most IDEs will have built in git functionality, e.g. R-Studio, PyCharm, Visual Studio Code, etc. Most will have GUI and command line (bash) options.</a:t>
+            </a:r>
+          </a:p>
+          <a:p>
+            <a:pPr lvl="1"/>
+            <a:r>
+              <a:rPr lang="en-GB" dirty="0"/>
+              <a:t>GitHub Desktop can be used with GitHub and configured to communicate with the DevOps platform.</a:t>
+            </a:r>
+          </a:p>
+          <a:p>
+            <a:pPr lvl="1"/>
+            <a:endParaRPr lang="en-GB" dirty="0"/>
           </a:p>
         </p:txBody>
       </p:sp>
+      <p:pic>
+        <p:nvPicPr>
+          <p:cNvPr id="5" name="Picture 4">
+            <a:extLst>
+              <a:ext uri="{FF2B5EF4-FFF2-40B4-BE49-F238E27FC236}">
+                <a16:creationId xmlns:a16="http://schemas.microsoft.com/office/drawing/2014/main" id="{FD42F31E-B8D4-7DBD-3476-3EB44B90C997}"/>
+              </a:ext>
+            </a:extLst>
+          </p:cNvPr>
+          <p:cNvPicPr>
+            <a:picLocks noChangeAspect="1"/>
+          </p:cNvPicPr>
+          <p:nvPr/>
+        </p:nvPicPr>
+        <p:blipFill>
+          <a:blip r:embed="rId2"/>
+          <a:stretch>
+            <a:fillRect/>
+          </a:stretch>
+        </p:blipFill>
+        <p:spPr>
+          <a:xfrm>
+            <a:off x="7693893" y="1691322"/>
+            <a:ext cx="3686174" cy="1900237"/>
+          </a:xfrm>
+          <a:prstGeom prst="rect">
+            <a:avLst/>
+          </a:prstGeom>
+        </p:spPr>
+      </p:pic>
+      <p:pic>
+        <p:nvPicPr>
+          <p:cNvPr id="7" name="Picture 6">
+            <a:extLst>
+              <a:ext uri="{FF2B5EF4-FFF2-40B4-BE49-F238E27FC236}">
+                <a16:creationId xmlns:a16="http://schemas.microsoft.com/office/drawing/2014/main" id="{ABF3DA4B-909B-3D04-B680-156B46963CD0}"/>
+              </a:ext>
+            </a:extLst>
+          </p:cNvPr>
+          <p:cNvPicPr>
+            <a:picLocks noChangeAspect="1"/>
+          </p:cNvPicPr>
+          <p:nvPr/>
+        </p:nvPicPr>
+        <p:blipFill>
+          <a:blip r:embed="rId3"/>
+          <a:stretch>
+            <a:fillRect/>
+          </a:stretch>
+        </p:blipFill>
+        <p:spPr>
+          <a:xfrm>
+            <a:off x="9295369" y="3309634"/>
+            <a:ext cx="2719242" cy="1857044"/>
+          </a:xfrm>
+          <a:prstGeom prst="rect">
+            <a:avLst/>
+          </a:prstGeom>
+        </p:spPr>
+      </p:pic>
+      <p:pic>
+        <p:nvPicPr>
+          <p:cNvPr id="9" name="Picture 8">
+            <a:extLst>
+              <a:ext uri="{FF2B5EF4-FFF2-40B4-BE49-F238E27FC236}">
+                <a16:creationId xmlns:a16="http://schemas.microsoft.com/office/drawing/2014/main" id="{8CBF068A-6438-9260-1FFD-2F0DFE3CF510}"/>
+              </a:ext>
+            </a:extLst>
+          </p:cNvPr>
+          <p:cNvPicPr>
+            <a:picLocks noChangeAspect="1"/>
+          </p:cNvPicPr>
+          <p:nvPr/>
+        </p:nvPicPr>
+        <p:blipFill>
+          <a:blip r:embed="rId4"/>
+          <a:stretch>
+            <a:fillRect/>
+          </a:stretch>
+        </p:blipFill>
+        <p:spPr>
+          <a:xfrm>
+            <a:off x="7613735" y="4378036"/>
+            <a:ext cx="3363269" cy="2317227"/>
+          </a:xfrm>
+          <a:prstGeom prst="rect">
+            <a:avLst/>
+          </a:prstGeom>
+        </p:spPr>
+      </p:pic>
     </p:spTree>
     <p:extLst>
       <p:ext uri="{BB962C8B-B14F-4D97-AF65-F5344CB8AC3E}">
-        <p14:creationId xmlns:p14="http://schemas.microsoft.com/office/powerpoint/2010/main" val="3561758237"/>
+        <p14:creationId xmlns:p14="http://schemas.microsoft.com/office/powerpoint/2010/main" val="3430055599"/>
       </p:ext>
     </p:extLst>
   </p:cSld>
@@ -7375,7 +10033,7 @@
 </p:sld>
 </file>
 
-<file path=ppt/slides/slide20.xml><?xml version="1.0" encoding="utf-8"?>
+<file path=ppt/slides/slide27.xml><?xml version="1.0" encoding="utf-8"?>
 <p:sld xmlns:a="http://schemas.openxmlformats.org/drawingml/2006/main" xmlns:r="http://schemas.openxmlformats.org/officeDocument/2006/relationships" xmlns:p="http://schemas.openxmlformats.org/presentationml/2006/main">
   <p:cSld>
     <p:spTree>
@@ -7415,7 +10073,7 @@
           <a:p>
             <a:r>
               <a:rPr lang="en-GB" dirty="0"/>
-              <a:t>How do I use git on my DfE laptop?</a:t>
+              <a:t>How do I create a repository?</a:t>
             </a:r>
           </a:p>
         </p:txBody>
@@ -7436,52 +10094,34 @@
             <p:ph idx="1"/>
           </p:nvPr>
         </p:nvSpPr>
-        <p:spPr>
-          <a:xfrm>
-            <a:off x="1261872" y="1828800"/>
-            <a:ext cx="6036703" cy="4351337"/>
-          </a:xfrm>
-        </p:spPr>
+        <p:spPr/>
         <p:txBody>
           <a:bodyPr/>
           <a:lstStyle/>
           <a:p>
             <a:r>
               <a:rPr lang="en-GB" dirty="0"/>
-              <a:t>Lots of software can be used to run the git commands:</a:t>
-            </a:r>
-          </a:p>
-          <a:p>
-            <a:pPr lvl="1"/>
+              <a:t>If you just want to have a local repo without creating a remote, then you can create a new repo on your laptop in git bash, R-Studio, GitHub Desktop etc.</a:t>
+            </a:r>
+          </a:p>
+          <a:p>
             <a:r>
               <a:rPr lang="en-GB" dirty="0"/>
-              <a:t>The git download comes with the git bash terminal where you can run git commands like the ones that we’ve seen in this session.</a:t>
-            </a:r>
-          </a:p>
-          <a:p>
-            <a:pPr lvl="1"/>
+              <a:t>If you want a remote repo on DevOps, you’ll need your team, unit or division to have it’s own DevOps Project set up and then ask an admin of that Project to create a new repo for you.</a:t>
+            </a:r>
+          </a:p>
+          <a:p>
             <a:r>
               <a:rPr lang="en-GB" dirty="0"/>
-              <a:t>For day-to-day coding, most IDEs will have built in git functionality, e.g. R-Studio, PyCharm, Visual Studio Code, etc. Most will have GUI and command line (bash) options.</a:t>
-            </a:r>
-          </a:p>
-          <a:p>
-            <a:pPr lvl="1"/>
-            <a:r>
-              <a:rPr lang="en-GB" dirty="0"/>
-              <a:t>GitHub Desktop can be used with GitHub and configured to communicate with the DevOps platform.</a:t>
-            </a:r>
-          </a:p>
-          <a:p>
-            <a:pPr lvl="1"/>
-            <a:endParaRPr lang="en-GB" dirty="0"/>
+              <a:t>If you want a remote repo on GitHub for official (public facing) DfE purposes, then get in touch with us and we can create you one on DfE-Analytical-Services (provided appropriate assurances are provided around suitability for the repo contents to be in the public domain).</a:t>
+            </a:r>
           </a:p>
         </p:txBody>
       </p:sp>
     </p:spTree>
     <p:extLst>
       <p:ext uri="{BB962C8B-B14F-4D97-AF65-F5344CB8AC3E}">
-        <p14:creationId xmlns:p14="http://schemas.microsoft.com/office/powerpoint/2010/main" val="3430055599"/>
+        <p14:creationId xmlns:p14="http://schemas.microsoft.com/office/powerpoint/2010/main" val="2839895223"/>
       </p:ext>
     </p:extLst>
   </p:cSld>
@@ -7491,7 +10131,7 @@
 </p:sld>
 </file>
 
-<file path=ppt/slides/slide21.xml><?xml version="1.0" encoding="utf-8"?>
+<file path=ppt/slides/slide28.xml><?xml version="1.0" encoding="utf-8"?>
 <p:sld xmlns:a="http://schemas.openxmlformats.org/drawingml/2006/main" xmlns:r="http://schemas.openxmlformats.org/officeDocument/2006/relationships" xmlns:p="http://schemas.openxmlformats.org/presentationml/2006/main">
   <p:cSld>
     <p:spTree>
@@ -7524,104 +10164,6 @@
             <p:ph type="title"/>
           </p:nvPr>
         </p:nvSpPr>
-        <p:spPr/>
-        <p:txBody>
-          <a:bodyPr/>
-          <a:lstStyle/>
-          <a:p>
-            <a:r>
-              <a:rPr lang="en-GB" dirty="0"/>
-              <a:t>How do I get a repository?</a:t>
-            </a:r>
-          </a:p>
-        </p:txBody>
-      </p:sp>
-      <p:sp>
-        <p:nvSpPr>
-          <p:cNvPr id="3" name="Content Placeholder 2">
-            <a:extLst>
-              <a:ext uri="{FF2B5EF4-FFF2-40B4-BE49-F238E27FC236}">
-                <a16:creationId xmlns:a16="http://schemas.microsoft.com/office/drawing/2014/main" id="{3021795C-3041-287E-53A7-9DFEBB69C084}"/>
-              </a:ext>
-            </a:extLst>
-          </p:cNvPr>
-          <p:cNvSpPr>
-            <a:spLocks noGrp="1"/>
-          </p:cNvSpPr>
-          <p:nvPr>
-            <p:ph idx="1"/>
-          </p:nvPr>
-        </p:nvSpPr>
-        <p:spPr/>
-        <p:txBody>
-          <a:bodyPr/>
-          <a:lstStyle/>
-          <a:p>
-            <a:r>
-              <a:rPr lang="en-GB" dirty="0"/>
-              <a:t>If you just want to have a local repo without creating a remote, then you can create a new repo on your laptop in git bash, R-Studio, GitHub Desktop etc.</a:t>
-            </a:r>
-          </a:p>
-          <a:p>
-            <a:r>
-              <a:rPr lang="en-GB" dirty="0"/>
-              <a:t>If you want a remote repo on DevOps, you’ll need your team, unit or division to have it’s own DevOps Project set up and then ask an admin of that Project to create a new repo for you.</a:t>
-            </a:r>
-          </a:p>
-          <a:p>
-            <a:r>
-              <a:rPr lang="en-GB" dirty="0"/>
-              <a:t>If you want a remote repo on GitHub for official (public facing) DfE purposes, then get in touch with us and we can create you one on DfE-Analytical-Services (provided appropriate assurances are provided around suitability for the repo contents to be in the public domain).</a:t>
-            </a:r>
-          </a:p>
-        </p:txBody>
-      </p:sp>
-    </p:spTree>
-    <p:extLst>
-      <p:ext uri="{BB962C8B-B14F-4D97-AF65-F5344CB8AC3E}">
-        <p14:creationId xmlns:p14="http://schemas.microsoft.com/office/powerpoint/2010/main" val="2839895223"/>
-      </p:ext>
-    </p:extLst>
-  </p:cSld>
-  <p:clrMapOvr>
-    <a:masterClrMapping/>
-  </p:clrMapOvr>
-</p:sld>
-</file>
-
-<file path=ppt/slides/slide22.xml><?xml version="1.0" encoding="utf-8"?>
-<p:sld xmlns:a="http://schemas.openxmlformats.org/drawingml/2006/main" xmlns:r="http://schemas.openxmlformats.org/officeDocument/2006/relationships" xmlns:p="http://schemas.openxmlformats.org/presentationml/2006/main">
-  <p:cSld>
-    <p:spTree>
-      <p:nvGrpSpPr>
-        <p:cNvPr id="1" name=""/>
-        <p:cNvGrpSpPr/>
-        <p:nvPr/>
-      </p:nvGrpSpPr>
-      <p:grpSpPr>
-        <a:xfrm>
-          <a:off x="0" y="0"/>
-          <a:ext cx="0" cy="0"/>
-          <a:chOff x="0" y="0"/>
-          <a:chExt cx="0" cy="0"/>
-        </a:xfrm>
-      </p:grpSpPr>
-      <p:sp>
-        <p:nvSpPr>
-          <p:cNvPr id="2" name="Title 1">
-            <a:extLst>
-              <a:ext uri="{FF2B5EF4-FFF2-40B4-BE49-F238E27FC236}">
-                <a16:creationId xmlns:a16="http://schemas.microsoft.com/office/drawing/2014/main" id="{A15822F5-14F8-04A7-9687-2A92683631CA}"/>
-              </a:ext>
-            </a:extLst>
-          </p:cNvPr>
-          <p:cNvSpPr>
-            <a:spLocks noGrp="1"/>
-          </p:cNvSpPr>
-          <p:nvPr>
-            <p:ph type="title"/>
-          </p:nvPr>
-        </p:nvSpPr>
         <p:spPr>
           <a:xfrm>
             <a:off x="1261872" y="365760"/>
@@ -7634,7 +10176,7 @@
           <a:p>
             <a:r>
               <a:rPr lang="en-GB" dirty="0"/>
-              <a:t>How do I get a repository?</a:t>
+              <a:t>How do I work in a repository?</a:t>
             </a:r>
           </a:p>
         </p:txBody>
@@ -7989,7 +10531,7 @@
 </p:sld>
 </file>
 
-<file path=ppt/slides/slide23.xml><?xml version="1.0" encoding="utf-8"?>
+<file path=ppt/slides/slide29.xml><?xml version="1.0" encoding="utf-8"?>
 <p:sld xmlns:a="http://schemas.openxmlformats.org/drawingml/2006/main" xmlns:r="http://schemas.openxmlformats.org/officeDocument/2006/relationships" xmlns:p="http://schemas.openxmlformats.org/presentationml/2006/main">
   <p:cSld>
     <p:spTree>
@@ -8024,7 +10566,7 @@
         </p:nvSpPr>
         <p:spPr>
           <a:xfrm>
-            <a:off x="1261872" y="365760"/>
+            <a:off x="310526" y="365760"/>
             <a:ext cx="9692640" cy="839585"/>
           </a:xfrm>
         </p:spPr>
@@ -8059,13 +10601,13 @@
         </p:nvSpPr>
         <p:spPr>
           <a:xfrm>
-            <a:off x="1261872" y="1341794"/>
-            <a:ext cx="8595360" cy="4901063"/>
+            <a:off x="310526" y="1332557"/>
+            <a:ext cx="7004673" cy="5225261"/>
           </a:xfrm>
         </p:spPr>
         <p:txBody>
           <a:bodyPr>
-            <a:normAutofit fontScale="70000" lnSpcReduction="20000"/>
+            <a:normAutofit fontScale="77500" lnSpcReduction="20000"/>
           </a:bodyPr>
           <a:lstStyle/>
           <a:p>
@@ -8218,102 +10760,40 @@
           </a:p>
         </p:txBody>
       </p:sp>
+      <p:pic>
+        <p:nvPicPr>
+          <p:cNvPr id="4" name="Picture 3">
+            <a:extLst>
+              <a:ext uri="{FF2B5EF4-FFF2-40B4-BE49-F238E27FC236}">
+                <a16:creationId xmlns:a16="http://schemas.microsoft.com/office/drawing/2014/main" id="{6B34B5A2-5797-B213-DC31-4123C680DE76}"/>
+              </a:ext>
+            </a:extLst>
+          </p:cNvPr>
+          <p:cNvPicPr>
+            <a:picLocks noChangeAspect="1"/>
+          </p:cNvPicPr>
+          <p:nvPr/>
+        </p:nvPicPr>
+        <p:blipFill>
+          <a:blip r:embed="rId2"/>
+          <a:stretch>
+            <a:fillRect/>
+          </a:stretch>
+        </p:blipFill>
+        <p:spPr>
+          <a:xfrm>
+            <a:off x="7315199" y="1870363"/>
+            <a:ext cx="4989929" cy="2572328"/>
+          </a:xfrm>
+          <a:prstGeom prst="rect">
+            <a:avLst/>
+          </a:prstGeom>
+        </p:spPr>
+      </p:pic>
     </p:spTree>
     <p:extLst>
       <p:ext uri="{BB962C8B-B14F-4D97-AF65-F5344CB8AC3E}">
         <p14:creationId xmlns:p14="http://schemas.microsoft.com/office/powerpoint/2010/main" val="4207979057"/>
-      </p:ext>
-    </p:extLst>
-  </p:cSld>
-  <p:clrMapOvr>
-    <a:masterClrMapping/>
-  </p:clrMapOvr>
-</p:sld>
-</file>
-
-<file path=ppt/slides/slide24.xml><?xml version="1.0" encoding="utf-8"?>
-<p:sld xmlns:a="http://schemas.openxmlformats.org/drawingml/2006/main" xmlns:r="http://schemas.openxmlformats.org/officeDocument/2006/relationships" xmlns:p="http://schemas.openxmlformats.org/presentationml/2006/main">
-  <p:cSld>
-    <p:spTree>
-      <p:nvGrpSpPr>
-        <p:cNvPr id="1" name=""/>
-        <p:cNvGrpSpPr/>
-        <p:nvPr/>
-      </p:nvGrpSpPr>
-      <p:grpSpPr>
-        <a:xfrm>
-          <a:off x="0" y="0"/>
-          <a:ext cx="0" cy="0"/>
-          <a:chOff x="0" y="0"/>
-          <a:chExt cx="0" cy="0"/>
-        </a:xfrm>
-      </p:grpSpPr>
-      <p:sp>
-        <p:nvSpPr>
-          <p:cNvPr id="2" name="Title 1">
-            <a:extLst>
-              <a:ext uri="{FF2B5EF4-FFF2-40B4-BE49-F238E27FC236}">
-                <a16:creationId xmlns:a16="http://schemas.microsoft.com/office/drawing/2014/main" id="{639F6E01-2D4A-7F85-D6AC-57E5F00EE165}"/>
-              </a:ext>
-            </a:extLst>
-          </p:cNvPr>
-          <p:cNvSpPr>
-            <a:spLocks noGrp="1"/>
-          </p:cNvSpPr>
-          <p:nvPr>
-            <p:ph type="title"/>
-          </p:nvPr>
-        </p:nvSpPr>
-        <p:spPr/>
-        <p:txBody>
-          <a:bodyPr/>
-          <a:lstStyle/>
-          <a:p>
-            <a:r>
-              <a:rPr lang="en-GB" dirty="0"/>
-              <a:t>The wrap up!</a:t>
-            </a:r>
-          </a:p>
-        </p:txBody>
-      </p:sp>
-      <p:sp>
-        <p:nvSpPr>
-          <p:cNvPr id="3" name="Content Placeholder 2">
-            <a:extLst>
-              <a:ext uri="{FF2B5EF4-FFF2-40B4-BE49-F238E27FC236}">
-                <a16:creationId xmlns:a16="http://schemas.microsoft.com/office/drawing/2014/main" id="{D4DED814-E6CB-FCA7-FDF0-7391BEA613BB}"/>
-              </a:ext>
-            </a:extLst>
-          </p:cNvPr>
-          <p:cNvSpPr>
-            <a:spLocks noGrp="1"/>
-          </p:cNvSpPr>
-          <p:nvPr>
-            <p:ph idx="1"/>
-          </p:nvPr>
-        </p:nvSpPr>
-        <p:spPr/>
-        <p:txBody>
-          <a:bodyPr/>
-          <a:lstStyle/>
-          <a:p>
-            <a:r>
-              <a:rPr lang="en-GB" dirty="0"/>
-              <a:t>Thanks for joining the session!</a:t>
-            </a:r>
-          </a:p>
-          <a:p>
-            <a:r>
-              <a:rPr lang="en-GB" dirty="0"/>
-              <a:t>Any questions?!</a:t>
-            </a:r>
-          </a:p>
-        </p:txBody>
-      </p:sp>
-    </p:spTree>
-    <p:extLst>
-      <p:ext uri="{BB962C8B-B14F-4D97-AF65-F5344CB8AC3E}">
-        <p14:creationId xmlns:p14="http://schemas.microsoft.com/office/powerpoint/2010/main" val="1582339638"/>
       </p:ext>
     </p:extLst>
   </p:cSld>
@@ -8393,7 +10873,7 @@
           <a:p>
             <a:r>
               <a:rPr lang="en-GB" sz="3200" dirty="0"/>
-              <a:t>A quick (and maybe fun) intro to using git:</a:t>
+              <a:t>A quick (and maybe fun) intro to using Git:</a:t>
             </a:r>
           </a:p>
           <a:p>
@@ -8407,14 +10887,14 @@
             <a:pPr lvl="1"/>
             <a:r>
               <a:rPr lang="en-GB" sz="2800" dirty="0"/>
-              <a:t>What’s the difference between local and remote repositories and git, GitHub and Dev Ops?</a:t>
+              <a:t>What’s the difference between local and remote repositories and Git, GitHub and Dev Ops?</a:t>
             </a:r>
           </a:p>
           <a:p>
             <a:pPr lvl="1"/>
             <a:r>
               <a:rPr lang="en-GB" sz="2800" dirty="0"/>
-              <a:t>Working with git</a:t>
+              <a:t>Working with Git</a:t>
             </a:r>
           </a:p>
           <a:p>
@@ -8444,6 +10924,145 @@
     <p:extLst>
       <p:ext uri="{BB962C8B-B14F-4D97-AF65-F5344CB8AC3E}">
         <p14:creationId xmlns:p14="http://schemas.microsoft.com/office/powerpoint/2010/main" val="304461431"/>
+      </p:ext>
+    </p:extLst>
+  </p:cSld>
+  <p:clrMapOvr>
+    <a:masterClrMapping/>
+  </p:clrMapOvr>
+</p:sld>
+</file>
+
+<file path=ppt/slides/slide30.xml><?xml version="1.0" encoding="utf-8"?>
+<p:sld xmlns:a="http://schemas.openxmlformats.org/drawingml/2006/main" xmlns:r="http://schemas.openxmlformats.org/officeDocument/2006/relationships" xmlns:p="http://schemas.openxmlformats.org/presentationml/2006/main">
+  <p:cSld>
+    <p:spTree>
+      <p:nvGrpSpPr>
+        <p:cNvPr id="1" name=""/>
+        <p:cNvGrpSpPr/>
+        <p:nvPr/>
+      </p:nvGrpSpPr>
+      <p:grpSpPr>
+        <a:xfrm>
+          <a:off x="0" y="0"/>
+          <a:ext cx="0" cy="0"/>
+          <a:chOff x="0" y="0"/>
+          <a:chExt cx="0" cy="0"/>
+        </a:xfrm>
+      </p:grpSpPr>
+      <p:sp>
+        <p:nvSpPr>
+          <p:cNvPr id="2" name="Title 1">
+            <a:extLst>
+              <a:ext uri="{FF2B5EF4-FFF2-40B4-BE49-F238E27FC236}">
+                <a16:creationId xmlns:a16="http://schemas.microsoft.com/office/drawing/2014/main" id="{639F6E01-2D4A-7F85-D6AC-57E5F00EE165}"/>
+              </a:ext>
+            </a:extLst>
+          </p:cNvPr>
+          <p:cNvSpPr>
+            <a:spLocks noGrp="1"/>
+          </p:cNvSpPr>
+          <p:nvPr>
+            <p:ph type="title"/>
+          </p:nvPr>
+        </p:nvSpPr>
+        <p:spPr/>
+        <p:txBody>
+          <a:bodyPr/>
+          <a:lstStyle/>
+          <a:p>
+            <a:r>
+              <a:rPr lang="en-GB" dirty="0"/>
+              <a:t>The wrap up!</a:t>
+            </a:r>
+          </a:p>
+        </p:txBody>
+      </p:sp>
+      <p:sp>
+        <p:nvSpPr>
+          <p:cNvPr id="3" name="Content Placeholder 2">
+            <a:extLst>
+              <a:ext uri="{FF2B5EF4-FFF2-40B4-BE49-F238E27FC236}">
+                <a16:creationId xmlns:a16="http://schemas.microsoft.com/office/drawing/2014/main" id="{D4DED814-E6CB-FCA7-FDF0-7391BEA613BB}"/>
+              </a:ext>
+            </a:extLst>
+          </p:cNvPr>
+          <p:cNvSpPr>
+            <a:spLocks noGrp="1"/>
+          </p:cNvSpPr>
+          <p:nvPr>
+            <p:ph idx="1"/>
+          </p:nvPr>
+        </p:nvSpPr>
+        <p:spPr/>
+        <p:txBody>
+          <a:bodyPr/>
+          <a:lstStyle/>
+          <a:p>
+            <a:r>
+              <a:rPr lang="en-GB" dirty="0"/>
+              <a:t>Thanks for joining the session!</a:t>
+            </a:r>
+          </a:p>
+          <a:p>
+            <a:r>
+              <a:rPr lang="en-GB" dirty="0"/>
+              <a:t>Any questions?!</a:t>
+            </a:r>
+          </a:p>
+          <a:p>
+            <a:r>
+              <a:rPr lang="en-GB" dirty="0"/>
+              <a:t>For anything at all you want to check with us post-workshop;</a:t>
+            </a:r>
+          </a:p>
+          <a:p>
+            <a:pPr lvl="1"/>
+            <a:r>
+              <a:rPr lang="en-GB" dirty="0">
+                <a:hlinkClick r:id="rId2"/>
+              </a:rPr>
+              <a:t>statistics.development@education.gov.uk</a:t>
+            </a:r>
+            <a:r>
+              <a:rPr lang="en-GB" dirty="0"/>
+              <a:t> </a:t>
+            </a:r>
+          </a:p>
+          <a:p>
+            <a:pPr lvl="1"/>
+            <a:r>
+              <a:rPr lang="en-GB" dirty="0"/>
+              <a:t>Typical queries we get:	</a:t>
+            </a:r>
+          </a:p>
+          <a:p>
+            <a:pPr lvl="2"/>
+            <a:r>
+              <a:rPr lang="en-GB" dirty="0"/>
+              <a:t>Can you host a repository for me?</a:t>
+            </a:r>
+          </a:p>
+          <a:p>
+            <a:pPr lvl="2"/>
+            <a:r>
+              <a:rPr lang="en-GB" dirty="0"/>
+              <a:t>Can my team members join your next workshop?</a:t>
+            </a:r>
+          </a:p>
+          <a:p>
+            <a:pPr lvl="2"/>
+            <a:r>
+              <a:rPr lang="en-GB" dirty="0"/>
+              <a:t>I think I broke something; how do I fix it?</a:t>
+            </a:r>
+          </a:p>
+        </p:txBody>
+      </p:sp>
+    </p:spTree>
+    <p:extLst>
+      <p:ext uri="{BB962C8B-B14F-4D97-AF65-F5344CB8AC3E}">
+        <p14:creationId xmlns:p14="http://schemas.microsoft.com/office/powerpoint/2010/main" val="1582339638"/>
       </p:ext>
     </p:extLst>
   </p:cSld>
@@ -8493,7 +11112,7 @@
           <a:p>
             <a:r>
               <a:rPr lang="en-GB" dirty="0"/>
-              <a:t>What are the key blockers to you using git?</a:t>
+              <a:t>What are the key blockers to you using Git?</a:t>
             </a:r>
           </a:p>
         </p:txBody>
@@ -8518,6 +11137,12 @@
         <p:txBody>
           <a:bodyPr/>
           <a:lstStyle/>
+          <a:p>
+            <a:r>
+              <a:rPr lang="en-GB" dirty="0"/>
+              <a:t>I have no idea what you’re talking about!</a:t>
+            </a:r>
+          </a:p>
           <a:p>
             <a:r>
               <a:rPr lang="en-GB" dirty="0"/>
@@ -8848,6 +11473,55 @@
                                           <p:spTgt spid="3">
                                             <p:txEl>
                                               <p:pRg st="5" end="5"/>
+                                            </p:txEl>
+                                          </p:spTgt>
+                                        </p:tgtEl>
+                                        <p:attrNameLst>
+                                          <p:attrName>style.visibility</p:attrName>
+                                        </p:attrNameLst>
+                                      </p:cBhvr>
+                                      <p:to>
+                                        <p:strVal val="visible"/>
+                                      </p:to>
+                                    </p:set>
+                                  </p:childTnLst>
+                                </p:cTn>
+                              </p:par>
+                            </p:childTnLst>
+                          </p:cTn>
+                        </p:par>
+                      </p:childTnLst>
+                    </p:cTn>
+                  </p:par>
+                  <p:par>
+                    <p:cTn id="27" fill="hold">
+                      <p:stCondLst>
+                        <p:cond delay="indefinite"/>
+                      </p:stCondLst>
+                      <p:childTnLst>
+                        <p:par>
+                          <p:cTn id="28" fill="hold">
+                            <p:stCondLst>
+                              <p:cond delay="0"/>
+                            </p:stCondLst>
+                            <p:childTnLst>
+                              <p:par>
+                                <p:cTn id="29" presetID="1" presetClass="entr" presetSubtype="0" fill="hold" grpId="0" nodeType="clickEffect">
+                                  <p:stCondLst>
+                                    <p:cond delay="0"/>
+                                  </p:stCondLst>
+                                  <p:childTnLst>
+                                    <p:set>
+                                      <p:cBhvr>
+                                        <p:cTn id="30" dur="1" fill="hold">
+                                          <p:stCondLst>
+                                            <p:cond delay="0"/>
+                                          </p:stCondLst>
+                                        </p:cTn>
+                                        <p:tgtEl>
+                                          <p:spTgt spid="3">
+                                            <p:txEl>
+                                              <p:pRg st="6" end="6"/>
                                             </p:txEl>
                                           </p:spTgt>
                                         </p:tgtEl>
@@ -8936,7 +11610,7 @@
           <a:p>
             <a:r>
               <a:rPr lang="en-GB" dirty="0"/>
-              <a:t>What is git?</a:t>
+              <a:t>What is Git?</a:t>
             </a:r>
           </a:p>
         </p:txBody>
@@ -9910,7 +12584,7 @@
           <a:p>
             <a:r>
               <a:rPr lang="en-GB" dirty="0"/>
-              <a:t>What are the key benefits of using git?</a:t>
+              <a:t>What are the key benefits of using Git?</a:t>
             </a:r>
           </a:p>
         </p:txBody>
@@ -10900,7 +13574,15 @@
           <a:p>
             <a:r>
               <a:rPr lang="en-GB" dirty="0"/>
-              <a:t>The command git commit saves the progress of your work in a repo.</a:t>
+              <a:t>The command </a:t>
+            </a:r>
+            <a:r>
+              <a:rPr lang="en-GB" i="1" dirty="0"/>
+              <a:t>git commit </a:t>
+            </a:r>
+            <a:r>
+              <a:rPr lang="en-GB" dirty="0"/>
+              <a:t>saves the progress of your work in a repo.</a:t>
             </a:r>
           </a:p>
           <a:p>

</xml_diff>

<commit_message>
Rearranged quick git intro slides
</commit_message>
<xml_diff>
--- a/slides/workshopslides_quick-git.pptx
+++ b/slides/workshopslides_quick-git.pptx
@@ -8,9 +8,9 @@
     <p:sldId id="256" r:id="rId2"/>
     <p:sldId id="268" r:id="rId3"/>
     <p:sldId id="257" r:id="rId4"/>
-    <p:sldId id="260" r:id="rId5"/>
-    <p:sldId id="258" r:id="rId6"/>
-    <p:sldId id="259" r:id="rId7"/>
+    <p:sldId id="258" r:id="rId5"/>
+    <p:sldId id="259" r:id="rId6"/>
+    <p:sldId id="260" r:id="rId7"/>
     <p:sldId id="264" r:id="rId8"/>
     <p:sldId id="261" r:id="rId9"/>
     <p:sldId id="269" r:id="rId10"/>
@@ -145,9 +145,9 @@
           <p14:sldIdLst>
             <p14:sldId id="268"/>
             <p14:sldId id="257"/>
-            <p14:sldId id="260"/>
             <p14:sldId id="258"/>
             <p14:sldId id="259"/>
+            <p14:sldId id="260"/>
             <p14:sldId id="264"/>
           </p14:sldIdLst>
         </p14:section>
@@ -391,7 +391,7 @@
           <a:p>
             <a:fld id="{7E3A1397-DDBE-4990-A86F-207B0B9A1F2C}" type="datetimeFigureOut">
               <a:rPr lang="en-GB" smtClean="0"/>
-              <a:t>20/09/2023</a:t>
+              <a:t>21/09/2023</a:t>
             </a:fld>
             <a:endParaRPr lang="en-GB"/>
           </a:p>
@@ -615,7 +615,7 @@
           <a:p>
             <a:fld id="{7E3A1397-DDBE-4990-A86F-207B0B9A1F2C}" type="datetimeFigureOut">
               <a:rPr lang="en-GB" smtClean="0"/>
-              <a:t>20/09/2023</a:t>
+              <a:t>21/09/2023</a:t>
             </a:fld>
             <a:endParaRPr lang="en-GB"/>
           </a:p>
@@ -795,7 +795,7 @@
           <a:p>
             <a:fld id="{7E3A1397-DDBE-4990-A86F-207B0B9A1F2C}" type="datetimeFigureOut">
               <a:rPr lang="en-GB" smtClean="0"/>
-              <a:t>20/09/2023</a:t>
+              <a:t>21/09/2023</a:t>
             </a:fld>
             <a:endParaRPr lang="en-GB"/>
           </a:p>
@@ -965,7 +965,7 @@
           <a:p>
             <a:fld id="{7E3A1397-DDBE-4990-A86F-207B0B9A1F2C}" type="datetimeFigureOut">
               <a:rPr lang="en-GB" smtClean="0"/>
-              <a:t>20/09/2023</a:t>
+              <a:t>21/09/2023</a:t>
             </a:fld>
             <a:endParaRPr lang="en-GB"/>
           </a:p>
@@ -1256,7 +1256,7 @@
           <a:p>
             <a:fld id="{7E3A1397-DDBE-4990-A86F-207B0B9A1F2C}" type="datetimeFigureOut">
               <a:rPr lang="en-GB" smtClean="0"/>
-              <a:t>20/09/2023</a:t>
+              <a:t>21/09/2023</a:t>
             </a:fld>
             <a:endParaRPr lang="en-GB"/>
           </a:p>
@@ -1582,7 +1582,7 @@
           <a:p>
             <a:fld id="{7E3A1397-DDBE-4990-A86F-207B0B9A1F2C}" type="datetimeFigureOut">
               <a:rPr lang="en-GB" smtClean="0"/>
-              <a:t>20/09/2023</a:t>
+              <a:t>21/09/2023</a:t>
             </a:fld>
             <a:endParaRPr lang="en-GB"/>
           </a:p>
@@ -1994,7 +1994,7 @@
           <a:p>
             <a:fld id="{7E3A1397-DDBE-4990-A86F-207B0B9A1F2C}" type="datetimeFigureOut">
               <a:rPr lang="en-GB" smtClean="0"/>
-              <a:t>20/09/2023</a:t>
+              <a:t>21/09/2023</a:t>
             </a:fld>
             <a:endParaRPr lang="en-GB"/>
           </a:p>
@@ -2112,7 +2112,7 @@
           <a:p>
             <a:fld id="{7E3A1397-DDBE-4990-A86F-207B0B9A1F2C}" type="datetimeFigureOut">
               <a:rPr lang="en-GB" smtClean="0"/>
-              <a:t>20/09/2023</a:t>
+              <a:t>21/09/2023</a:t>
             </a:fld>
             <a:endParaRPr lang="en-GB"/>
           </a:p>
@@ -2207,7 +2207,7 @@
           <a:p>
             <a:fld id="{7E3A1397-DDBE-4990-A86F-207B0B9A1F2C}" type="datetimeFigureOut">
               <a:rPr lang="en-GB" smtClean="0"/>
-              <a:t>20/09/2023</a:t>
+              <a:t>21/09/2023</a:t>
             </a:fld>
             <a:endParaRPr lang="en-GB"/>
           </a:p>
@@ -2494,7 +2494,7 @@
           <a:p>
             <a:fld id="{7E3A1397-DDBE-4990-A86F-207B0B9A1F2C}" type="datetimeFigureOut">
               <a:rPr lang="en-GB" smtClean="0"/>
-              <a:t>20/09/2023</a:t>
+              <a:t>21/09/2023</a:t>
             </a:fld>
             <a:endParaRPr lang="en-GB"/>
           </a:p>
@@ -2771,7 +2771,7 @@
           <a:p>
             <a:fld id="{7E3A1397-DDBE-4990-A86F-207B0B9A1F2C}" type="datetimeFigureOut">
               <a:rPr lang="en-GB" smtClean="0"/>
-              <a:t>20/09/2023</a:t>
+              <a:t>21/09/2023</a:t>
             </a:fld>
             <a:endParaRPr lang="en-GB"/>
           </a:p>
@@ -3022,7 +3022,7 @@
           <a:p>
             <a:fld id="{7E3A1397-DDBE-4990-A86F-207B0B9A1F2C}" type="datetimeFigureOut">
               <a:rPr lang="en-GB" smtClean="0"/>
-              <a:t>20/09/2023</a:t>
+              <a:t>21/09/2023</a:t>
             </a:fld>
             <a:endParaRPr lang="en-GB"/>
           </a:p>
@@ -11094,7 +11094,7 @@
           <p:cNvPr id="2" name="Title 1">
             <a:extLst>
               <a:ext uri="{FF2B5EF4-FFF2-40B4-BE49-F238E27FC236}">
-                <a16:creationId xmlns:a16="http://schemas.microsoft.com/office/drawing/2014/main" id="{001B293D-B603-DE94-CAEE-6BF7C72DA4D2}"/>
+                <a16:creationId xmlns:a16="http://schemas.microsoft.com/office/drawing/2014/main" id="{C6DBF5C6-296C-82A2-BF5C-DA8B3C71438C}"/>
               </a:ext>
             </a:extLst>
           </p:cNvPr>
@@ -11112,7 +11112,7 @@
           <a:p>
             <a:r>
               <a:rPr lang="en-GB" dirty="0"/>
-              <a:t>What are the key blockers to you using Git?</a:t>
+              <a:t>What is Git?</a:t>
             </a:r>
           </a:p>
         </p:txBody>
@@ -11122,7 +11122,7 @@
           <p:cNvPr id="3" name="Content Placeholder 2">
             <a:extLst>
               <a:ext uri="{FF2B5EF4-FFF2-40B4-BE49-F238E27FC236}">
-                <a16:creationId xmlns:a16="http://schemas.microsoft.com/office/drawing/2014/main" id="{D81F6B97-ECF7-8CD4-60B7-A2877F3168AD}"/>
+                <a16:creationId xmlns:a16="http://schemas.microsoft.com/office/drawing/2014/main" id="{FDF9507C-5200-B177-C436-D96E54B43F25}"/>
               </a:ext>
             </a:extLst>
           </p:cNvPr>
@@ -11135,56 +11135,69 @@
         </p:nvSpPr>
         <p:spPr/>
         <p:txBody>
-          <a:bodyPr/>
+          <a:bodyPr>
+            <a:normAutofit/>
+          </a:bodyPr>
           <a:lstStyle/>
           <a:p>
             <a:r>
-              <a:rPr lang="en-GB" dirty="0"/>
-              <a:t>I have no idea what you’re talking about!</a:t>
-            </a:r>
-          </a:p>
-          <a:p>
-            <a:r>
-              <a:rPr lang="en-GB" dirty="0"/>
-              <a:t>Team or personal expertise/knowledge/capability</a:t>
-            </a:r>
-          </a:p>
-          <a:p>
-            <a:r>
-              <a:rPr lang="en-GB" dirty="0"/>
-              <a:t>Not enough support in the department</a:t>
-            </a:r>
-          </a:p>
-          <a:p>
-            <a:r>
-              <a:rPr lang="en-GB" dirty="0"/>
-              <a:t>Challenges in setting it (and RStudio) up on work machines</a:t>
-            </a:r>
-          </a:p>
-          <a:p>
-            <a:r>
-              <a:rPr lang="en-GB" dirty="0"/>
-              <a:t>Don’t see how it benefits us compared to what we already do just on shared drives</a:t>
-            </a:r>
-          </a:p>
-          <a:p>
-            <a:r>
-              <a:rPr lang="en-GB" dirty="0"/>
-              <a:t>Just don’t get the concept!</a:t>
-            </a:r>
-          </a:p>
-          <a:p>
-            <a:r>
-              <a:rPr lang="en-GB" dirty="0"/>
-              <a:t>Overwhelmed by too much to learn alongside R and SQL learning.</a:t>
-            </a:r>
+              <a:rPr lang="en-GB" sz="2800" dirty="0"/>
+              <a:t>Git is a piece of software designed for version control, i.e.</a:t>
+            </a:r>
+          </a:p>
+          <a:p>
+            <a:pPr lvl="1"/>
+            <a:r>
+              <a:rPr lang="en-GB" sz="2400" dirty="0"/>
+              <a:t>Tracking changes;</a:t>
+            </a:r>
+          </a:p>
+          <a:p>
+            <a:pPr lvl="1"/>
+            <a:r>
+              <a:rPr lang="en-GB" sz="2400" dirty="0"/>
+              <a:t>Undoing changes;</a:t>
+            </a:r>
+          </a:p>
+          <a:p>
+            <a:pPr lvl="1"/>
+            <a:r>
+              <a:rPr lang="en-GB" sz="2400" dirty="0"/>
+              <a:t>Maintaining parallel variants of code.</a:t>
+            </a:r>
+          </a:p>
+          <a:p>
+            <a:r>
+              <a:rPr lang="en-GB" sz="2800" dirty="0"/>
+              <a:t>Git works with repositories:</a:t>
+            </a:r>
+          </a:p>
+          <a:p>
+            <a:pPr lvl="1"/>
+            <a:r>
+              <a:rPr lang="en-GB" sz="2400" dirty="0"/>
+              <a:t>A repository (or repo) is simply a folder containing all the version controlled files of a given project.</a:t>
+            </a:r>
+          </a:p>
+          <a:p>
+            <a:pPr lvl="1"/>
+            <a:r>
+              <a:rPr lang="en-GB" sz="2400" dirty="0"/>
+              <a:t>It can have multiple sub-folders that will can also be tracked.</a:t>
+            </a:r>
+          </a:p>
+          <a:p>
+            <a:pPr marL="0" indent="0">
+              <a:buNone/>
+            </a:pPr>
+            <a:endParaRPr lang="en-GB" dirty="0"/>
           </a:p>
         </p:txBody>
       </p:sp>
     </p:spTree>
     <p:extLst>
       <p:ext uri="{BB962C8B-B14F-4D97-AF65-F5344CB8AC3E}">
-        <p14:creationId xmlns:p14="http://schemas.microsoft.com/office/powerpoint/2010/main" val="3862344689"/>
+        <p14:creationId xmlns:p14="http://schemas.microsoft.com/office/powerpoint/2010/main" val="3343195961"/>
       </p:ext>
     </p:extLst>
   </p:cSld>
@@ -11242,33 +11255,15 @@
                                   </p:childTnLst>
                                 </p:cTn>
                               </p:par>
-                            </p:childTnLst>
-                          </p:cTn>
-                        </p:par>
-                      </p:childTnLst>
-                    </p:cTn>
-                  </p:par>
-                  <p:par>
-                    <p:cTn id="7" fill="hold">
-                      <p:stCondLst>
-                        <p:cond delay="indefinite"/>
-                      </p:stCondLst>
-                      <p:childTnLst>
-                        <p:par>
-                          <p:cTn id="8" fill="hold">
-                            <p:stCondLst>
-                              <p:cond delay="0"/>
-                            </p:stCondLst>
-                            <p:childTnLst>
                               <p:par>
-                                <p:cTn id="9" presetID="1" presetClass="entr" presetSubtype="0" fill="hold" grpId="0" nodeType="clickEffect">
+                                <p:cTn id="7" presetID="1" presetClass="entr" presetSubtype="0" fill="hold" grpId="0" nodeType="withEffect">
                                   <p:stCondLst>
                                     <p:cond delay="0"/>
                                   </p:stCondLst>
                                   <p:childTnLst>
                                     <p:set>
                                       <p:cBhvr>
-                                        <p:cTn id="10" dur="1" fill="hold">
+                                        <p:cTn id="8" dur="1" fill="hold">
                                           <p:stCondLst>
                                             <p:cond delay="0"/>
                                           </p:stCondLst>
@@ -11277,6 +11272,68 @@
                                           <p:spTgt spid="3">
                                             <p:txEl>
                                               <p:pRg st="1" end="1"/>
+                                            </p:txEl>
+                                          </p:spTgt>
+                                        </p:tgtEl>
+                                        <p:attrNameLst>
+                                          <p:attrName>style.visibility</p:attrName>
+                                        </p:attrNameLst>
+                                      </p:cBhvr>
+                                      <p:to>
+                                        <p:strVal val="visible"/>
+                                      </p:to>
+                                    </p:set>
+                                  </p:childTnLst>
+                                </p:cTn>
+                              </p:par>
+                              <p:par>
+                                <p:cTn id="9" presetID="1" presetClass="entr" presetSubtype="0" fill="hold" grpId="0" nodeType="withEffect">
+                                  <p:stCondLst>
+                                    <p:cond delay="0"/>
+                                  </p:stCondLst>
+                                  <p:childTnLst>
+                                    <p:set>
+                                      <p:cBhvr>
+                                        <p:cTn id="10" dur="1" fill="hold">
+                                          <p:stCondLst>
+                                            <p:cond delay="0"/>
+                                          </p:stCondLst>
+                                        </p:cTn>
+                                        <p:tgtEl>
+                                          <p:spTgt spid="3">
+                                            <p:txEl>
+                                              <p:pRg st="2" end="2"/>
+                                            </p:txEl>
+                                          </p:spTgt>
+                                        </p:tgtEl>
+                                        <p:attrNameLst>
+                                          <p:attrName>style.visibility</p:attrName>
+                                        </p:attrNameLst>
+                                      </p:cBhvr>
+                                      <p:to>
+                                        <p:strVal val="visible"/>
+                                      </p:to>
+                                    </p:set>
+                                  </p:childTnLst>
+                                </p:cTn>
+                              </p:par>
+                              <p:par>
+                                <p:cTn id="11" presetID="1" presetClass="entr" presetSubtype="0" fill="hold" grpId="0" nodeType="withEffect">
+                                  <p:stCondLst>
+                                    <p:cond delay="0"/>
+                                  </p:stCondLst>
+                                  <p:childTnLst>
+                                    <p:set>
+                                      <p:cBhvr>
+                                        <p:cTn id="12" dur="1" fill="hold">
+                                          <p:stCondLst>
+                                            <p:cond delay="0"/>
+                                          </p:stCondLst>
+                                        </p:cTn>
+                                        <p:tgtEl>
+                                          <p:spTgt spid="3">
+                                            <p:txEl>
+                                              <p:pRg st="3" end="3"/>
                                             </p:txEl>
                                           </p:spTgt>
                                         </p:tgtEl>
@@ -11298,26 +11355,26 @@
                     </p:cTn>
                   </p:par>
                   <p:par>
-                    <p:cTn id="11" fill="hold">
+                    <p:cTn id="13" fill="hold">
                       <p:stCondLst>
                         <p:cond delay="indefinite"/>
                       </p:stCondLst>
                       <p:childTnLst>
                         <p:par>
-                          <p:cTn id="12" fill="hold">
+                          <p:cTn id="14" fill="hold">
                             <p:stCondLst>
                               <p:cond delay="0"/>
                             </p:stCondLst>
                             <p:childTnLst>
                               <p:par>
-                                <p:cTn id="13" presetID="1" presetClass="entr" presetSubtype="0" fill="hold" grpId="0" nodeType="clickEffect">
+                                <p:cTn id="15" presetID="1" presetClass="entr" presetSubtype="0" fill="hold" grpId="0" nodeType="clickEffect">
                                   <p:stCondLst>
                                     <p:cond delay="0"/>
                                   </p:stCondLst>
                                   <p:childTnLst>
                                     <p:set>
                                       <p:cBhvr>
-                                        <p:cTn id="14" dur="1" fill="hold">
+                                        <p:cTn id="16" dur="1" fill="hold">
                                           <p:stCondLst>
                                             <p:cond delay="0"/>
                                           </p:stCondLst>
@@ -11325,7 +11382,7 @@
                                         <p:tgtEl>
                                           <p:spTgt spid="3">
                                             <p:txEl>
-                                              <p:pRg st="2" end="2"/>
+                                              <p:pRg st="4" end="4"/>
                                             </p:txEl>
                                           </p:spTgt>
                                         </p:tgtEl>
@@ -11340,26 +11397,8 @@
                                   </p:childTnLst>
                                 </p:cTn>
                               </p:par>
-                            </p:childTnLst>
-                          </p:cTn>
-                        </p:par>
-                      </p:childTnLst>
-                    </p:cTn>
-                  </p:par>
-                  <p:par>
-                    <p:cTn id="15" fill="hold">
-                      <p:stCondLst>
-                        <p:cond delay="indefinite"/>
-                      </p:stCondLst>
-                      <p:childTnLst>
-                        <p:par>
-                          <p:cTn id="16" fill="hold">
-                            <p:stCondLst>
-                              <p:cond delay="0"/>
-                            </p:stCondLst>
-                            <p:childTnLst>
                               <p:par>
-                                <p:cTn id="17" presetID="1" presetClass="entr" presetSubtype="0" fill="hold" grpId="0" nodeType="clickEffect">
+                                <p:cTn id="17" presetID="1" presetClass="entr" presetSubtype="0" fill="hold" grpId="0" nodeType="withEffect">
                                   <p:stCondLst>
                                     <p:cond delay="0"/>
                                   </p:stCondLst>
@@ -11374,7 +11413,7 @@
                                         <p:tgtEl>
                                           <p:spTgt spid="3">
                                             <p:txEl>
-                                              <p:pRg st="3" end="3"/>
+                                              <p:pRg st="5" end="5"/>
                                             </p:txEl>
                                           </p:spTgt>
                                         </p:tgtEl>
@@ -11389,131 +11428,15 @@
                                   </p:childTnLst>
                                 </p:cTn>
                               </p:par>
-                            </p:childTnLst>
-                          </p:cTn>
-                        </p:par>
-                      </p:childTnLst>
-                    </p:cTn>
-                  </p:par>
-                  <p:par>
-                    <p:cTn id="19" fill="hold">
-                      <p:stCondLst>
-                        <p:cond delay="indefinite"/>
-                      </p:stCondLst>
-                      <p:childTnLst>
-                        <p:par>
-                          <p:cTn id="20" fill="hold">
-                            <p:stCondLst>
-                              <p:cond delay="0"/>
-                            </p:stCondLst>
-                            <p:childTnLst>
                               <p:par>
-                                <p:cTn id="21" presetID="1" presetClass="entr" presetSubtype="0" fill="hold" grpId="0" nodeType="clickEffect">
+                                <p:cTn id="19" presetID="1" presetClass="entr" presetSubtype="0" fill="hold" grpId="0" nodeType="withEffect">
                                   <p:stCondLst>
                                     <p:cond delay="0"/>
                                   </p:stCondLst>
                                   <p:childTnLst>
                                     <p:set>
                                       <p:cBhvr>
-                                        <p:cTn id="22" dur="1" fill="hold">
-                                          <p:stCondLst>
-                                            <p:cond delay="0"/>
-                                          </p:stCondLst>
-                                        </p:cTn>
-                                        <p:tgtEl>
-                                          <p:spTgt spid="3">
-                                            <p:txEl>
-                                              <p:pRg st="4" end="4"/>
-                                            </p:txEl>
-                                          </p:spTgt>
-                                        </p:tgtEl>
-                                        <p:attrNameLst>
-                                          <p:attrName>style.visibility</p:attrName>
-                                        </p:attrNameLst>
-                                      </p:cBhvr>
-                                      <p:to>
-                                        <p:strVal val="visible"/>
-                                      </p:to>
-                                    </p:set>
-                                  </p:childTnLst>
-                                </p:cTn>
-                              </p:par>
-                            </p:childTnLst>
-                          </p:cTn>
-                        </p:par>
-                      </p:childTnLst>
-                    </p:cTn>
-                  </p:par>
-                  <p:par>
-                    <p:cTn id="23" fill="hold">
-                      <p:stCondLst>
-                        <p:cond delay="indefinite"/>
-                      </p:stCondLst>
-                      <p:childTnLst>
-                        <p:par>
-                          <p:cTn id="24" fill="hold">
-                            <p:stCondLst>
-                              <p:cond delay="0"/>
-                            </p:stCondLst>
-                            <p:childTnLst>
-                              <p:par>
-                                <p:cTn id="25" presetID="1" presetClass="entr" presetSubtype="0" fill="hold" grpId="0" nodeType="clickEffect">
-                                  <p:stCondLst>
-                                    <p:cond delay="0"/>
-                                  </p:stCondLst>
-                                  <p:childTnLst>
-                                    <p:set>
-                                      <p:cBhvr>
-                                        <p:cTn id="26" dur="1" fill="hold">
-                                          <p:stCondLst>
-                                            <p:cond delay="0"/>
-                                          </p:stCondLst>
-                                        </p:cTn>
-                                        <p:tgtEl>
-                                          <p:spTgt spid="3">
-                                            <p:txEl>
-                                              <p:pRg st="5" end="5"/>
-                                            </p:txEl>
-                                          </p:spTgt>
-                                        </p:tgtEl>
-                                        <p:attrNameLst>
-                                          <p:attrName>style.visibility</p:attrName>
-                                        </p:attrNameLst>
-                                      </p:cBhvr>
-                                      <p:to>
-                                        <p:strVal val="visible"/>
-                                      </p:to>
-                                    </p:set>
-                                  </p:childTnLst>
-                                </p:cTn>
-                              </p:par>
-                            </p:childTnLst>
-                          </p:cTn>
-                        </p:par>
-                      </p:childTnLst>
-                    </p:cTn>
-                  </p:par>
-                  <p:par>
-                    <p:cTn id="27" fill="hold">
-                      <p:stCondLst>
-                        <p:cond delay="indefinite"/>
-                      </p:stCondLst>
-                      <p:childTnLst>
-                        <p:par>
-                          <p:cTn id="28" fill="hold">
-                            <p:stCondLst>
-                              <p:cond delay="0"/>
-                            </p:stCondLst>
-                            <p:childTnLst>
-                              <p:par>
-                                <p:cTn id="29" presetID="1" presetClass="entr" presetSubtype="0" fill="hold" grpId="0" nodeType="clickEffect">
-                                  <p:stCondLst>
-                                    <p:cond delay="0"/>
-                                  </p:stCondLst>
-                                  <p:childTnLst>
-                                    <p:set>
-                                      <p:cBhvr>
-                                        <p:cTn id="30" dur="1" fill="hold">
+                                        <p:cTn id="20" dur="1" fill="hold">
                                           <p:stCondLst>
                                             <p:cond delay="0"/>
                                           </p:stCondLst>
@@ -11592,7 +11515,7 @@
           <p:cNvPr id="2" name="Title 1">
             <a:extLst>
               <a:ext uri="{FF2B5EF4-FFF2-40B4-BE49-F238E27FC236}">
-                <a16:creationId xmlns:a16="http://schemas.microsoft.com/office/drawing/2014/main" id="{C6DBF5C6-296C-82A2-BF5C-DA8B3C71438C}"/>
+                <a16:creationId xmlns:a16="http://schemas.microsoft.com/office/drawing/2014/main" id="{09E61190-701F-E4C9-7C75-DBC27263C8D6}"/>
               </a:ext>
             </a:extLst>
           </p:cNvPr>
@@ -11610,7 +11533,7 @@
           <a:p>
             <a:r>
               <a:rPr lang="en-GB" dirty="0"/>
-              <a:t>What is Git?</a:t>
+              <a:t>And GitHub and Dev Ops…</a:t>
             </a:r>
           </a:p>
         </p:txBody>
@@ -11620,7 +11543,7 @@
           <p:cNvPr id="3" name="Content Placeholder 2">
             <a:extLst>
               <a:ext uri="{FF2B5EF4-FFF2-40B4-BE49-F238E27FC236}">
-                <a16:creationId xmlns:a16="http://schemas.microsoft.com/office/drawing/2014/main" id="{FDF9507C-5200-B177-C436-D96E54B43F25}"/>
+                <a16:creationId xmlns:a16="http://schemas.microsoft.com/office/drawing/2014/main" id="{B96484C4-7F43-9B7A-AA31-CA3786AE2CF1}"/>
               </a:ext>
             </a:extLst>
           </p:cNvPr>
@@ -11634,68 +11557,107 @@
         <p:spPr/>
         <p:txBody>
           <a:bodyPr>
-            <a:normAutofit/>
+            <a:noAutofit/>
           </a:bodyPr>
           <a:lstStyle/>
           <a:p>
             <a:r>
-              <a:rPr lang="en-GB" sz="2800" dirty="0"/>
-              <a:t>Git is a piece of software designed for version control, i.e.</a:t>
+              <a:rPr lang="en-GB" sz="2000" dirty="0"/>
+              <a:t>GitHub and Dev Ops provide a space to store and interact with a repository.</a:t>
             </a:r>
           </a:p>
           <a:p>
             <a:pPr lvl="1"/>
             <a:r>
-              <a:rPr lang="en-GB" sz="2400" dirty="0"/>
-              <a:t>Tracking changes;</a:t>
+              <a:rPr lang="en-GB" sz="1800" dirty="0"/>
+              <a:t>View the files;</a:t>
             </a:r>
           </a:p>
           <a:p>
             <a:pPr lvl="1"/>
             <a:r>
-              <a:rPr lang="en-GB" sz="2400" dirty="0"/>
-              <a:t>Undoing changes;</a:t>
+              <a:rPr lang="en-GB" sz="1800" dirty="0"/>
+              <a:t>View the history;</a:t>
             </a:r>
           </a:p>
           <a:p>
             <a:pPr lvl="1"/>
             <a:r>
-              <a:rPr lang="en-GB" sz="2400" dirty="0"/>
-              <a:t>Maintaining parallel variants of code.</a:t>
-            </a:r>
-          </a:p>
-          <a:p>
-            <a:r>
-              <a:rPr lang="en-GB" sz="2800" dirty="0"/>
-              <a:t>Git works with repositories:</a:t>
+              <a:rPr lang="en-GB" sz="1800" dirty="0"/>
+              <a:t>Create and view different branches (variants) of the code;</a:t>
             </a:r>
           </a:p>
           <a:p>
             <a:pPr lvl="1"/>
             <a:r>
-              <a:rPr lang="en-GB" sz="2400" dirty="0"/>
-              <a:t>A repository (or repo) is simply a folder containing all the version controlled files of a given project.</a:t>
+              <a:rPr lang="en-GB" sz="1800" dirty="0"/>
+              <a:t>Management tools such as Issues logs (GitHub) or </a:t>
+            </a:r>
+            <a:r>
+              <a:rPr lang="en-GB" sz="1800" dirty="0" err="1"/>
+              <a:t>Kambam</a:t>
+            </a:r>
+            <a:r>
+              <a:rPr lang="en-GB" sz="1800" dirty="0"/>
+              <a:t> board (Dev Ops)</a:t>
             </a:r>
           </a:p>
           <a:p>
             <a:pPr lvl="1"/>
             <a:r>
-              <a:rPr lang="en-GB" sz="2400" dirty="0"/>
-              <a:t>It can have multiple sub-folders that will can also be tracked.</a:t>
-            </a:r>
-          </a:p>
-          <a:p>
-            <a:pPr marL="0" indent="0">
-              <a:buNone/>
-            </a:pPr>
-            <a:endParaRPr lang="en-GB" dirty="0"/>
+              <a:rPr lang="en-GB" sz="1800" dirty="0"/>
+              <a:t>Create pull requests, review code and get feedback from collaborators;</a:t>
+            </a:r>
+          </a:p>
+          <a:p>
+            <a:pPr lvl="1"/>
+            <a:r>
+              <a:rPr lang="en-GB" sz="1800" dirty="0"/>
+              <a:t>Perform automated QA and deployment of code (e.g. sending a dashboard live).</a:t>
+            </a:r>
+          </a:p>
+          <a:p>
+            <a:r>
+              <a:rPr lang="en-GB" sz="2000" dirty="0"/>
+              <a:t>GitHub and Dev Ops are </a:t>
+            </a:r>
+            <a:r>
+              <a:rPr lang="en-GB" sz="2000" b="1" i="1" dirty="0"/>
+              <a:t>generally</a:t>
+            </a:r>
+            <a:r>
+              <a:rPr lang="en-GB" sz="2000" dirty="0"/>
+              <a:t> </a:t>
+            </a:r>
+            <a:r>
+              <a:rPr lang="en-GB" sz="2000" b="1" i="1" dirty="0"/>
+              <a:t>not</a:t>
+            </a:r>
+            <a:r>
+              <a:rPr lang="en-GB" sz="2000" dirty="0"/>
+              <a:t> a place to:</a:t>
+            </a:r>
+          </a:p>
+          <a:p>
+            <a:pPr lvl="1"/>
+            <a:r>
+              <a:rPr lang="en-GB" sz="1800" dirty="0"/>
+              <a:t>Run your code;</a:t>
+            </a:r>
+          </a:p>
+          <a:p>
+            <a:pPr lvl="1"/>
+            <a:r>
+              <a:rPr lang="en-GB" sz="1800" dirty="0"/>
+              <a:t>Edit your code (although there is some basic text editing functionality you can use).</a:t>
+            </a:r>
           </a:p>
         </p:txBody>
       </p:sp>
     </p:spTree>
     <p:extLst>
       <p:ext uri="{BB962C8B-B14F-4D97-AF65-F5344CB8AC3E}">
-        <p14:creationId xmlns:p14="http://schemas.microsoft.com/office/powerpoint/2010/main" val="3343195961"/>
+        <p14:creationId xmlns:p14="http://schemas.microsoft.com/office/powerpoint/2010/main" val="2138845077"/>
       </p:ext>
     </p:extLst>
   </p:cSld>
@@ -11846,33 +11808,15 @@
                                   </p:childTnLst>
                                 </p:cTn>
                               </p:par>
-                            </p:childTnLst>
-                          </p:cTn>
-                        </p:par>
-                      </p:childTnLst>
-                    </p:cTn>
-                  </p:par>
-                  <p:par>
-                    <p:cTn id="13" fill="hold">
-                      <p:stCondLst>
-                        <p:cond delay="indefinite"/>
-                      </p:stCondLst>
-                      <p:childTnLst>
-                        <p:par>
-                          <p:cTn id="14" fill="hold">
-                            <p:stCondLst>
-                              <p:cond delay="0"/>
-                            </p:stCondLst>
-                            <p:childTnLst>
                               <p:par>
-                                <p:cTn id="15" presetID="1" presetClass="entr" presetSubtype="0" fill="hold" grpId="0" nodeType="clickEffect">
+                                <p:cTn id="13" presetID="1" presetClass="entr" presetSubtype="0" fill="hold" grpId="0" nodeType="withEffect">
                                   <p:stCondLst>
                                     <p:cond delay="0"/>
                                   </p:stCondLst>
                                   <p:childTnLst>
                                     <p:set>
                                       <p:cBhvr>
-                                        <p:cTn id="16" dur="1" fill="hold">
+                                        <p:cTn id="14" dur="1" fill="hold">
                                           <p:stCondLst>
                                             <p:cond delay="0"/>
                                           </p:stCondLst>
@@ -11881,6 +11825,37 @@
                                           <p:spTgt spid="3">
                                             <p:txEl>
                                               <p:pRg st="4" end="4"/>
+                                            </p:txEl>
+                                          </p:spTgt>
+                                        </p:tgtEl>
+                                        <p:attrNameLst>
+                                          <p:attrName>style.visibility</p:attrName>
+                                        </p:attrNameLst>
+                                      </p:cBhvr>
+                                      <p:to>
+                                        <p:strVal val="visible"/>
+                                      </p:to>
+                                    </p:set>
+                                  </p:childTnLst>
+                                </p:cTn>
+                              </p:par>
+                              <p:par>
+                                <p:cTn id="15" presetID="1" presetClass="entr" presetSubtype="0" fill="hold" grpId="0" nodeType="withEffect">
+                                  <p:stCondLst>
+                                    <p:cond delay="0"/>
+                                  </p:stCondLst>
+                                  <p:childTnLst>
+                                    <p:set>
+                                      <p:cBhvr>
+                                        <p:cTn id="16" dur="1" fill="hold">
+                                          <p:stCondLst>
+                                            <p:cond delay="0"/>
+                                          </p:stCondLst>
+                                        </p:cTn>
+                                        <p:tgtEl>
+                                          <p:spTgt spid="3">
+                                            <p:txEl>
+                                              <p:pRg st="5" end="5"/>
                                             </p:txEl>
                                           </p:spTgt>
                                         </p:tgtEl>
@@ -11911,7 +11886,56 @@
                                         <p:tgtEl>
                                           <p:spTgt spid="3">
                                             <p:txEl>
-                                              <p:pRg st="5" end="5"/>
+                                              <p:pRg st="6" end="6"/>
+                                            </p:txEl>
+                                          </p:spTgt>
+                                        </p:tgtEl>
+                                        <p:attrNameLst>
+                                          <p:attrName>style.visibility</p:attrName>
+                                        </p:attrNameLst>
+                                      </p:cBhvr>
+                                      <p:to>
+                                        <p:strVal val="visible"/>
+                                      </p:to>
+                                    </p:set>
+                                  </p:childTnLst>
+                                </p:cTn>
+                              </p:par>
+                            </p:childTnLst>
+                          </p:cTn>
+                        </p:par>
+                      </p:childTnLst>
+                    </p:cTn>
+                  </p:par>
+                  <p:par>
+                    <p:cTn id="19" fill="hold">
+                      <p:stCondLst>
+                        <p:cond delay="indefinite"/>
+                      </p:stCondLst>
+                      <p:childTnLst>
+                        <p:par>
+                          <p:cTn id="20" fill="hold">
+                            <p:stCondLst>
+                              <p:cond delay="0"/>
+                            </p:stCondLst>
+                            <p:childTnLst>
+                              <p:par>
+                                <p:cTn id="21" presetID="1" presetClass="entr" presetSubtype="0" fill="hold" grpId="0" nodeType="clickEffect">
+                                  <p:stCondLst>
+                                    <p:cond delay="0"/>
+                                  </p:stCondLst>
+                                  <p:childTnLst>
+                                    <p:set>
+                                      <p:cBhvr>
+                                        <p:cTn id="22" dur="1" fill="hold">
+                                          <p:stCondLst>
+                                            <p:cond delay="0"/>
+                                          </p:stCondLst>
+                                        </p:cTn>
+                                        <p:tgtEl>
+                                          <p:spTgt spid="3">
+                                            <p:txEl>
+                                              <p:pRg st="7" end="7"/>
                                             </p:txEl>
                                           </p:spTgt>
                                         </p:tgtEl>
@@ -11927,14 +11951,14 @@
                                 </p:cTn>
                               </p:par>
                               <p:par>
-                                <p:cTn id="19" presetID="1" presetClass="entr" presetSubtype="0" fill="hold" grpId="0" nodeType="withEffect">
+                                <p:cTn id="23" presetID="1" presetClass="entr" presetSubtype="0" fill="hold" grpId="0" nodeType="withEffect">
                                   <p:stCondLst>
                                     <p:cond delay="0"/>
                                   </p:stCondLst>
                                   <p:childTnLst>
                                     <p:set>
                                       <p:cBhvr>
-                                        <p:cTn id="20" dur="1" fill="hold">
+                                        <p:cTn id="24" dur="1" fill="hold">
                                           <p:stCondLst>
                                             <p:cond delay="0"/>
                                           </p:stCondLst>
@@ -11942,7 +11966,38 @@
                                         <p:tgtEl>
                                           <p:spTgt spid="3">
                                             <p:txEl>
-                                              <p:pRg st="6" end="6"/>
+                                              <p:pRg st="8" end="8"/>
+                                            </p:txEl>
+                                          </p:spTgt>
+                                        </p:tgtEl>
+                                        <p:attrNameLst>
+                                          <p:attrName>style.visibility</p:attrName>
+                                        </p:attrNameLst>
+                                      </p:cBhvr>
+                                      <p:to>
+                                        <p:strVal val="visible"/>
+                                      </p:to>
+                                    </p:set>
+                                  </p:childTnLst>
+                                </p:cTn>
+                              </p:par>
+                              <p:par>
+                                <p:cTn id="25" presetID="1" presetClass="entr" presetSubtype="0" fill="hold" grpId="0" nodeType="withEffect">
+                                  <p:stCondLst>
+                                    <p:cond delay="0"/>
+                                  </p:stCondLst>
+                                  <p:childTnLst>
+                                    <p:set>
+                                      <p:cBhvr>
+                                        <p:cTn id="26" dur="1" fill="hold">
+                                          <p:stCondLst>
+                                            <p:cond delay="0"/>
+                                          </p:stCondLst>
+                                        </p:cTn>
+                                        <p:tgtEl>
+                                          <p:spTgt spid="3">
+                                            <p:txEl>
+                                              <p:pRg st="9" end="9"/>
                                             </p:txEl>
                                           </p:spTgt>
                                         </p:tgtEl>
@@ -12013,7 +12068,7 @@
           <p:cNvPr id="2" name="Title 1">
             <a:extLst>
               <a:ext uri="{FF2B5EF4-FFF2-40B4-BE49-F238E27FC236}">
-                <a16:creationId xmlns:a16="http://schemas.microsoft.com/office/drawing/2014/main" id="{09E61190-701F-E4C9-7C75-DBC27263C8D6}"/>
+                <a16:creationId xmlns:a16="http://schemas.microsoft.com/office/drawing/2014/main" id="{001B293D-B603-DE94-CAEE-6BF7C72DA4D2}"/>
               </a:ext>
             </a:extLst>
           </p:cNvPr>
@@ -12031,7 +12086,7 @@
           <a:p>
             <a:r>
               <a:rPr lang="en-GB" dirty="0"/>
-              <a:t>And GitHub and Dev Ops…</a:t>
+              <a:t>What are the key blockers to you using Git?</a:t>
             </a:r>
           </a:p>
         </p:txBody>
@@ -12041,7 +12096,7 @@
           <p:cNvPr id="3" name="Content Placeholder 2">
             <a:extLst>
               <a:ext uri="{FF2B5EF4-FFF2-40B4-BE49-F238E27FC236}">
-                <a16:creationId xmlns:a16="http://schemas.microsoft.com/office/drawing/2014/main" id="{B96484C4-7F43-9B7A-AA31-CA3786AE2CF1}"/>
+                <a16:creationId xmlns:a16="http://schemas.microsoft.com/office/drawing/2014/main" id="{D81F6B97-ECF7-8CD4-60B7-A2877F3168AD}"/>
               </a:ext>
             </a:extLst>
           </p:cNvPr>
@@ -12054,100 +12109,48 @@
         </p:nvSpPr>
         <p:spPr/>
         <p:txBody>
-          <a:bodyPr>
-            <a:noAutofit/>
-          </a:bodyPr>
+          <a:bodyPr/>
           <a:lstStyle/>
           <a:p>
             <a:r>
-              <a:rPr lang="en-GB" sz="2000" dirty="0"/>
-              <a:t>GitHub and Dev Ops provide a space to store and interact with a repository.</a:t>
-            </a:r>
-          </a:p>
-          <a:p>
-            <a:pPr lvl="1"/>
-            <a:r>
-              <a:rPr lang="en-GB" sz="1800" dirty="0"/>
-              <a:t>View the files;</a:t>
-            </a:r>
-          </a:p>
-          <a:p>
-            <a:pPr lvl="1"/>
-            <a:r>
-              <a:rPr lang="en-GB" sz="1800" dirty="0"/>
-              <a:t>View the history;</a:t>
-            </a:r>
-          </a:p>
-          <a:p>
-            <a:pPr lvl="1"/>
-            <a:r>
-              <a:rPr lang="en-GB" sz="1800" dirty="0"/>
-              <a:t>Create and view different branches (variants) of the code;</a:t>
-            </a:r>
-          </a:p>
-          <a:p>
-            <a:pPr lvl="1"/>
-            <a:r>
-              <a:rPr lang="en-GB" sz="1800" dirty="0"/>
-              <a:t>Management tools such as Issues logs (GitHub) or </a:t>
-            </a:r>
-            <a:r>
-              <a:rPr lang="en-GB" sz="1800" dirty="0" err="1"/>
-              <a:t>Kambam</a:t>
-            </a:r>
-            <a:r>
-              <a:rPr lang="en-GB" sz="1800" dirty="0"/>
-              <a:t> board (Dev Ops)</a:t>
-            </a:r>
-          </a:p>
-          <a:p>
-            <a:pPr lvl="1"/>
-            <a:r>
-              <a:rPr lang="en-GB" sz="1800" dirty="0"/>
-              <a:t>Create pull requests, review code and get feedback from collaborators;</a:t>
-            </a:r>
-          </a:p>
-          <a:p>
-            <a:pPr lvl="1"/>
-            <a:r>
-              <a:rPr lang="en-GB" sz="1800" dirty="0"/>
-              <a:t>Perform automated QA and deployment of code (e.g. sending a dashboard live).</a:t>
-            </a:r>
-          </a:p>
-          <a:p>
-            <a:r>
-              <a:rPr lang="en-GB" sz="2000" dirty="0"/>
-              <a:t>GitHub and Dev Ops are </a:t>
-            </a:r>
-            <a:r>
-              <a:rPr lang="en-GB" sz="2000" b="1" i="1" dirty="0"/>
-              <a:t>generally</a:t>
-            </a:r>
-            <a:r>
-              <a:rPr lang="en-GB" sz="2000" dirty="0"/>
-              <a:t> </a:t>
-            </a:r>
-            <a:r>
-              <a:rPr lang="en-GB" sz="2000" b="1" i="1" dirty="0"/>
-              <a:t>not</a:t>
-            </a:r>
-            <a:r>
-              <a:rPr lang="en-GB" sz="2000" dirty="0"/>
-              <a:t> a place to:</a:t>
-            </a:r>
-          </a:p>
-          <a:p>
-            <a:pPr lvl="1"/>
-            <a:r>
-              <a:rPr lang="en-GB" sz="1800" dirty="0"/>
-              <a:t>Run your code;</a:t>
-            </a:r>
-          </a:p>
-          <a:p>
-            <a:pPr lvl="1"/>
-            <a:r>
-              <a:rPr lang="en-GB" sz="1800" dirty="0"/>
-              <a:t>Edit your code (although there is some basic text editing functionality you can use).</a:t>
+              <a:rPr lang="en-GB" dirty="0"/>
+              <a:t>Never heard of it before now!</a:t>
+            </a:r>
+          </a:p>
+          <a:p>
+            <a:r>
+              <a:rPr lang="en-GB" dirty="0"/>
+              <a:t>Team or personal expertise/knowledge/capability</a:t>
+            </a:r>
+          </a:p>
+          <a:p>
+            <a:r>
+              <a:rPr lang="en-GB" dirty="0"/>
+              <a:t>Not enough support in the department</a:t>
+            </a:r>
+          </a:p>
+          <a:p>
+            <a:r>
+              <a:rPr lang="en-GB" dirty="0"/>
+              <a:t>Challenges in setting it (and RStudio) up on work machines</a:t>
+            </a:r>
+          </a:p>
+          <a:p>
+            <a:r>
+              <a:rPr lang="en-GB" dirty="0"/>
+              <a:t>Don’t see how it benefits us compared to what we already do just on shared drives</a:t>
+            </a:r>
+          </a:p>
+          <a:p>
+            <a:r>
+              <a:rPr lang="en-GB" dirty="0"/>
+              <a:t>Just don’t get the concept!</a:t>
+            </a:r>
+          </a:p>
+          <a:p>
+            <a:r>
+              <a:rPr lang="en-GB" dirty="0"/>
+              <a:t>Overwhelmed by too much to learn alongside R and SQL learning.</a:t>
             </a:r>
           </a:p>
         </p:txBody>
@@ -12155,7 +12158,7 @@
     </p:spTree>
     <p:extLst>
       <p:ext uri="{BB962C8B-B14F-4D97-AF65-F5344CB8AC3E}">
-        <p14:creationId xmlns:p14="http://schemas.microsoft.com/office/powerpoint/2010/main" val="2138845077"/>
+        <p14:creationId xmlns:p14="http://schemas.microsoft.com/office/powerpoint/2010/main" val="3862344689"/>
       </p:ext>
     </p:extLst>
   </p:cSld>
@@ -12213,15 +12216,33 @@
                                   </p:childTnLst>
                                 </p:cTn>
                               </p:par>
+                            </p:childTnLst>
+                          </p:cTn>
+                        </p:par>
+                      </p:childTnLst>
+                    </p:cTn>
+                  </p:par>
+                  <p:par>
+                    <p:cTn id="7" fill="hold">
+                      <p:stCondLst>
+                        <p:cond delay="indefinite"/>
+                      </p:stCondLst>
+                      <p:childTnLst>
+                        <p:par>
+                          <p:cTn id="8" fill="hold">
+                            <p:stCondLst>
+                              <p:cond delay="0"/>
+                            </p:stCondLst>
+                            <p:childTnLst>
                               <p:par>
-                                <p:cTn id="7" presetID="1" presetClass="entr" presetSubtype="0" fill="hold" grpId="0" nodeType="withEffect">
+                                <p:cTn id="9" presetID="1" presetClass="entr" presetSubtype="0" fill="hold" grpId="0" nodeType="clickEffect">
                                   <p:stCondLst>
                                     <p:cond delay="0"/>
                                   </p:stCondLst>
                                   <p:childTnLst>
                                     <p:set>
                                       <p:cBhvr>
-                                        <p:cTn id="8" dur="1" fill="hold">
+                                        <p:cTn id="10" dur="1" fill="hold">
                                           <p:stCondLst>
                                             <p:cond delay="0"/>
                                           </p:stCondLst>
@@ -12244,15 +12265,33 @@
                                   </p:childTnLst>
                                 </p:cTn>
                               </p:par>
+                            </p:childTnLst>
+                          </p:cTn>
+                        </p:par>
+                      </p:childTnLst>
+                    </p:cTn>
+                  </p:par>
+                  <p:par>
+                    <p:cTn id="11" fill="hold">
+                      <p:stCondLst>
+                        <p:cond delay="indefinite"/>
+                      </p:stCondLst>
+                      <p:childTnLst>
+                        <p:par>
+                          <p:cTn id="12" fill="hold">
+                            <p:stCondLst>
+                              <p:cond delay="0"/>
+                            </p:stCondLst>
+                            <p:childTnLst>
                               <p:par>
-                                <p:cTn id="9" presetID="1" presetClass="entr" presetSubtype="0" fill="hold" grpId="0" nodeType="withEffect">
+                                <p:cTn id="13" presetID="1" presetClass="entr" presetSubtype="0" fill="hold" grpId="0" nodeType="clickEffect">
                                   <p:stCondLst>
                                     <p:cond delay="0"/>
                                   </p:stCondLst>
                                   <p:childTnLst>
                                     <p:set>
                                       <p:cBhvr>
-                                        <p:cTn id="10" dur="1" fill="hold">
+                                        <p:cTn id="14" dur="1" fill="hold">
                                           <p:stCondLst>
                                             <p:cond delay="0"/>
                                           </p:stCondLst>
@@ -12275,15 +12314,33 @@
                                   </p:childTnLst>
                                 </p:cTn>
                               </p:par>
+                            </p:childTnLst>
+                          </p:cTn>
+                        </p:par>
+                      </p:childTnLst>
+                    </p:cTn>
+                  </p:par>
+                  <p:par>
+                    <p:cTn id="15" fill="hold">
+                      <p:stCondLst>
+                        <p:cond delay="indefinite"/>
+                      </p:stCondLst>
+                      <p:childTnLst>
+                        <p:par>
+                          <p:cTn id="16" fill="hold">
+                            <p:stCondLst>
+                              <p:cond delay="0"/>
+                            </p:stCondLst>
+                            <p:childTnLst>
                               <p:par>
-                                <p:cTn id="11" presetID="1" presetClass="entr" presetSubtype="0" fill="hold" grpId="0" nodeType="withEffect">
+                                <p:cTn id="17" presetID="1" presetClass="entr" presetSubtype="0" fill="hold" grpId="0" nodeType="clickEffect">
                                   <p:stCondLst>
                                     <p:cond delay="0"/>
                                   </p:stCondLst>
                                   <p:childTnLst>
                                     <p:set>
                                       <p:cBhvr>
-                                        <p:cTn id="12" dur="1" fill="hold">
+                                        <p:cTn id="18" dur="1" fill="hold">
                                           <p:stCondLst>
                                             <p:cond delay="0"/>
                                           </p:stCondLst>
@@ -12292,99 +12349,6 @@
                                           <p:spTgt spid="3">
                                             <p:txEl>
                                               <p:pRg st="3" end="3"/>
-                                            </p:txEl>
-                                          </p:spTgt>
-                                        </p:tgtEl>
-                                        <p:attrNameLst>
-                                          <p:attrName>style.visibility</p:attrName>
-                                        </p:attrNameLst>
-                                      </p:cBhvr>
-                                      <p:to>
-                                        <p:strVal val="visible"/>
-                                      </p:to>
-                                    </p:set>
-                                  </p:childTnLst>
-                                </p:cTn>
-                              </p:par>
-                              <p:par>
-                                <p:cTn id="13" presetID="1" presetClass="entr" presetSubtype="0" fill="hold" grpId="0" nodeType="withEffect">
-                                  <p:stCondLst>
-                                    <p:cond delay="0"/>
-                                  </p:stCondLst>
-                                  <p:childTnLst>
-                                    <p:set>
-                                      <p:cBhvr>
-                                        <p:cTn id="14" dur="1" fill="hold">
-                                          <p:stCondLst>
-                                            <p:cond delay="0"/>
-                                          </p:stCondLst>
-                                        </p:cTn>
-                                        <p:tgtEl>
-                                          <p:spTgt spid="3">
-                                            <p:txEl>
-                                              <p:pRg st="4" end="4"/>
-                                            </p:txEl>
-                                          </p:spTgt>
-                                        </p:tgtEl>
-                                        <p:attrNameLst>
-                                          <p:attrName>style.visibility</p:attrName>
-                                        </p:attrNameLst>
-                                      </p:cBhvr>
-                                      <p:to>
-                                        <p:strVal val="visible"/>
-                                      </p:to>
-                                    </p:set>
-                                  </p:childTnLst>
-                                </p:cTn>
-                              </p:par>
-                              <p:par>
-                                <p:cTn id="15" presetID="1" presetClass="entr" presetSubtype="0" fill="hold" grpId="0" nodeType="withEffect">
-                                  <p:stCondLst>
-                                    <p:cond delay="0"/>
-                                  </p:stCondLst>
-                                  <p:childTnLst>
-                                    <p:set>
-                                      <p:cBhvr>
-                                        <p:cTn id="16" dur="1" fill="hold">
-                                          <p:stCondLst>
-                                            <p:cond delay="0"/>
-                                          </p:stCondLst>
-                                        </p:cTn>
-                                        <p:tgtEl>
-                                          <p:spTgt spid="3">
-                                            <p:txEl>
-                                              <p:pRg st="5" end="5"/>
-                                            </p:txEl>
-                                          </p:spTgt>
-                                        </p:tgtEl>
-                                        <p:attrNameLst>
-                                          <p:attrName>style.visibility</p:attrName>
-                                        </p:attrNameLst>
-                                      </p:cBhvr>
-                                      <p:to>
-                                        <p:strVal val="visible"/>
-                                      </p:to>
-                                    </p:set>
-                                  </p:childTnLst>
-                                </p:cTn>
-                              </p:par>
-                              <p:par>
-                                <p:cTn id="17" presetID="1" presetClass="entr" presetSubtype="0" fill="hold" grpId="0" nodeType="withEffect">
-                                  <p:stCondLst>
-                                    <p:cond delay="0"/>
-                                  </p:stCondLst>
-                                  <p:childTnLst>
-                                    <p:set>
-                                      <p:cBhvr>
-                                        <p:cTn id="18" dur="1" fill="hold">
-                                          <p:stCondLst>
-                                            <p:cond delay="0"/>
-                                          </p:stCondLst>
-                                        </p:cTn>
-                                        <p:tgtEl>
-                                          <p:spTgt spid="3">
-                                            <p:txEl>
-                                              <p:pRg st="6" end="6"/>
                                             </p:txEl>
                                           </p:spTgt>
                                         </p:tgtEl>
@@ -12433,7 +12397,7 @@
                                         <p:tgtEl>
                                           <p:spTgt spid="3">
                                             <p:txEl>
-                                              <p:pRg st="7" end="7"/>
+                                              <p:pRg st="4" end="4"/>
                                             </p:txEl>
                                           </p:spTgt>
                                         </p:tgtEl>
@@ -12448,15 +12412,33 @@
                                   </p:childTnLst>
                                 </p:cTn>
                               </p:par>
+                            </p:childTnLst>
+                          </p:cTn>
+                        </p:par>
+                      </p:childTnLst>
+                    </p:cTn>
+                  </p:par>
+                  <p:par>
+                    <p:cTn id="23" fill="hold">
+                      <p:stCondLst>
+                        <p:cond delay="indefinite"/>
+                      </p:stCondLst>
+                      <p:childTnLst>
+                        <p:par>
+                          <p:cTn id="24" fill="hold">
+                            <p:stCondLst>
+                              <p:cond delay="0"/>
+                            </p:stCondLst>
+                            <p:childTnLst>
                               <p:par>
-                                <p:cTn id="23" presetID="1" presetClass="entr" presetSubtype="0" fill="hold" grpId="0" nodeType="withEffect">
+                                <p:cTn id="25" presetID="1" presetClass="entr" presetSubtype="0" fill="hold" grpId="0" nodeType="clickEffect">
                                   <p:stCondLst>
                                     <p:cond delay="0"/>
                                   </p:stCondLst>
                                   <p:childTnLst>
                                     <p:set>
                                       <p:cBhvr>
-                                        <p:cTn id="24" dur="1" fill="hold">
+                                        <p:cTn id="26" dur="1" fill="hold">
                                           <p:stCondLst>
                                             <p:cond delay="0"/>
                                           </p:stCondLst>
@@ -12464,7 +12446,7 @@
                                         <p:tgtEl>
                                           <p:spTgt spid="3">
                                             <p:txEl>
-                                              <p:pRg st="8" end="8"/>
+                                              <p:pRg st="5" end="5"/>
                                             </p:txEl>
                                           </p:spTgt>
                                         </p:tgtEl>
@@ -12479,15 +12461,33 @@
                                   </p:childTnLst>
                                 </p:cTn>
                               </p:par>
+                            </p:childTnLst>
+                          </p:cTn>
+                        </p:par>
+                      </p:childTnLst>
+                    </p:cTn>
+                  </p:par>
+                  <p:par>
+                    <p:cTn id="27" fill="hold">
+                      <p:stCondLst>
+                        <p:cond delay="indefinite"/>
+                      </p:stCondLst>
+                      <p:childTnLst>
+                        <p:par>
+                          <p:cTn id="28" fill="hold">
+                            <p:stCondLst>
+                              <p:cond delay="0"/>
+                            </p:stCondLst>
+                            <p:childTnLst>
                               <p:par>
-                                <p:cTn id="25" presetID="1" presetClass="entr" presetSubtype="0" fill="hold" grpId="0" nodeType="withEffect">
+                                <p:cTn id="29" presetID="1" presetClass="entr" presetSubtype="0" fill="hold" grpId="0" nodeType="clickEffect">
                                   <p:stCondLst>
                                     <p:cond delay="0"/>
                                   </p:stCondLst>
                                   <p:childTnLst>
                                     <p:set>
                                       <p:cBhvr>
-                                        <p:cTn id="26" dur="1" fill="hold">
+                                        <p:cTn id="30" dur="1" fill="hold">
                                           <p:stCondLst>
                                             <p:cond delay="0"/>
                                           </p:stCondLst>
@@ -12495,7 +12495,7 @@
                                         <p:tgtEl>
                                           <p:spTgt spid="3">
                                             <p:txEl>
-                                              <p:pRg st="9" end="9"/>
+                                              <p:pRg st="6" end="6"/>
                                             </p:txEl>
                                           </p:spTgt>
                                         </p:tgtEl>

</xml_diff>